<commit_message>
Hochladen Doku, Architektur und aktualisierte Spielregeln Signed-off-by: HSklaWe <alexander.schulz10@gmx.de>
</commit_message>
<xml_diff>
--- a/Organisation/Architektur.pptx
+++ b/Organisation/Architektur.pptx
@@ -2,14 +2,13 @@
 <file path=ppt/presentation.xml><?xml version="1.0" encoding="utf-8"?>
 <p:presentation xmlns:a="http://schemas.openxmlformats.org/drawingml/2006/main" xmlns:r="http://schemas.openxmlformats.org/officeDocument/2006/relationships" xmlns:p="http://schemas.openxmlformats.org/presentationml/2006/main">
   <p:sldMasterIdLst>
-    <p:sldMasterId id="2147483648" r:id="rId5"/>
+    <p:sldMasterId id="2147483648" r:id="rId1"/>
   </p:sldMasterIdLst>
   <p:notesMasterIdLst>
-    <p:notesMasterId r:id="rId7"/>
+    <p:notesMasterId r:id="rId3"/>
   </p:notesMasterIdLst>
   <p:sldIdLst>
-    <p:sldId id="256" r:id="rId8"/>
-    <p:sldId id="257" r:id="rId9"/>
+    <p:sldId id="257" r:id="rId2"/>
   </p:sldIdLst>
   <p:sldSz cx="13004800" cy="9753600"/>
   <p:notesSz cx="6858000" cy="9144000"/>
@@ -90,13 +89,14 @@
 </p:presentation>
 </file>
 
-<file path=ppt/commentAuthors.xml><?xml version="1.0" encoding="utf-8"?>
-<p:cmAuthorLst xmlns:a="http://schemas.openxmlformats.org/drawingml/2006/main" xmlns:r="http://schemas.openxmlformats.org/officeDocument/2006/relationships" xmlns:p="http://schemas.openxmlformats.org/presentationml/2006/main"/>
-</file>
-
 <file path=ppt/notesMasters/notesMaster1.xml><?xml version="1.0" encoding="utf-8"?>
 <p:notesMaster xmlns:a="http://schemas.openxmlformats.org/drawingml/2006/main" xmlns:r="http://schemas.openxmlformats.org/officeDocument/2006/relationships" xmlns:p="http://schemas.openxmlformats.org/presentationml/2006/main">
   <p:cSld>
+    <p:bg>
+      <p:bgRef idx="1001">
+        <a:schemeClr val="bg1"/>
+      </p:bgRef>
+    </p:bg>
     <p:spTree>
       <p:nvGrpSpPr>
         <p:cNvPr id="1" name=""/>
@@ -114,7 +114,9 @@
       <p:sp>
         <p:nvSpPr>
           <p:cNvPr id="29" name="Shape 29"/>
-          <p:cNvSpPr/>
+          <p:cNvSpPr>
+            <a:spLocks noGrp="1" noRot="1" noChangeAspect="1"/>
+          </p:cNvSpPr>
           <p:nvPr>
             <p:ph type="sldImg"/>
           </p:nvPr>
@@ -133,13 +135,16 @@
           <a:lstStyle/>
           <a:p>
             <a:pPr lvl="0"/>
+            <a:endParaRPr/>
           </a:p>
         </p:txBody>
       </p:sp>
       <p:sp>
         <p:nvSpPr>
           <p:cNvPr id="30" name="Shape 30"/>
-          <p:cNvSpPr/>
+          <p:cNvSpPr>
+            <a:spLocks noGrp="1"/>
+          </p:cNvSpPr>
           <p:nvPr>
             <p:ph type="body" sz="quarter" idx="1"/>
           </p:nvPr>
@@ -158,6 +163,7 @@
           <a:lstStyle/>
           <a:p>
             <a:pPr lvl="0"/>
+            <a:endParaRPr/>
           </a:p>
         </p:txBody>
       </p:sp>
@@ -269,7 +275,7 @@
 </file>
 
 <file path=ppt/slideLayouts/slideLayout1.xml><?xml version="1.0" encoding="utf-8"?>
-<p:sldLayout xmlns:a="http://schemas.openxmlformats.org/drawingml/2006/main" xmlns:r="http://schemas.openxmlformats.org/officeDocument/2006/relationships" xmlns:p="http://schemas.openxmlformats.org/presentationml/2006/main" type="tx" showMasterSp="1" showMasterPhAnim="1">
+<p:sldLayout xmlns:a="http://schemas.openxmlformats.org/drawingml/2006/main" xmlns:r="http://schemas.openxmlformats.org/officeDocument/2006/relationships" xmlns:p="http://schemas.openxmlformats.org/presentationml/2006/main" type="tx">
   <p:cSld name="Titel &amp; Untertitel">
     <p:spTree>
       <p:nvGrpSpPr>
@@ -288,7 +294,9 @@
       <p:sp>
         <p:nvSpPr>
           <p:cNvPr id="5" name="Shape 5"/>
-          <p:cNvSpPr/>
+          <p:cNvSpPr>
+            <a:spLocks noGrp="1"/>
+          </p:cNvSpPr>
           <p:nvPr>
             <p:ph type="title"/>
           </p:nvPr>
@@ -319,7 +327,9 @@
       <p:sp>
         <p:nvSpPr>
           <p:cNvPr id="6" name="Shape 6"/>
-          <p:cNvSpPr/>
+          <p:cNvSpPr>
+            <a:spLocks noGrp="1"/>
+          </p:cNvSpPr>
           <p:nvPr>
             <p:ph type="body" idx="1"/>
           </p:nvPr>
@@ -385,7 +395,6 @@
               <a:rPr sz="3200"/>
               <a:t>Textebene 1</a:t>
             </a:r>
-            <a:endParaRPr sz="3200"/>
           </a:p>
           <a:p>
             <a:pPr lvl="1">
@@ -395,7 +404,6 @@
               <a:rPr sz="3200"/>
               <a:t>Textebene 2</a:t>
             </a:r>
-            <a:endParaRPr sz="3200"/>
           </a:p>
           <a:p>
             <a:pPr lvl="2">
@@ -405,7 +413,6 @@
               <a:rPr sz="3200"/>
               <a:t>Textebene 3</a:t>
             </a:r>
-            <a:endParaRPr sz="3200"/>
           </a:p>
           <a:p>
             <a:pPr lvl="3">
@@ -415,7 +422,6 @@
               <a:rPr sz="3200"/>
               <a:t>Textebene 4</a:t>
             </a:r>
-            <a:endParaRPr sz="3200"/>
           </a:p>
           <a:p>
             <a:pPr lvl="4">
@@ -433,12 +439,12 @@
   <p:clrMapOvr>
     <a:masterClrMapping/>
   </p:clrMapOvr>
-  <p:transition spd="med" advClick="1"/>
+  <p:transition spd="med"/>
 </p:sldLayout>
 </file>
 
 <file path=ppt/slideLayouts/slideLayout10.xml><?xml version="1.0" encoding="utf-8"?>
-<p:sldLayout xmlns:a="http://schemas.openxmlformats.org/drawingml/2006/main" xmlns:r="http://schemas.openxmlformats.org/officeDocument/2006/relationships" xmlns:p="http://schemas.openxmlformats.org/presentationml/2006/main" type="tx" showMasterSp="1" showMasterPhAnim="1">
+<p:sldLayout xmlns:a="http://schemas.openxmlformats.org/drawingml/2006/main" xmlns:r="http://schemas.openxmlformats.org/officeDocument/2006/relationships" xmlns:p="http://schemas.openxmlformats.org/presentationml/2006/main" type="tx">
   <p:cSld name="Zitat">
     <p:spTree>
       <p:nvGrpSpPr>
@@ -459,12 +465,12 @@
   <p:clrMapOvr>
     <a:masterClrMapping/>
   </p:clrMapOvr>
-  <p:transition spd="med" advClick="1"/>
+  <p:transition spd="med"/>
 </p:sldLayout>
 </file>
 
 <file path=ppt/slideLayouts/slideLayout11.xml><?xml version="1.0" encoding="utf-8"?>
-<p:sldLayout xmlns:a="http://schemas.openxmlformats.org/drawingml/2006/main" xmlns:r="http://schemas.openxmlformats.org/officeDocument/2006/relationships" xmlns:p="http://schemas.openxmlformats.org/presentationml/2006/main" type="tx" showMasterSp="1" showMasterPhAnim="1">
+<p:sldLayout xmlns:a="http://schemas.openxmlformats.org/drawingml/2006/main" xmlns:r="http://schemas.openxmlformats.org/officeDocument/2006/relationships" xmlns:p="http://schemas.openxmlformats.org/presentationml/2006/main" type="tx">
   <p:cSld name="Foto">
     <p:spTree>
       <p:nvGrpSpPr>
@@ -485,12 +491,12 @@
   <p:clrMapOvr>
     <a:masterClrMapping/>
   </p:clrMapOvr>
-  <p:transition spd="med" advClick="1"/>
+  <p:transition spd="med"/>
 </p:sldLayout>
 </file>
 
 <file path=ppt/slideLayouts/slideLayout12.xml><?xml version="1.0" encoding="utf-8"?>
-<p:sldLayout xmlns:a="http://schemas.openxmlformats.org/drawingml/2006/main" xmlns:r="http://schemas.openxmlformats.org/officeDocument/2006/relationships" xmlns:p="http://schemas.openxmlformats.org/presentationml/2006/main" type="tx" showMasterSp="1" showMasterPhAnim="1">
+<p:sldLayout xmlns:a="http://schemas.openxmlformats.org/drawingml/2006/main" xmlns:r="http://schemas.openxmlformats.org/officeDocument/2006/relationships" xmlns:p="http://schemas.openxmlformats.org/presentationml/2006/main" type="tx">
   <p:cSld name="Leer">
     <p:spTree>
       <p:nvGrpSpPr>
@@ -511,12 +517,12 @@
   <p:clrMapOvr>
     <a:masterClrMapping/>
   </p:clrMapOvr>
-  <p:transition spd="med" advClick="1"/>
+  <p:transition spd="med"/>
 </p:sldLayout>
 </file>
 
 <file path=ppt/slideLayouts/slideLayout2.xml><?xml version="1.0" encoding="utf-8"?>
-<p:sldLayout xmlns:a="http://schemas.openxmlformats.org/drawingml/2006/main" xmlns:r="http://schemas.openxmlformats.org/officeDocument/2006/relationships" xmlns:p="http://schemas.openxmlformats.org/presentationml/2006/main" type="tx" showMasterSp="1" showMasterPhAnim="1">
+<p:sldLayout xmlns:a="http://schemas.openxmlformats.org/drawingml/2006/main" xmlns:r="http://schemas.openxmlformats.org/officeDocument/2006/relationships" xmlns:p="http://schemas.openxmlformats.org/presentationml/2006/main" type="tx">
   <p:cSld name="Foto - Horizontal">
     <p:spTree>
       <p:nvGrpSpPr>
@@ -535,7 +541,9 @@
       <p:sp>
         <p:nvSpPr>
           <p:cNvPr id="8" name="Shape 8"/>
-          <p:cNvSpPr/>
+          <p:cNvSpPr>
+            <a:spLocks noGrp="1"/>
+          </p:cNvSpPr>
           <p:nvPr>
             <p:ph type="title"/>
           </p:nvPr>
@@ -566,7 +574,9 @@
       <p:sp>
         <p:nvSpPr>
           <p:cNvPr id="9" name="Shape 9"/>
-          <p:cNvSpPr/>
+          <p:cNvSpPr>
+            <a:spLocks noGrp="1"/>
+          </p:cNvSpPr>
           <p:nvPr>
             <p:ph type="body" idx="1"/>
           </p:nvPr>
@@ -632,7 +642,6 @@
               <a:rPr sz="3200"/>
               <a:t>Textebene 1</a:t>
             </a:r>
-            <a:endParaRPr sz="3200"/>
           </a:p>
           <a:p>
             <a:pPr lvl="1">
@@ -642,7 +651,6 @@
               <a:rPr sz="3200"/>
               <a:t>Textebene 2</a:t>
             </a:r>
-            <a:endParaRPr sz="3200"/>
           </a:p>
           <a:p>
             <a:pPr lvl="2">
@@ -652,7 +660,6 @@
               <a:rPr sz="3200"/>
               <a:t>Textebene 3</a:t>
             </a:r>
-            <a:endParaRPr sz="3200"/>
           </a:p>
           <a:p>
             <a:pPr lvl="3">
@@ -662,7 +669,6 @@
               <a:rPr sz="3200"/>
               <a:t>Textebene 4</a:t>
             </a:r>
-            <a:endParaRPr sz="3200"/>
           </a:p>
           <a:p>
             <a:pPr lvl="4">
@@ -680,12 +686,12 @@
   <p:clrMapOvr>
     <a:masterClrMapping/>
   </p:clrMapOvr>
-  <p:transition spd="med" advClick="1"/>
+  <p:transition spd="med"/>
 </p:sldLayout>
 </file>
 
 <file path=ppt/slideLayouts/slideLayout3.xml><?xml version="1.0" encoding="utf-8"?>
-<p:sldLayout xmlns:a="http://schemas.openxmlformats.org/drawingml/2006/main" xmlns:r="http://schemas.openxmlformats.org/officeDocument/2006/relationships" xmlns:p="http://schemas.openxmlformats.org/presentationml/2006/main" type="tx" showMasterSp="1" showMasterPhAnim="1">
+<p:sldLayout xmlns:a="http://schemas.openxmlformats.org/drawingml/2006/main" xmlns:r="http://schemas.openxmlformats.org/officeDocument/2006/relationships" xmlns:p="http://schemas.openxmlformats.org/presentationml/2006/main" type="tx">
   <p:cSld name="Titel - Mitte">
     <p:spTree>
       <p:nvGrpSpPr>
@@ -704,7 +710,9 @@
       <p:sp>
         <p:nvSpPr>
           <p:cNvPr id="11" name="Shape 11"/>
-          <p:cNvSpPr/>
+          <p:cNvSpPr>
+            <a:spLocks noGrp="1"/>
+          </p:cNvSpPr>
           <p:nvPr>
             <p:ph type="title"/>
           </p:nvPr>
@@ -737,12 +745,12 @@
   <p:clrMapOvr>
     <a:masterClrMapping/>
   </p:clrMapOvr>
-  <p:transition spd="med" advClick="1"/>
+  <p:transition spd="med"/>
 </p:sldLayout>
 </file>
 
 <file path=ppt/slideLayouts/slideLayout4.xml><?xml version="1.0" encoding="utf-8"?>
-<p:sldLayout xmlns:a="http://schemas.openxmlformats.org/drawingml/2006/main" xmlns:r="http://schemas.openxmlformats.org/officeDocument/2006/relationships" xmlns:p="http://schemas.openxmlformats.org/presentationml/2006/main" type="tx" showMasterSp="1" showMasterPhAnim="1">
+<p:sldLayout xmlns:a="http://schemas.openxmlformats.org/drawingml/2006/main" xmlns:r="http://schemas.openxmlformats.org/officeDocument/2006/relationships" xmlns:p="http://schemas.openxmlformats.org/presentationml/2006/main" type="tx">
   <p:cSld name="Foto - Vertikal">
     <p:spTree>
       <p:nvGrpSpPr>
@@ -761,7 +769,9 @@
       <p:sp>
         <p:nvSpPr>
           <p:cNvPr id="13" name="Shape 13"/>
-          <p:cNvSpPr/>
+          <p:cNvSpPr>
+            <a:spLocks noGrp="1"/>
+          </p:cNvSpPr>
           <p:nvPr>
             <p:ph type="title"/>
           </p:nvPr>
@@ -796,7 +806,9 @@
       <p:sp>
         <p:nvSpPr>
           <p:cNvPr id="14" name="Shape 14"/>
-          <p:cNvSpPr/>
+          <p:cNvSpPr>
+            <a:spLocks noGrp="1"/>
+          </p:cNvSpPr>
           <p:nvPr>
             <p:ph type="body" idx="1"/>
           </p:nvPr>
@@ -862,7 +874,6 @@
               <a:rPr sz="3200"/>
               <a:t>Textebene 1</a:t>
             </a:r>
-            <a:endParaRPr sz="3200"/>
           </a:p>
           <a:p>
             <a:pPr lvl="1">
@@ -872,7 +883,6 @@
               <a:rPr sz="3200"/>
               <a:t>Textebene 2</a:t>
             </a:r>
-            <a:endParaRPr sz="3200"/>
           </a:p>
           <a:p>
             <a:pPr lvl="2">
@@ -882,7 +892,6 @@
               <a:rPr sz="3200"/>
               <a:t>Textebene 3</a:t>
             </a:r>
-            <a:endParaRPr sz="3200"/>
           </a:p>
           <a:p>
             <a:pPr lvl="3">
@@ -892,7 +901,6 @@
               <a:rPr sz="3200"/>
               <a:t>Textebene 4</a:t>
             </a:r>
-            <a:endParaRPr sz="3200"/>
           </a:p>
           <a:p>
             <a:pPr lvl="4">
@@ -910,12 +918,12 @@
   <p:clrMapOvr>
     <a:masterClrMapping/>
   </p:clrMapOvr>
-  <p:transition spd="med" advClick="1"/>
+  <p:transition spd="med"/>
 </p:sldLayout>
 </file>
 
 <file path=ppt/slideLayouts/slideLayout5.xml><?xml version="1.0" encoding="utf-8"?>
-<p:sldLayout xmlns:a="http://schemas.openxmlformats.org/drawingml/2006/main" xmlns:r="http://schemas.openxmlformats.org/officeDocument/2006/relationships" xmlns:p="http://schemas.openxmlformats.org/presentationml/2006/main" type="tx" showMasterSp="1" showMasterPhAnim="1">
+<p:sldLayout xmlns:a="http://schemas.openxmlformats.org/drawingml/2006/main" xmlns:r="http://schemas.openxmlformats.org/officeDocument/2006/relationships" xmlns:p="http://schemas.openxmlformats.org/presentationml/2006/main" type="tx">
   <p:cSld name="Titel - Oben">
     <p:spTree>
       <p:nvGrpSpPr>
@@ -934,7 +942,9 @@
       <p:sp>
         <p:nvSpPr>
           <p:cNvPr id="16" name="Shape 16"/>
-          <p:cNvSpPr/>
+          <p:cNvSpPr>
+            <a:spLocks noGrp="1"/>
+          </p:cNvSpPr>
           <p:nvPr>
             <p:ph type="title"/>
           </p:nvPr>
@@ -963,12 +973,12 @@
   <p:clrMapOvr>
     <a:masterClrMapping/>
   </p:clrMapOvr>
-  <p:transition spd="med" advClick="1"/>
+  <p:transition spd="med"/>
 </p:sldLayout>
 </file>
 
 <file path=ppt/slideLayouts/slideLayout6.xml><?xml version="1.0" encoding="utf-8"?>
-<p:sldLayout xmlns:a="http://schemas.openxmlformats.org/drawingml/2006/main" xmlns:r="http://schemas.openxmlformats.org/officeDocument/2006/relationships" xmlns:p="http://schemas.openxmlformats.org/presentationml/2006/main" type="tx" showMasterSp="1" showMasterPhAnim="1">
+<p:sldLayout xmlns:a="http://schemas.openxmlformats.org/drawingml/2006/main" xmlns:r="http://schemas.openxmlformats.org/officeDocument/2006/relationships" xmlns:p="http://schemas.openxmlformats.org/presentationml/2006/main" type="tx">
   <p:cSld name="Titel &amp; Aufzählung">
     <p:spTree>
       <p:nvGrpSpPr>
@@ -987,7 +997,9 @@
       <p:sp>
         <p:nvSpPr>
           <p:cNvPr id="18" name="Shape 18"/>
-          <p:cNvSpPr/>
+          <p:cNvSpPr>
+            <a:spLocks noGrp="1"/>
+          </p:cNvSpPr>
           <p:nvPr>
             <p:ph type="title"/>
           </p:nvPr>
@@ -1014,7 +1026,9 @@
       <p:sp>
         <p:nvSpPr>
           <p:cNvPr id="19" name="Shape 19"/>
-          <p:cNvSpPr/>
+          <p:cNvSpPr>
+            <a:spLocks noGrp="1"/>
+          </p:cNvSpPr>
           <p:nvPr>
             <p:ph type="body" idx="1"/>
           </p:nvPr>
@@ -1035,7 +1049,6 @@
               <a:rPr sz="3600"/>
               <a:t>Textebene 1</a:t>
             </a:r>
-            <a:endParaRPr sz="3600"/>
           </a:p>
           <a:p>
             <a:pPr lvl="1">
@@ -1045,7 +1058,6 @@
               <a:rPr sz="3600"/>
               <a:t>Textebene 2</a:t>
             </a:r>
-            <a:endParaRPr sz="3600"/>
           </a:p>
           <a:p>
             <a:pPr lvl="2">
@@ -1055,7 +1067,6 @@
               <a:rPr sz="3600"/>
               <a:t>Textebene 3</a:t>
             </a:r>
-            <a:endParaRPr sz="3600"/>
           </a:p>
           <a:p>
             <a:pPr lvl="3">
@@ -1065,7 +1076,6 @@
               <a:rPr sz="3600"/>
               <a:t>Textebene 4</a:t>
             </a:r>
-            <a:endParaRPr sz="3600"/>
           </a:p>
           <a:p>
             <a:pPr lvl="4">
@@ -1083,12 +1093,12 @@
   <p:clrMapOvr>
     <a:masterClrMapping/>
   </p:clrMapOvr>
-  <p:transition spd="med" advClick="1"/>
+  <p:transition spd="med"/>
 </p:sldLayout>
 </file>
 
 <file path=ppt/slideLayouts/slideLayout7.xml><?xml version="1.0" encoding="utf-8"?>
-<p:sldLayout xmlns:a="http://schemas.openxmlformats.org/drawingml/2006/main" xmlns:r="http://schemas.openxmlformats.org/officeDocument/2006/relationships" xmlns:p="http://schemas.openxmlformats.org/presentationml/2006/main" type="tx" showMasterSp="1" showMasterPhAnim="1">
+<p:sldLayout xmlns:a="http://schemas.openxmlformats.org/drawingml/2006/main" xmlns:r="http://schemas.openxmlformats.org/officeDocument/2006/relationships" xmlns:p="http://schemas.openxmlformats.org/presentationml/2006/main" type="tx">
   <p:cSld name="Titel, Aufzählung &amp; Foto">
     <p:spTree>
       <p:nvGrpSpPr>
@@ -1107,7 +1117,9 @@
       <p:sp>
         <p:nvSpPr>
           <p:cNvPr id="21" name="Shape 21"/>
-          <p:cNvSpPr/>
+          <p:cNvSpPr>
+            <a:spLocks noGrp="1"/>
+          </p:cNvSpPr>
           <p:nvPr>
             <p:ph type="title"/>
           </p:nvPr>
@@ -1134,7 +1146,9 @@
       <p:sp>
         <p:nvSpPr>
           <p:cNvPr id="22" name="Shape 22"/>
-          <p:cNvSpPr/>
+          <p:cNvSpPr>
+            <a:spLocks noGrp="1"/>
+          </p:cNvSpPr>
           <p:nvPr>
             <p:ph type="body" idx="1"/>
           </p:nvPr>
@@ -1190,7 +1204,6 @@
               <a:rPr sz="2800"/>
               <a:t>Textebene 1</a:t>
             </a:r>
-            <a:endParaRPr sz="2800"/>
           </a:p>
           <a:p>
             <a:pPr lvl="1">
@@ -1200,7 +1213,6 @@
               <a:rPr sz="2800"/>
               <a:t>Textebene 2</a:t>
             </a:r>
-            <a:endParaRPr sz="2800"/>
           </a:p>
           <a:p>
             <a:pPr lvl="2">
@@ -1210,7 +1222,6 @@
               <a:rPr sz="2800"/>
               <a:t>Textebene 3</a:t>
             </a:r>
-            <a:endParaRPr sz="2800"/>
           </a:p>
           <a:p>
             <a:pPr lvl="3">
@@ -1220,7 +1231,6 @@
               <a:rPr sz="2800"/>
               <a:t>Textebene 4</a:t>
             </a:r>
-            <a:endParaRPr sz="2800"/>
           </a:p>
           <a:p>
             <a:pPr lvl="4">
@@ -1238,12 +1248,12 @@
   <p:clrMapOvr>
     <a:masterClrMapping/>
   </p:clrMapOvr>
-  <p:transition spd="med" advClick="1"/>
+  <p:transition spd="med"/>
 </p:sldLayout>
 </file>
 
 <file path=ppt/slideLayouts/slideLayout8.xml><?xml version="1.0" encoding="utf-8"?>
-<p:sldLayout xmlns:a="http://schemas.openxmlformats.org/drawingml/2006/main" xmlns:r="http://schemas.openxmlformats.org/officeDocument/2006/relationships" xmlns:p="http://schemas.openxmlformats.org/presentationml/2006/main" type="tx" showMasterSp="1" showMasterPhAnim="1">
+<p:sldLayout xmlns:a="http://schemas.openxmlformats.org/drawingml/2006/main" xmlns:r="http://schemas.openxmlformats.org/officeDocument/2006/relationships" xmlns:p="http://schemas.openxmlformats.org/presentationml/2006/main" type="tx">
   <p:cSld name="Punkte">
     <p:spTree>
       <p:nvGrpSpPr>
@@ -1262,7 +1272,9 @@
       <p:sp>
         <p:nvSpPr>
           <p:cNvPr id="24" name="Shape 24"/>
-          <p:cNvSpPr/>
+          <p:cNvSpPr>
+            <a:spLocks noGrp="1"/>
+          </p:cNvSpPr>
           <p:nvPr>
             <p:ph type="body" idx="1"/>
           </p:nvPr>
@@ -1287,7 +1299,6 @@
               <a:rPr sz="3600"/>
               <a:t>Textebene 1</a:t>
             </a:r>
-            <a:endParaRPr sz="3600"/>
           </a:p>
           <a:p>
             <a:pPr lvl="1">
@@ -1297,7 +1308,6 @@
               <a:rPr sz="3600"/>
               <a:t>Textebene 2</a:t>
             </a:r>
-            <a:endParaRPr sz="3600"/>
           </a:p>
           <a:p>
             <a:pPr lvl="2">
@@ -1307,7 +1317,6 @@
               <a:rPr sz="3600"/>
               <a:t>Textebene 3</a:t>
             </a:r>
-            <a:endParaRPr sz="3600"/>
           </a:p>
           <a:p>
             <a:pPr lvl="3">
@@ -1317,7 +1326,6 @@
               <a:rPr sz="3600"/>
               <a:t>Textebene 4</a:t>
             </a:r>
-            <a:endParaRPr sz="3600"/>
           </a:p>
           <a:p>
             <a:pPr lvl="4">
@@ -1335,12 +1343,12 @@
   <p:clrMapOvr>
     <a:masterClrMapping/>
   </p:clrMapOvr>
-  <p:transition spd="med" advClick="1"/>
+  <p:transition spd="med"/>
 </p:sldLayout>
 </file>
 
 <file path=ppt/slideLayouts/slideLayout9.xml><?xml version="1.0" encoding="utf-8"?>
-<p:sldLayout xmlns:a="http://schemas.openxmlformats.org/drawingml/2006/main" xmlns:r="http://schemas.openxmlformats.org/officeDocument/2006/relationships" xmlns:p="http://schemas.openxmlformats.org/presentationml/2006/main" type="tx" showMasterSp="1" showMasterPhAnim="1">
+<p:sldLayout xmlns:a="http://schemas.openxmlformats.org/drawingml/2006/main" xmlns:r="http://schemas.openxmlformats.org/officeDocument/2006/relationships" xmlns:p="http://schemas.openxmlformats.org/presentationml/2006/main" type="tx">
   <p:cSld name="Foto - 3 Stück">
     <p:spTree>
       <p:nvGrpSpPr>
@@ -1361,7 +1369,7 @@
   <p:clrMapOvr>
     <a:masterClrMapping/>
   </p:clrMapOvr>
-  <p:transition spd="med" advClick="1"/>
+  <p:transition spd="med"/>
 </p:sldLayout>
 </file>
 
@@ -1373,6 +1381,7 @@
         <a:solidFill>
           <a:srgbClr val="FFFFFF"/>
         </a:solidFill>
+        <a:effectLst/>
       </p:bgPr>
     </p:bg>
     <p:spTree>
@@ -1392,7 +1401,9 @@
       <p:sp>
         <p:nvSpPr>
           <p:cNvPr id="2" name="Shape 2"/>
-          <p:cNvSpPr/>
+          <p:cNvSpPr>
+            <a:spLocks noGrp="1"/>
+          </p:cNvSpPr>
           <p:nvPr>
             <p:ph type="title"/>
           </p:nvPr>
@@ -1410,13 +1421,13 @@
           </a:ln>
           <a:extLst>
             <a:ext uri="{C572A759-6A51-4108-AA02-DFA0A04FC94B}">
-              <ma14:wrappingTextBoxFlag xmlns:ma14="http://schemas.microsoft.com/office/mac/drawingml/2011/main" val="1"/>
+              <ma14:wrappingTextBoxFlag xmlns:ma14="http://schemas.microsoft.com/office/mac/drawingml/2011/main" xmlns="" val="1"/>
             </a:ext>
           </a:extLst>
         </p:spPr>
         <p:txBody>
           <a:bodyPr lIns="0" tIns="0" rIns="0" bIns="0" anchor="ctr">
-            <a:normAutofit fontScale="100000" lnSpcReduction="0"/>
+            <a:normAutofit/>
           </a:bodyPr>
           <a:lstStyle/>
           <a:p>
@@ -1433,7 +1444,9 @@
       <p:sp>
         <p:nvSpPr>
           <p:cNvPr id="3" name="Shape 3"/>
-          <p:cNvSpPr/>
+          <p:cNvSpPr>
+            <a:spLocks noGrp="1"/>
+          </p:cNvSpPr>
           <p:nvPr>
             <p:ph type="body" idx="1"/>
           </p:nvPr>
@@ -1451,13 +1464,13 @@
           </a:ln>
           <a:extLst>
             <a:ext uri="{C572A759-6A51-4108-AA02-DFA0A04FC94B}">
-              <ma14:wrappingTextBoxFlag xmlns:ma14="http://schemas.microsoft.com/office/mac/drawingml/2011/main" val="1"/>
+              <ma14:wrappingTextBoxFlag xmlns:ma14="http://schemas.microsoft.com/office/mac/drawingml/2011/main" xmlns="" val="1"/>
             </a:ext>
           </a:extLst>
         </p:spPr>
         <p:txBody>
           <a:bodyPr lIns="0" tIns="0" rIns="0" bIns="0" anchor="ctr">
-            <a:normAutofit fontScale="100000" lnSpcReduction="0"/>
+            <a:normAutofit/>
           </a:bodyPr>
           <a:lstStyle/>
           <a:p>
@@ -1468,7 +1481,6 @@
               <a:rPr sz="3600"/>
               <a:t>Textebene 1</a:t>
             </a:r>
-            <a:endParaRPr sz="3600"/>
           </a:p>
           <a:p>
             <a:pPr lvl="1">
@@ -1478,7 +1490,6 @@
               <a:rPr sz="3600"/>
               <a:t>Textebene 2</a:t>
             </a:r>
-            <a:endParaRPr sz="3600"/>
           </a:p>
           <a:p>
             <a:pPr lvl="2">
@@ -1488,7 +1499,6 @@
               <a:rPr sz="3600"/>
               <a:t>Textebene 3</a:t>
             </a:r>
-            <a:endParaRPr sz="3600"/>
           </a:p>
           <a:p>
             <a:pPr lvl="3">
@@ -1498,7 +1508,6 @@
               <a:rPr sz="3600"/>
               <a:t>Textebene 4</a:t>
             </a:r>
-            <a:endParaRPr sz="3600"/>
           </a:p>
           <a:p>
             <a:pPr lvl="4">
@@ -1515,20 +1524,20 @@
   </p:cSld>
   <p:clrMap bg1="lt1" tx1="dk1" bg2="lt2" tx2="dk2" accent1="accent1" accent2="accent2" accent3="accent3" accent4="accent4" accent5="accent5" accent6="accent6" hlink="hlink" folHlink="folHlink"/>
   <p:sldLayoutIdLst>
-    <p:sldLayoutId id="2147483649" r:id="rId2"/>
-    <p:sldLayoutId id="2147483650" r:id="rId3"/>
-    <p:sldLayoutId id="2147483651" r:id="rId4"/>
-    <p:sldLayoutId id="2147483652" r:id="rId5"/>
-    <p:sldLayoutId id="2147483653" r:id="rId6"/>
-    <p:sldLayoutId id="2147483654" r:id="rId7"/>
-    <p:sldLayoutId id="2147483655" r:id="rId8"/>
-    <p:sldLayoutId id="2147483656" r:id="rId9"/>
-    <p:sldLayoutId id="2147483657" r:id="rId10"/>
-    <p:sldLayoutId id="2147483658" r:id="rId11"/>
-    <p:sldLayoutId id="2147483659" r:id="rId12"/>
-    <p:sldLayoutId id="2147483660" r:id="rId13"/>
+    <p:sldLayoutId id="2147483649" r:id="rId1"/>
+    <p:sldLayoutId id="2147483650" r:id="rId2"/>
+    <p:sldLayoutId id="2147483651" r:id="rId3"/>
+    <p:sldLayoutId id="2147483652" r:id="rId4"/>
+    <p:sldLayoutId id="2147483653" r:id="rId5"/>
+    <p:sldLayoutId id="2147483654" r:id="rId6"/>
+    <p:sldLayoutId id="2147483655" r:id="rId7"/>
+    <p:sldLayoutId id="2147483656" r:id="rId8"/>
+    <p:sldLayoutId id="2147483657" r:id="rId9"/>
+    <p:sldLayoutId id="2147483658" r:id="rId10"/>
+    <p:sldLayoutId id="2147483659" r:id="rId11"/>
+    <p:sldLayoutId id="2147483660" r:id="rId12"/>
   </p:sldLayoutIdLst>
-  <p:transition spd="med" advClick="1"/>
+  <p:transition spd="med"/>
   <p:txStyles>
     <p:titleStyle>
       <a:lvl1pPr algn="ctr" defTabSz="584200">
@@ -1829,7 +1838,7 @@
 </file>
 
 <file path=ppt/slides/slide1.xml><?xml version="1.0" encoding="utf-8"?>
-<p:sld xmlns:a="http://schemas.openxmlformats.org/drawingml/2006/main" xmlns:r="http://schemas.openxmlformats.org/officeDocument/2006/relationships" xmlns:p="http://schemas.openxmlformats.org/presentationml/2006/main" showMasterSp="1" showMasterPhAnim="1">
+<p:sld xmlns:a="http://schemas.openxmlformats.org/drawingml/2006/main" xmlns:r="http://schemas.openxmlformats.org/officeDocument/2006/relationships" xmlns:p="http://schemas.openxmlformats.org/presentationml/2006/main">
   <p:cSld>
     <p:spTree>
       <p:nvGrpSpPr>
@@ -1847,26 +1856,26 @@
       </p:grpSpPr>
       <p:sp>
         <p:nvSpPr>
-          <p:cNvPr id="32" name="Shape 32"/>
+          <p:cNvPr id="22" name="Shape 40"/>
           <p:cNvSpPr/>
           <p:nvPr/>
         </p:nvSpPr>
         <p:spPr>
           <a:xfrm>
-            <a:off x="1333499" y="6883697"/>
-            <a:ext cx="9935420" cy="1485604"/>
+            <a:off x="8446616" y="6677000"/>
+            <a:ext cx="4232673" cy="1152128"/>
           </a:xfrm>
           <a:prstGeom prst="rect">
             <a:avLst/>
           </a:prstGeom>
           <a:blipFill>
-            <a:blip r:embed="rId2"/>
+            <a:blip r:embed="rId2" cstate="print"/>
           </a:blipFill>
           <a:ln w="12700">
             <a:miter lim="400000"/>
           </a:ln>
           <a:effectLst>
-            <a:outerShdw sx="100000" sy="100000" kx="0" ky="0" algn="b" rotWithShape="0" blurRad="38100" dist="25400" dir="5400000">
+            <a:outerShdw blurRad="38100" dist="25400" dir="5400000" rotWithShape="0">
               <a:srgbClr val="000000">
                 <a:alpha val="50000"/>
               </a:srgbClr>
@@ -1874,7 +1883,7 @@
           </a:effectLst>
           <a:extLst>
             <a:ext uri="{C572A759-6A51-4108-AA02-DFA0A04FC94B}">
-              <ma14:wrappingTextBoxFlag xmlns:ma14="http://schemas.microsoft.com/office/mac/drawingml/2011/main" val="1"/>
+              <ma14:wrappingTextBoxFlag xmlns:ma14="http://schemas.microsoft.com/office/mac/drawingml/2011/main" xmlns="" val="1"/>
             </a:ext>
           </a:extLst>
         </p:spPr>
@@ -1882,7 +1891,7 @@
           <a:bodyPr lIns="50800" tIns="50800" rIns="50800" bIns="50800" anchor="ctr"/>
           <a:lstStyle>
             <a:lvl1pPr>
-              <a:defRPr b="1" sz="2700">
+              <a:defRPr sz="2700" b="1">
                 <a:solidFill>
                   <a:srgbClr val="FFFFFF"/>
                 </a:solidFill>
@@ -1895,45 +1904,58 @@
           </a:lstStyle>
           <a:p>
             <a:pPr lvl="0">
-              <a:defRPr b="0" sz="1800">
+              <a:defRPr sz="1800" b="0">
                 <a:solidFill>
                   <a:srgbClr val="000000"/>
                 </a:solidFill>
               </a:defRPr>
             </a:pPr>
             <a:r>
-              <a:rPr b="1" sz="2700">
+              <a:rPr sz="2700" b="1" dirty="0" smtClean="0">
                 <a:solidFill>
                   <a:srgbClr val="FFFFFF"/>
                 </a:solidFill>
               </a:rPr>
-              <a:t>DATENBANK</a:t>
-            </a:r>
+              <a:t>DA</a:t>
+            </a:r>
+            <a:r>
+              <a:rPr lang="de-DE" sz="2700" b="1" dirty="0" smtClean="0">
+                <a:solidFill>
+                  <a:srgbClr val="FFFFFF"/>
+                </a:solidFill>
+              </a:rPr>
+              <a:t>O</a:t>
+            </a:r>
+            <a:endParaRPr sz="2700" b="1" dirty="0">
+              <a:solidFill>
+                <a:srgbClr val="FFFFFF"/>
+              </a:solidFill>
+            </a:endParaRPr>
           </a:p>
         </p:txBody>
       </p:sp>
       <p:sp>
         <p:nvSpPr>
-          <p:cNvPr id="33" name="Shape 33"/>
+          <p:cNvPr id="40" name="Shape 40"/>
           <p:cNvSpPr/>
           <p:nvPr/>
         </p:nvSpPr>
         <p:spPr>
           <a:xfrm>
-            <a:off x="1333500" y="5042197"/>
-            <a:ext cx="9935419" cy="1485603"/>
+            <a:off x="664716" y="8477200"/>
+            <a:ext cx="12009537" cy="936104"/>
           </a:xfrm>
           <a:prstGeom prst="rect">
             <a:avLst/>
           </a:prstGeom>
           <a:blipFill>
-            <a:blip r:embed="rId2"/>
+            <a:blip r:embed="rId2" cstate="print"/>
           </a:blipFill>
           <a:ln w="12700">
             <a:miter lim="400000"/>
           </a:ln>
           <a:effectLst>
-            <a:outerShdw sx="100000" sy="100000" kx="0" ky="0" algn="b" rotWithShape="0" blurRad="38100" dist="25400" dir="5400000">
+            <a:outerShdw blurRad="38100" dist="25400" dir="5400000" rotWithShape="0">
               <a:srgbClr val="000000">
                 <a:alpha val="50000"/>
               </a:srgbClr>
@@ -1941,7 +1963,7 @@
           </a:effectLst>
           <a:extLst>
             <a:ext uri="{C572A759-6A51-4108-AA02-DFA0A04FC94B}">
-              <ma14:wrappingTextBoxFlag xmlns:ma14="http://schemas.microsoft.com/office/mac/drawingml/2011/main" val="1"/>
+              <ma14:wrappingTextBoxFlag xmlns:ma14="http://schemas.microsoft.com/office/mac/drawingml/2011/main" xmlns="" val="1"/>
             </a:ext>
           </a:extLst>
         </p:spPr>
@@ -1949,7 +1971,7 @@
           <a:bodyPr lIns="50800" tIns="50800" rIns="50800" bIns="50800" anchor="ctr"/>
           <a:lstStyle>
             <a:lvl1pPr>
-              <a:defRPr b="1" sz="2700">
+              <a:defRPr sz="2700" b="1">
                 <a:solidFill>
                   <a:srgbClr val="FFFFFF"/>
                 </a:solidFill>
@@ -1962,45 +1984,45 @@
           </a:lstStyle>
           <a:p>
             <a:pPr lvl="0">
-              <a:defRPr b="0" sz="1800">
+              <a:defRPr sz="1800" b="0">
                 <a:solidFill>
                   <a:srgbClr val="000000"/>
                 </a:solidFill>
               </a:defRPr>
             </a:pPr>
             <a:r>
-              <a:rPr b="1" sz="2700">
+              <a:rPr sz="2700" b="1">
                 <a:solidFill>
                   <a:srgbClr val="FFFFFF"/>
                 </a:solidFill>
               </a:rPr>
-              <a:t>MODEL</a:t>
+              <a:t>DATENBANK</a:t>
             </a:r>
           </a:p>
         </p:txBody>
       </p:sp>
       <p:sp>
         <p:nvSpPr>
-          <p:cNvPr id="34" name="Shape 34"/>
+          <p:cNvPr id="41" name="Shape 41"/>
           <p:cNvSpPr/>
           <p:nvPr/>
         </p:nvSpPr>
         <p:spPr>
           <a:xfrm>
-            <a:off x="1333500" y="3200697"/>
-            <a:ext cx="9935419" cy="1485603"/>
+            <a:off x="8427690" y="4754165"/>
+            <a:ext cx="4250929" cy="1274763"/>
           </a:xfrm>
           <a:prstGeom prst="rect">
             <a:avLst/>
           </a:prstGeom>
           <a:blipFill>
-            <a:blip r:embed="rId2"/>
+            <a:blip r:embed="rId2" cstate="print"/>
           </a:blipFill>
           <a:ln w="12700">
             <a:miter lim="400000"/>
           </a:ln>
           <a:effectLst>
-            <a:outerShdw sx="100000" sy="100000" kx="0" ky="0" algn="b" rotWithShape="0" blurRad="38100" dist="25400" dir="5400000">
+            <a:outerShdw blurRad="38100" dist="25400" dir="5400000" rotWithShape="0">
               <a:srgbClr val="000000">
                 <a:alpha val="50000"/>
               </a:srgbClr>
@@ -2008,7 +2030,7 @@
           </a:effectLst>
           <a:extLst>
             <a:ext uri="{C572A759-6A51-4108-AA02-DFA0A04FC94B}">
-              <ma14:wrappingTextBoxFlag xmlns:ma14="http://schemas.microsoft.com/office/mac/drawingml/2011/main" val="1"/>
+              <ma14:wrappingTextBoxFlag xmlns:ma14="http://schemas.microsoft.com/office/mac/drawingml/2011/main" xmlns="" val="1"/>
             </a:ext>
           </a:extLst>
         </p:spPr>
@@ -2016,7 +2038,7 @@
           <a:bodyPr lIns="50800" tIns="50800" rIns="50800" bIns="50800" anchor="ctr"/>
           <a:lstStyle>
             <a:lvl1pPr>
-              <a:defRPr b="1" sz="2700">
+              <a:defRPr sz="2700" b="1">
                 <a:solidFill>
                   <a:srgbClr val="FFFFFF"/>
                 </a:solidFill>
@@ -2029,45 +2051,45 @@
           </a:lstStyle>
           <a:p>
             <a:pPr lvl="0">
-              <a:defRPr b="0" sz="1800">
+              <a:defRPr sz="1800" b="0">
                 <a:solidFill>
                   <a:srgbClr val="000000"/>
                 </a:solidFill>
               </a:defRPr>
             </a:pPr>
             <a:r>
-              <a:rPr b="1" sz="2700">
+              <a:rPr sz="2700" b="1">
                 <a:solidFill>
                   <a:srgbClr val="FFFFFF"/>
                 </a:solidFill>
               </a:rPr>
-              <a:t>LOGIC</a:t>
+              <a:t>MODEL</a:t>
             </a:r>
           </a:p>
         </p:txBody>
       </p:sp>
       <p:sp>
         <p:nvSpPr>
-          <p:cNvPr id="35" name="Shape 35"/>
+          <p:cNvPr id="42" name="Shape 42"/>
           <p:cNvSpPr/>
           <p:nvPr/>
         </p:nvSpPr>
         <p:spPr>
           <a:xfrm>
-            <a:off x="1333500" y="1270297"/>
-            <a:ext cx="9935419" cy="1485603"/>
+            <a:off x="8427690" y="3010197"/>
+            <a:ext cx="4250929" cy="1218531"/>
           </a:xfrm>
           <a:prstGeom prst="rect">
             <a:avLst/>
           </a:prstGeom>
           <a:blipFill>
-            <a:blip r:embed="rId2"/>
+            <a:blip r:embed="rId2" cstate="print"/>
           </a:blipFill>
           <a:ln w="12700">
             <a:miter lim="400000"/>
           </a:ln>
           <a:effectLst>
-            <a:outerShdw sx="100000" sy="100000" kx="0" ky="0" algn="b" rotWithShape="0" blurRad="38100" dist="25400" dir="5400000">
+            <a:outerShdw blurRad="38100" dist="25400" dir="5400000" rotWithShape="0">
               <a:srgbClr val="000000">
                 <a:alpha val="50000"/>
               </a:srgbClr>
@@ -2075,7 +2097,7 @@
           </a:effectLst>
           <a:extLst>
             <a:ext uri="{C572A759-6A51-4108-AA02-DFA0A04FC94B}">
-              <ma14:wrappingTextBoxFlag xmlns:ma14="http://schemas.microsoft.com/office/mac/drawingml/2011/main" val="1"/>
+              <ma14:wrappingTextBoxFlag xmlns:ma14="http://schemas.microsoft.com/office/mac/drawingml/2011/main" xmlns="" val="1"/>
             </a:ext>
           </a:extLst>
         </p:spPr>
@@ -2083,7 +2105,7 @@
           <a:bodyPr lIns="50800" tIns="50800" rIns="50800" bIns="50800" anchor="ctr"/>
           <a:lstStyle>
             <a:lvl1pPr>
-              <a:defRPr b="1" sz="2700">
+              <a:defRPr sz="2700" b="1">
                 <a:solidFill>
                   <a:srgbClr val="FFFFFF"/>
                 </a:solidFill>
@@ -2096,14 +2118,94 @@
           </a:lstStyle>
           <a:p>
             <a:pPr lvl="0">
-              <a:defRPr b="0" sz="1800">
+              <a:defRPr sz="1800" b="0">
                 <a:solidFill>
                   <a:srgbClr val="000000"/>
                 </a:solidFill>
               </a:defRPr>
             </a:pPr>
             <a:r>
-              <a:rPr b="1" sz="2700">
+              <a:rPr sz="2700" b="1" dirty="0" smtClean="0">
+                <a:solidFill>
+                  <a:srgbClr val="FFFFFF"/>
+                </a:solidFill>
+              </a:rPr>
+              <a:t>LOGI</a:t>
+            </a:r>
+            <a:r>
+              <a:rPr lang="de-DE" sz="2700" b="1" dirty="0" smtClean="0">
+                <a:solidFill>
+                  <a:srgbClr val="FFFFFF"/>
+                </a:solidFill>
+              </a:rPr>
+              <a:t>K</a:t>
+            </a:r>
+            <a:endParaRPr sz="2700" b="1" dirty="0">
+              <a:solidFill>
+                <a:srgbClr val="FFFFFF"/>
+              </a:solidFill>
+            </a:endParaRPr>
+          </a:p>
+        </p:txBody>
+      </p:sp>
+      <p:sp>
+        <p:nvSpPr>
+          <p:cNvPr id="43" name="Shape 43"/>
+          <p:cNvSpPr/>
+          <p:nvPr/>
+        </p:nvSpPr>
+        <p:spPr>
+          <a:xfrm>
+            <a:off x="8427690" y="1168697"/>
+            <a:ext cx="4250929" cy="1485603"/>
+          </a:xfrm>
+          <a:prstGeom prst="rect">
+            <a:avLst/>
+          </a:prstGeom>
+          <a:blipFill>
+            <a:blip r:embed="rId2" cstate="print"/>
+          </a:blipFill>
+          <a:ln w="12700">
+            <a:miter lim="400000"/>
+          </a:ln>
+          <a:effectLst>
+            <a:outerShdw blurRad="38100" dist="25400" dir="5400000" rotWithShape="0">
+              <a:srgbClr val="000000">
+                <a:alpha val="50000"/>
+              </a:srgbClr>
+            </a:outerShdw>
+          </a:effectLst>
+          <a:extLst>
+            <a:ext uri="{C572A759-6A51-4108-AA02-DFA0A04FC94B}">
+              <ma14:wrappingTextBoxFlag xmlns:ma14="http://schemas.microsoft.com/office/mac/drawingml/2011/main" xmlns="" val="1"/>
+            </a:ext>
+          </a:extLst>
+        </p:spPr>
+        <p:txBody>
+          <a:bodyPr lIns="50800" tIns="50800" rIns="50800" bIns="50800" anchor="ctr"/>
+          <a:lstStyle>
+            <a:lvl1pPr>
+              <a:defRPr sz="2700" b="1">
+                <a:solidFill>
+                  <a:srgbClr val="FFFFFF"/>
+                </a:solidFill>
+                <a:latin typeface="Helvetica"/>
+                <a:ea typeface="Helvetica"/>
+                <a:cs typeface="Helvetica"/>
+                <a:sym typeface="Helvetica"/>
+              </a:defRPr>
+            </a:lvl1pPr>
+          </a:lstStyle>
+          <a:p>
+            <a:pPr lvl="0">
+              <a:defRPr sz="1800" b="0">
+                <a:solidFill>
+                  <a:srgbClr val="000000"/>
+                </a:solidFill>
+              </a:defRPr>
+            </a:pPr>
+            <a:r>
+              <a:rPr sz="2700" b="1">
                 <a:solidFill>
                   <a:srgbClr val="FFFFFF"/>
                 </a:solidFill>
@@ -2115,13 +2217,13 @@
       </p:sp>
       <p:sp>
         <p:nvSpPr>
-          <p:cNvPr id="36" name="Shape 36"/>
+          <p:cNvPr id="44" name="Shape 44"/>
           <p:cNvSpPr/>
           <p:nvPr/>
         </p:nvSpPr>
         <p:spPr>
           <a:xfrm rot="16200000">
-            <a:off x="5634558" y="6336283"/>
+            <a:off x="9890199" y="5971407"/>
             <a:ext cx="1325911" cy="720874"/>
           </a:xfrm>
           <a:prstGeom prst="leftRightArrow">
@@ -2145,7 +2247,7 @@
             <a:miter lim="400000"/>
           </a:ln>
           <a:effectLst>
-            <a:outerShdw sx="100000" sy="100000" kx="0" ky="0" algn="b" rotWithShape="0" blurRad="38100" dist="25400" dir="5400000">
+            <a:outerShdw blurRad="38100" dist="25400" dir="5400000" rotWithShape="0">
               <a:srgbClr val="000000">
                 <a:alpha val="50000"/>
               </a:srgbClr>
@@ -2159,19 +2261,20 @@
             <a:pPr lvl="0">
               <a:defRPr sz="2400"/>
             </a:pPr>
+            <a:endParaRPr/>
           </a:p>
         </p:txBody>
       </p:sp>
       <p:sp>
         <p:nvSpPr>
-          <p:cNvPr id="37" name="Shape 37"/>
+          <p:cNvPr id="45" name="Shape 45"/>
           <p:cNvSpPr/>
           <p:nvPr/>
         </p:nvSpPr>
         <p:spPr>
           <a:xfrm rot="16200000">
-            <a:off x="5638254" y="2696443"/>
-            <a:ext cx="1325911" cy="720874"/>
+            <a:off x="9991750" y="2442789"/>
+            <a:ext cx="1122810" cy="720875"/>
           </a:xfrm>
           <a:prstGeom prst="leftRightArrow">
             <a:avLst>
@@ -2194,7 +2297,7 @@
             <a:miter lim="400000"/>
           </a:ln>
           <a:effectLst>
-            <a:outerShdw sx="100000" sy="100000" kx="0" ky="0" algn="b" rotWithShape="0" blurRad="38100" dist="25400" dir="5400000">
+            <a:outerShdw blurRad="38100" dist="25400" dir="5400000" rotWithShape="0">
               <a:srgbClr val="000000">
                 <a:alpha val="50000"/>
               </a:srgbClr>
@@ -2208,410 +2311,19 @@
             <a:pPr lvl="0">
               <a:defRPr sz="2400"/>
             </a:pPr>
+            <a:endParaRPr/>
           </a:p>
         </p:txBody>
       </p:sp>
       <p:sp>
         <p:nvSpPr>
-          <p:cNvPr id="38" name="Shape 38"/>
+          <p:cNvPr id="46" name="Shape 46"/>
           <p:cNvSpPr/>
           <p:nvPr/>
         </p:nvSpPr>
         <p:spPr>
           <a:xfrm rot="16200000">
-            <a:off x="5638254" y="4516363"/>
-            <a:ext cx="1325911" cy="720874"/>
-          </a:xfrm>
-          <a:prstGeom prst="leftRightArrow">
-            <a:avLst>
-              <a:gd name="adj1" fmla="val 43719"/>
-              <a:gd name="adj2" fmla="val 61352"/>
-            </a:avLst>
-          </a:prstGeom>
-          <a:gradFill>
-            <a:gsLst>
-              <a:gs pos="0">
-                <a:srgbClr val="FBFBFB"/>
-              </a:gs>
-              <a:gs pos="100000">
-                <a:srgbClr val="BEBEBE"/>
-              </a:gs>
-            </a:gsLst>
-            <a:lin ang="5400000"/>
-          </a:gradFill>
-          <a:ln w="12700">
-            <a:miter lim="400000"/>
-          </a:ln>
-          <a:effectLst>
-            <a:outerShdw sx="100000" sy="100000" kx="0" ky="0" algn="b" rotWithShape="0" blurRad="38100" dist="25400" dir="5400000">
-              <a:srgbClr val="000000">
-                <a:alpha val="50000"/>
-              </a:srgbClr>
-            </a:outerShdw>
-          </a:effectLst>
-        </p:spPr>
-        <p:txBody>
-          <a:bodyPr lIns="50800" tIns="50800" rIns="50800" bIns="50800" anchor="ctr"/>
-          <a:lstStyle/>
-          <a:p>
-            <a:pPr lvl="0">
-              <a:defRPr sz="2400"/>
-            </a:pPr>
-          </a:p>
-        </p:txBody>
-      </p:sp>
-    </p:spTree>
-  </p:cSld>
-  <p:clrMapOvr>
-    <a:masterClrMapping/>
-  </p:clrMapOvr>
-  <p:transition spd="med" advClick="1"/>
-</p:sld>
-</file>
-
-<file path=ppt/slides/slide2.xml><?xml version="1.0" encoding="utf-8"?>
-<p:sld xmlns:a="http://schemas.openxmlformats.org/drawingml/2006/main" xmlns:r="http://schemas.openxmlformats.org/officeDocument/2006/relationships" xmlns:p="http://schemas.openxmlformats.org/presentationml/2006/main" showMasterSp="1" showMasterPhAnim="1">
-  <p:cSld>
-    <p:spTree>
-      <p:nvGrpSpPr>
-        <p:cNvPr id="1" name=""/>
-        <p:cNvGrpSpPr/>
-        <p:nvPr/>
-      </p:nvGrpSpPr>
-      <p:grpSpPr>
-        <a:xfrm>
-          <a:off x="0" y="0"/>
-          <a:ext cx="0" cy="0"/>
-          <a:chOff x="0" y="0"/>
-          <a:chExt cx="0" cy="0"/>
-        </a:xfrm>
-      </p:grpSpPr>
-      <p:sp>
-        <p:nvSpPr>
-          <p:cNvPr id="40" name="Shape 40"/>
-          <p:cNvSpPr/>
-          <p:nvPr/>
-        </p:nvSpPr>
-        <p:spPr>
-          <a:xfrm>
-            <a:off x="664716" y="6883697"/>
-            <a:ext cx="12009537" cy="1485603"/>
-          </a:xfrm>
-          <a:prstGeom prst="rect">
-            <a:avLst/>
-          </a:prstGeom>
-          <a:blipFill>
-            <a:blip r:embed="rId2"/>
-          </a:blipFill>
-          <a:ln w="12700">
-            <a:miter lim="400000"/>
-          </a:ln>
-          <a:effectLst>
-            <a:outerShdw sx="100000" sy="100000" kx="0" ky="0" algn="b" rotWithShape="0" blurRad="38100" dist="25400" dir="5400000">
-              <a:srgbClr val="000000">
-                <a:alpha val="50000"/>
-              </a:srgbClr>
-            </a:outerShdw>
-          </a:effectLst>
-          <a:extLst>
-            <a:ext uri="{C572A759-6A51-4108-AA02-DFA0A04FC94B}">
-              <ma14:wrappingTextBoxFlag xmlns:ma14="http://schemas.microsoft.com/office/mac/drawingml/2011/main" val="1"/>
-            </a:ext>
-          </a:extLst>
-        </p:spPr>
-        <p:txBody>
-          <a:bodyPr lIns="50800" tIns="50800" rIns="50800" bIns="50800" anchor="ctr"/>
-          <a:lstStyle>
-            <a:lvl1pPr>
-              <a:defRPr b="1" sz="2700">
-                <a:solidFill>
-                  <a:srgbClr val="FFFFFF"/>
-                </a:solidFill>
-                <a:latin typeface="Helvetica"/>
-                <a:ea typeface="Helvetica"/>
-                <a:cs typeface="Helvetica"/>
-                <a:sym typeface="Helvetica"/>
-              </a:defRPr>
-            </a:lvl1pPr>
-          </a:lstStyle>
-          <a:p>
-            <a:pPr lvl="0">
-              <a:defRPr b="0" sz="1800">
-                <a:solidFill>
-                  <a:srgbClr val="000000"/>
-                </a:solidFill>
-              </a:defRPr>
-            </a:pPr>
-            <a:r>
-              <a:rPr b="1" sz="2700">
-                <a:solidFill>
-                  <a:srgbClr val="FFFFFF"/>
-                </a:solidFill>
-              </a:rPr>
-              <a:t>DATENBANK</a:t>
-            </a:r>
-          </a:p>
-        </p:txBody>
-      </p:sp>
-      <p:sp>
-        <p:nvSpPr>
-          <p:cNvPr id="41" name="Shape 41"/>
-          <p:cNvSpPr/>
-          <p:nvPr/>
-        </p:nvSpPr>
-        <p:spPr>
-          <a:xfrm>
-            <a:off x="8427690" y="5042197"/>
-            <a:ext cx="4250929" cy="1485603"/>
-          </a:xfrm>
-          <a:prstGeom prst="rect">
-            <a:avLst/>
-          </a:prstGeom>
-          <a:blipFill>
-            <a:blip r:embed="rId2"/>
-          </a:blipFill>
-          <a:ln w="12700">
-            <a:miter lim="400000"/>
-          </a:ln>
-          <a:effectLst>
-            <a:outerShdw sx="100000" sy="100000" kx="0" ky="0" algn="b" rotWithShape="0" blurRad="38100" dist="25400" dir="5400000">
-              <a:srgbClr val="000000">
-                <a:alpha val="50000"/>
-              </a:srgbClr>
-            </a:outerShdw>
-          </a:effectLst>
-          <a:extLst>
-            <a:ext uri="{C572A759-6A51-4108-AA02-DFA0A04FC94B}">
-              <ma14:wrappingTextBoxFlag xmlns:ma14="http://schemas.microsoft.com/office/mac/drawingml/2011/main" val="1"/>
-            </a:ext>
-          </a:extLst>
-        </p:spPr>
-        <p:txBody>
-          <a:bodyPr lIns="50800" tIns="50800" rIns="50800" bIns="50800" anchor="ctr"/>
-          <a:lstStyle>
-            <a:lvl1pPr>
-              <a:defRPr b="1" sz="2700">
-                <a:solidFill>
-                  <a:srgbClr val="FFFFFF"/>
-                </a:solidFill>
-                <a:latin typeface="Helvetica"/>
-                <a:ea typeface="Helvetica"/>
-                <a:cs typeface="Helvetica"/>
-                <a:sym typeface="Helvetica"/>
-              </a:defRPr>
-            </a:lvl1pPr>
-          </a:lstStyle>
-          <a:p>
-            <a:pPr lvl="0">
-              <a:defRPr b="0" sz="1800">
-                <a:solidFill>
-                  <a:srgbClr val="000000"/>
-                </a:solidFill>
-              </a:defRPr>
-            </a:pPr>
-            <a:r>
-              <a:rPr b="1" sz="2700">
-                <a:solidFill>
-                  <a:srgbClr val="FFFFFF"/>
-                </a:solidFill>
-              </a:rPr>
-              <a:t>MODEL</a:t>
-            </a:r>
-          </a:p>
-        </p:txBody>
-      </p:sp>
-      <p:sp>
-        <p:nvSpPr>
-          <p:cNvPr id="42" name="Shape 42"/>
-          <p:cNvSpPr/>
-          <p:nvPr/>
-        </p:nvSpPr>
-        <p:spPr>
-          <a:xfrm>
-            <a:off x="8427690" y="3010197"/>
-            <a:ext cx="4250929" cy="1485603"/>
-          </a:xfrm>
-          <a:prstGeom prst="rect">
-            <a:avLst/>
-          </a:prstGeom>
-          <a:blipFill>
-            <a:blip r:embed="rId2"/>
-          </a:blipFill>
-          <a:ln w="12700">
-            <a:miter lim="400000"/>
-          </a:ln>
-          <a:effectLst>
-            <a:outerShdw sx="100000" sy="100000" kx="0" ky="0" algn="b" rotWithShape="0" blurRad="38100" dist="25400" dir="5400000">
-              <a:srgbClr val="000000">
-                <a:alpha val="50000"/>
-              </a:srgbClr>
-            </a:outerShdw>
-          </a:effectLst>
-          <a:extLst>
-            <a:ext uri="{C572A759-6A51-4108-AA02-DFA0A04FC94B}">
-              <ma14:wrappingTextBoxFlag xmlns:ma14="http://schemas.microsoft.com/office/mac/drawingml/2011/main" val="1"/>
-            </a:ext>
-          </a:extLst>
-        </p:spPr>
-        <p:txBody>
-          <a:bodyPr lIns="50800" tIns="50800" rIns="50800" bIns="50800" anchor="ctr"/>
-          <a:lstStyle>
-            <a:lvl1pPr>
-              <a:defRPr b="1" sz="2700">
-                <a:solidFill>
-                  <a:srgbClr val="FFFFFF"/>
-                </a:solidFill>
-                <a:latin typeface="Helvetica"/>
-                <a:ea typeface="Helvetica"/>
-                <a:cs typeface="Helvetica"/>
-                <a:sym typeface="Helvetica"/>
-              </a:defRPr>
-            </a:lvl1pPr>
-          </a:lstStyle>
-          <a:p>
-            <a:pPr lvl="0">
-              <a:defRPr b="0" sz="1800">
-                <a:solidFill>
-                  <a:srgbClr val="000000"/>
-                </a:solidFill>
-              </a:defRPr>
-            </a:pPr>
-            <a:r>
-              <a:rPr b="1" sz="2700">
-                <a:solidFill>
-                  <a:srgbClr val="FFFFFF"/>
-                </a:solidFill>
-              </a:rPr>
-              <a:t>LOGIC</a:t>
-            </a:r>
-          </a:p>
-        </p:txBody>
-      </p:sp>
-      <p:sp>
-        <p:nvSpPr>
-          <p:cNvPr id="43" name="Shape 43"/>
-          <p:cNvSpPr/>
-          <p:nvPr/>
-        </p:nvSpPr>
-        <p:spPr>
-          <a:xfrm>
-            <a:off x="8427690" y="1168697"/>
-            <a:ext cx="4250929" cy="1485603"/>
-          </a:xfrm>
-          <a:prstGeom prst="rect">
-            <a:avLst/>
-          </a:prstGeom>
-          <a:blipFill>
-            <a:blip r:embed="rId2"/>
-          </a:blipFill>
-          <a:ln w="12700">
-            <a:miter lim="400000"/>
-          </a:ln>
-          <a:effectLst>
-            <a:outerShdw sx="100000" sy="100000" kx="0" ky="0" algn="b" rotWithShape="0" blurRad="38100" dist="25400" dir="5400000">
-              <a:srgbClr val="000000">
-                <a:alpha val="50000"/>
-              </a:srgbClr>
-            </a:outerShdw>
-          </a:effectLst>
-          <a:extLst>
-            <a:ext uri="{C572A759-6A51-4108-AA02-DFA0A04FC94B}">
-              <ma14:wrappingTextBoxFlag xmlns:ma14="http://schemas.microsoft.com/office/mac/drawingml/2011/main" val="1"/>
-            </a:ext>
-          </a:extLst>
-        </p:spPr>
-        <p:txBody>
-          <a:bodyPr lIns="50800" tIns="50800" rIns="50800" bIns="50800" anchor="ctr"/>
-          <a:lstStyle>
-            <a:lvl1pPr>
-              <a:defRPr b="1" sz="2700">
-                <a:solidFill>
-                  <a:srgbClr val="FFFFFF"/>
-                </a:solidFill>
-                <a:latin typeface="Helvetica"/>
-                <a:ea typeface="Helvetica"/>
-                <a:cs typeface="Helvetica"/>
-                <a:sym typeface="Helvetica"/>
-              </a:defRPr>
-            </a:lvl1pPr>
-          </a:lstStyle>
-          <a:p>
-            <a:pPr lvl="0">
-              <a:defRPr b="0" sz="1800">
-                <a:solidFill>
-                  <a:srgbClr val="000000"/>
-                </a:solidFill>
-              </a:defRPr>
-            </a:pPr>
-            <a:r>
-              <a:rPr b="1" sz="2700">
-                <a:solidFill>
-                  <a:srgbClr val="FFFFFF"/>
-                </a:solidFill>
-              </a:rPr>
-              <a:t>GUI</a:t>
-            </a:r>
-          </a:p>
-        </p:txBody>
-      </p:sp>
-      <p:sp>
-        <p:nvSpPr>
-          <p:cNvPr id="44" name="Shape 44"/>
-          <p:cNvSpPr/>
-          <p:nvPr/>
-        </p:nvSpPr>
-        <p:spPr>
-          <a:xfrm rot="16200000">
-            <a:off x="9890199" y="6450583"/>
-            <a:ext cx="1325911" cy="720874"/>
-          </a:xfrm>
-          <a:prstGeom prst="leftRightArrow">
-            <a:avLst>
-              <a:gd name="adj1" fmla="val 43719"/>
-              <a:gd name="adj2" fmla="val 61352"/>
-            </a:avLst>
-          </a:prstGeom>
-          <a:gradFill>
-            <a:gsLst>
-              <a:gs pos="0">
-                <a:srgbClr val="FBFBFB"/>
-              </a:gs>
-              <a:gs pos="100000">
-                <a:srgbClr val="BEBEBE"/>
-              </a:gs>
-            </a:gsLst>
-            <a:lin ang="5400000"/>
-          </a:gradFill>
-          <a:ln w="12700">
-            <a:miter lim="400000"/>
-          </a:ln>
-          <a:effectLst>
-            <a:outerShdw sx="100000" sy="100000" kx="0" ky="0" algn="b" rotWithShape="0" blurRad="38100" dist="25400" dir="5400000">
-              <a:srgbClr val="000000">
-                <a:alpha val="50000"/>
-              </a:srgbClr>
-            </a:outerShdw>
-          </a:effectLst>
-        </p:spPr>
-        <p:txBody>
-          <a:bodyPr lIns="50800" tIns="50800" rIns="50800" bIns="50800" anchor="ctr"/>
-          <a:lstStyle/>
-          <a:p>
-            <a:pPr lvl="0">
-              <a:defRPr sz="2400"/>
-            </a:pPr>
-          </a:p>
-        </p:txBody>
-      </p:sp>
-      <p:sp>
-        <p:nvSpPr>
-          <p:cNvPr id="45" name="Shape 45"/>
-          <p:cNvSpPr/>
-          <p:nvPr/>
-        </p:nvSpPr>
-        <p:spPr>
-          <a:xfrm rot="16200000">
-            <a:off x="9890199" y="2544340"/>
+            <a:off x="9890199" y="4171206"/>
             <a:ext cx="1325911" cy="720875"/>
           </a:xfrm>
           <a:prstGeom prst="leftRightArrow">
@@ -2635,7 +2347,7 @@
             <a:miter lim="400000"/>
           </a:ln>
           <a:effectLst>
-            <a:outerShdw sx="100000" sy="100000" kx="0" ky="0" algn="b" rotWithShape="0" blurRad="38100" dist="25400" dir="5400000">
+            <a:outerShdw blurRad="38100" dist="25400" dir="5400000" rotWithShape="0">
               <a:srgbClr val="000000">
                 <a:alpha val="50000"/>
               </a:srgbClr>
@@ -2649,19 +2361,221 @@
             <a:pPr lvl="0">
               <a:defRPr sz="2400"/>
             </a:pPr>
+            <a:endParaRPr/>
           </a:p>
         </p:txBody>
       </p:sp>
       <p:sp>
         <p:nvSpPr>
-          <p:cNvPr id="46" name="Shape 46"/>
+          <p:cNvPr id="47" name="Shape 47"/>
+          <p:cNvSpPr/>
+          <p:nvPr/>
+        </p:nvSpPr>
+        <p:spPr>
+          <a:xfrm>
+            <a:off x="706090" y="5047208"/>
+            <a:ext cx="2109044" cy="1485603"/>
+          </a:xfrm>
+          <a:prstGeom prst="rect">
+            <a:avLst/>
+          </a:prstGeom>
+          <a:blipFill>
+            <a:blip r:embed="rId2" cstate="print"/>
+          </a:blipFill>
+          <a:ln w="12700">
+            <a:miter lim="400000"/>
+          </a:ln>
+          <a:effectLst>
+            <a:outerShdw blurRad="38100" dist="25400" dir="5400000" rotWithShape="0">
+              <a:srgbClr val="000000">
+                <a:alpha val="50000"/>
+              </a:srgbClr>
+            </a:outerShdw>
+          </a:effectLst>
+          <a:extLst>
+            <a:ext uri="{C572A759-6A51-4108-AA02-DFA0A04FC94B}">
+              <ma14:wrappingTextBoxFlag xmlns:ma14="http://schemas.microsoft.com/office/mac/drawingml/2011/main" xmlns="" val="1"/>
+            </a:ext>
+          </a:extLst>
+        </p:spPr>
+        <p:txBody>
+          <a:bodyPr lIns="50800" tIns="50800" rIns="50800" bIns="50800" anchor="ctr"/>
+          <a:lstStyle>
+            <a:lvl1pPr>
+              <a:defRPr sz="2700" b="1">
+                <a:solidFill>
+                  <a:srgbClr val="FFFFFF"/>
+                </a:solidFill>
+                <a:latin typeface="Helvetica"/>
+                <a:ea typeface="Helvetica"/>
+                <a:cs typeface="Helvetica"/>
+                <a:sym typeface="Helvetica"/>
+              </a:defRPr>
+            </a:lvl1pPr>
+          </a:lstStyle>
+          <a:p>
+            <a:pPr lvl="0">
+              <a:defRPr sz="1800" b="0">
+                <a:solidFill>
+                  <a:srgbClr val="000000"/>
+                </a:solidFill>
+              </a:defRPr>
+            </a:pPr>
+            <a:r>
+              <a:rPr sz="2700" b="1">
+                <a:solidFill>
+                  <a:srgbClr val="FFFFFF"/>
+                </a:solidFill>
+              </a:rPr>
+              <a:t>LOGIN</a:t>
+            </a:r>
+          </a:p>
+        </p:txBody>
+      </p:sp>
+      <p:sp>
+        <p:nvSpPr>
+          <p:cNvPr id="48" name="Shape 48"/>
+          <p:cNvSpPr/>
+          <p:nvPr/>
+        </p:nvSpPr>
+        <p:spPr>
+          <a:xfrm>
+            <a:off x="3182590" y="5047208"/>
+            <a:ext cx="2109044" cy="1485603"/>
+          </a:xfrm>
+          <a:prstGeom prst="rect">
+            <a:avLst/>
+          </a:prstGeom>
+          <a:blipFill>
+            <a:blip r:embed="rId2" cstate="print"/>
+          </a:blipFill>
+          <a:ln w="12700">
+            <a:miter lim="400000"/>
+          </a:ln>
+          <a:effectLst>
+            <a:outerShdw blurRad="38100" dist="25400" dir="5400000" rotWithShape="0">
+              <a:srgbClr val="000000">
+                <a:alpha val="50000"/>
+              </a:srgbClr>
+            </a:outerShdw>
+          </a:effectLst>
+          <a:extLst>
+            <a:ext uri="{C572A759-6A51-4108-AA02-DFA0A04FC94B}">
+              <ma14:wrappingTextBoxFlag xmlns:ma14="http://schemas.microsoft.com/office/mac/drawingml/2011/main" xmlns="" val="1"/>
+            </a:ext>
+          </a:extLst>
+        </p:spPr>
+        <p:txBody>
+          <a:bodyPr lIns="50800" tIns="50800" rIns="50800" bIns="50800" anchor="ctr"/>
+          <a:lstStyle>
+            <a:lvl1pPr>
+              <a:defRPr sz="2700" b="1">
+                <a:solidFill>
+                  <a:srgbClr val="FFFFFF"/>
+                </a:solidFill>
+                <a:latin typeface="Helvetica"/>
+                <a:ea typeface="Helvetica"/>
+                <a:cs typeface="Helvetica"/>
+                <a:sym typeface="Helvetica"/>
+              </a:defRPr>
+            </a:lvl1pPr>
+          </a:lstStyle>
+          <a:p>
+            <a:pPr lvl="0">
+              <a:defRPr sz="1800" b="0">
+                <a:solidFill>
+                  <a:srgbClr val="000000"/>
+                </a:solidFill>
+              </a:defRPr>
+            </a:pPr>
+            <a:r>
+              <a:rPr sz="2700" b="1">
+                <a:solidFill>
+                  <a:srgbClr val="FFFFFF"/>
+                </a:solidFill>
+              </a:rPr>
+              <a:t>REGISTER</a:t>
+            </a:r>
+          </a:p>
+        </p:txBody>
+      </p:sp>
+      <p:sp>
+        <p:nvSpPr>
+          <p:cNvPr id="49" name="Shape 49"/>
+          <p:cNvSpPr/>
+          <p:nvPr/>
+        </p:nvSpPr>
+        <p:spPr>
+          <a:xfrm>
+            <a:off x="5805140" y="5047208"/>
+            <a:ext cx="2109044" cy="1485603"/>
+          </a:xfrm>
+          <a:prstGeom prst="rect">
+            <a:avLst/>
+          </a:prstGeom>
+          <a:blipFill>
+            <a:blip r:embed="rId2" cstate="print"/>
+          </a:blipFill>
+          <a:ln w="12700">
+            <a:miter lim="400000"/>
+          </a:ln>
+          <a:effectLst>
+            <a:outerShdw blurRad="38100" dist="25400" dir="5400000" rotWithShape="0">
+              <a:srgbClr val="000000">
+                <a:alpha val="50000"/>
+              </a:srgbClr>
+            </a:outerShdw>
+          </a:effectLst>
+          <a:extLst>
+            <a:ext uri="{C572A759-6A51-4108-AA02-DFA0A04FC94B}">
+              <ma14:wrappingTextBoxFlag xmlns:ma14="http://schemas.microsoft.com/office/mac/drawingml/2011/main" xmlns="" val="1"/>
+            </a:ext>
+          </a:extLst>
+        </p:spPr>
+        <p:txBody>
+          <a:bodyPr lIns="50800" tIns="50800" rIns="50800" bIns="50800" anchor="ctr"/>
+          <a:lstStyle>
+            <a:lvl1pPr>
+              <a:defRPr sz="2700" b="1">
+                <a:solidFill>
+                  <a:srgbClr val="FFFFFF"/>
+                </a:solidFill>
+                <a:latin typeface="Helvetica"/>
+                <a:ea typeface="Helvetica"/>
+                <a:cs typeface="Helvetica"/>
+                <a:sym typeface="Helvetica"/>
+              </a:defRPr>
+            </a:lvl1pPr>
+          </a:lstStyle>
+          <a:p>
+            <a:pPr lvl="0">
+              <a:defRPr sz="1800" b="0">
+                <a:solidFill>
+                  <a:srgbClr val="000000"/>
+                </a:solidFill>
+              </a:defRPr>
+            </a:pPr>
+            <a:r>
+              <a:rPr sz="2700" b="1">
+                <a:solidFill>
+                  <a:srgbClr val="FFFFFF"/>
+                </a:solidFill>
+              </a:rPr>
+              <a:t>STATISTIK</a:t>
+            </a:r>
+          </a:p>
+        </p:txBody>
+      </p:sp>
+      <p:sp>
+        <p:nvSpPr>
+          <p:cNvPr id="50" name="Shape 50"/>
           <p:cNvSpPr/>
           <p:nvPr/>
         </p:nvSpPr>
         <p:spPr>
           <a:xfrm rot="16200000">
-            <a:off x="9890199" y="4408561"/>
-            <a:ext cx="1325911" cy="720875"/>
+            <a:off x="5591781" y="7060209"/>
+            <a:ext cx="2545163" cy="720874"/>
           </a:xfrm>
           <a:prstGeom prst="leftRightArrow">
             <a:avLst>
@@ -2684,7 +2598,7 @@
             <a:miter lim="400000"/>
           </a:ln>
           <a:effectLst>
-            <a:outerShdw sx="100000" sy="100000" kx="0" ky="0" algn="b" rotWithShape="0" blurRad="38100" dist="25400" dir="5400000">
+            <a:outerShdw blurRad="38100" dist="25400" dir="5400000" rotWithShape="0">
               <a:srgbClr val="000000">
                 <a:alpha val="50000"/>
               </a:srgbClr>
@@ -2698,220 +2612,20 @@
             <a:pPr lvl="0">
               <a:defRPr sz="2400"/>
             </a:pPr>
+            <a:endParaRPr/>
           </a:p>
         </p:txBody>
       </p:sp>
       <p:sp>
         <p:nvSpPr>
-          <p:cNvPr id="47" name="Shape 47"/>
-          <p:cNvSpPr/>
-          <p:nvPr/>
-        </p:nvSpPr>
-        <p:spPr>
-          <a:xfrm>
-            <a:off x="706090" y="5047208"/>
-            <a:ext cx="2109044" cy="1485603"/>
-          </a:xfrm>
-          <a:prstGeom prst="rect">
-            <a:avLst/>
-          </a:prstGeom>
-          <a:blipFill>
-            <a:blip r:embed="rId2"/>
-          </a:blipFill>
-          <a:ln w="12700">
-            <a:miter lim="400000"/>
-          </a:ln>
-          <a:effectLst>
-            <a:outerShdw sx="100000" sy="100000" kx="0" ky="0" algn="b" rotWithShape="0" blurRad="38100" dist="25400" dir="5400000">
-              <a:srgbClr val="000000">
-                <a:alpha val="50000"/>
-              </a:srgbClr>
-            </a:outerShdw>
-          </a:effectLst>
-          <a:extLst>
-            <a:ext uri="{C572A759-6A51-4108-AA02-DFA0A04FC94B}">
-              <ma14:wrappingTextBoxFlag xmlns:ma14="http://schemas.microsoft.com/office/mac/drawingml/2011/main" val="1"/>
-            </a:ext>
-          </a:extLst>
-        </p:spPr>
-        <p:txBody>
-          <a:bodyPr lIns="50800" tIns="50800" rIns="50800" bIns="50800" anchor="ctr"/>
-          <a:lstStyle>
-            <a:lvl1pPr>
-              <a:defRPr b="1" sz="2700">
-                <a:solidFill>
-                  <a:srgbClr val="FFFFFF"/>
-                </a:solidFill>
-                <a:latin typeface="Helvetica"/>
-                <a:ea typeface="Helvetica"/>
-                <a:cs typeface="Helvetica"/>
-                <a:sym typeface="Helvetica"/>
-              </a:defRPr>
-            </a:lvl1pPr>
-          </a:lstStyle>
-          <a:p>
-            <a:pPr lvl="0">
-              <a:defRPr b="0" sz="1800">
-                <a:solidFill>
-                  <a:srgbClr val="000000"/>
-                </a:solidFill>
-              </a:defRPr>
-            </a:pPr>
-            <a:r>
-              <a:rPr b="1" sz="2700">
-                <a:solidFill>
-                  <a:srgbClr val="FFFFFF"/>
-                </a:solidFill>
-              </a:rPr>
-              <a:t>LOGIN</a:t>
-            </a:r>
-          </a:p>
-        </p:txBody>
-      </p:sp>
-      <p:sp>
-        <p:nvSpPr>
-          <p:cNvPr id="48" name="Shape 48"/>
-          <p:cNvSpPr/>
-          <p:nvPr/>
-        </p:nvSpPr>
-        <p:spPr>
-          <a:xfrm>
-            <a:off x="3182590" y="5047208"/>
-            <a:ext cx="2109044" cy="1485603"/>
-          </a:xfrm>
-          <a:prstGeom prst="rect">
-            <a:avLst/>
-          </a:prstGeom>
-          <a:blipFill>
-            <a:blip r:embed="rId2"/>
-          </a:blipFill>
-          <a:ln w="12700">
-            <a:miter lim="400000"/>
-          </a:ln>
-          <a:effectLst>
-            <a:outerShdw sx="100000" sy="100000" kx="0" ky="0" algn="b" rotWithShape="0" blurRad="38100" dist="25400" dir="5400000">
-              <a:srgbClr val="000000">
-                <a:alpha val="50000"/>
-              </a:srgbClr>
-            </a:outerShdw>
-          </a:effectLst>
-          <a:extLst>
-            <a:ext uri="{C572A759-6A51-4108-AA02-DFA0A04FC94B}">
-              <ma14:wrappingTextBoxFlag xmlns:ma14="http://schemas.microsoft.com/office/mac/drawingml/2011/main" val="1"/>
-            </a:ext>
-          </a:extLst>
-        </p:spPr>
-        <p:txBody>
-          <a:bodyPr lIns="50800" tIns="50800" rIns="50800" bIns="50800" anchor="ctr"/>
-          <a:lstStyle>
-            <a:lvl1pPr>
-              <a:defRPr b="1" sz="2700">
-                <a:solidFill>
-                  <a:srgbClr val="FFFFFF"/>
-                </a:solidFill>
-                <a:latin typeface="Helvetica"/>
-                <a:ea typeface="Helvetica"/>
-                <a:cs typeface="Helvetica"/>
-                <a:sym typeface="Helvetica"/>
-              </a:defRPr>
-            </a:lvl1pPr>
-          </a:lstStyle>
-          <a:p>
-            <a:pPr lvl="0">
-              <a:defRPr b="0" sz="1800">
-                <a:solidFill>
-                  <a:srgbClr val="000000"/>
-                </a:solidFill>
-              </a:defRPr>
-            </a:pPr>
-            <a:r>
-              <a:rPr b="1" sz="2700">
-                <a:solidFill>
-                  <a:srgbClr val="FFFFFF"/>
-                </a:solidFill>
-              </a:rPr>
-              <a:t>REGISTER</a:t>
-            </a:r>
-          </a:p>
-        </p:txBody>
-      </p:sp>
-      <p:sp>
-        <p:nvSpPr>
-          <p:cNvPr id="49" name="Shape 49"/>
-          <p:cNvSpPr/>
-          <p:nvPr/>
-        </p:nvSpPr>
-        <p:spPr>
-          <a:xfrm>
-            <a:off x="5805140" y="5047208"/>
-            <a:ext cx="2109044" cy="1485603"/>
-          </a:xfrm>
-          <a:prstGeom prst="rect">
-            <a:avLst/>
-          </a:prstGeom>
-          <a:blipFill>
-            <a:blip r:embed="rId2"/>
-          </a:blipFill>
-          <a:ln w="12700">
-            <a:miter lim="400000"/>
-          </a:ln>
-          <a:effectLst>
-            <a:outerShdw sx="100000" sy="100000" kx="0" ky="0" algn="b" rotWithShape="0" blurRad="38100" dist="25400" dir="5400000">
-              <a:srgbClr val="000000">
-                <a:alpha val="50000"/>
-              </a:srgbClr>
-            </a:outerShdw>
-          </a:effectLst>
-          <a:extLst>
-            <a:ext uri="{C572A759-6A51-4108-AA02-DFA0A04FC94B}">
-              <ma14:wrappingTextBoxFlag xmlns:ma14="http://schemas.microsoft.com/office/mac/drawingml/2011/main" val="1"/>
-            </a:ext>
-          </a:extLst>
-        </p:spPr>
-        <p:txBody>
-          <a:bodyPr lIns="50800" tIns="50800" rIns="50800" bIns="50800" anchor="ctr"/>
-          <a:lstStyle>
-            <a:lvl1pPr>
-              <a:defRPr b="1" sz="2700">
-                <a:solidFill>
-                  <a:srgbClr val="FFFFFF"/>
-                </a:solidFill>
-                <a:latin typeface="Helvetica"/>
-                <a:ea typeface="Helvetica"/>
-                <a:cs typeface="Helvetica"/>
-                <a:sym typeface="Helvetica"/>
-              </a:defRPr>
-            </a:lvl1pPr>
-          </a:lstStyle>
-          <a:p>
-            <a:pPr lvl="0">
-              <a:defRPr b="0" sz="1800">
-                <a:solidFill>
-                  <a:srgbClr val="000000"/>
-                </a:solidFill>
-              </a:defRPr>
-            </a:pPr>
-            <a:r>
-              <a:rPr b="1" sz="2700">
-                <a:solidFill>
-                  <a:srgbClr val="FFFFFF"/>
-                </a:solidFill>
-              </a:rPr>
-              <a:t>STATISTIK</a:t>
-            </a:r>
-          </a:p>
-        </p:txBody>
-      </p:sp>
-      <p:sp>
-        <p:nvSpPr>
-          <p:cNvPr id="50" name="Shape 50"/>
+          <p:cNvPr id="51" name="Shape 51"/>
           <p:cNvSpPr/>
           <p:nvPr/>
         </p:nvSpPr>
         <p:spPr>
           <a:xfrm rot="16200000">
-            <a:off x="6201407" y="6450583"/>
-            <a:ext cx="1325911" cy="720874"/>
+            <a:off x="3037557" y="7060207"/>
+            <a:ext cx="2545159" cy="720874"/>
           </a:xfrm>
           <a:prstGeom prst="leftRightArrow">
             <a:avLst>
@@ -2934,7 +2648,7 @@
             <a:miter lim="400000"/>
           </a:ln>
           <a:effectLst>
-            <a:outerShdw sx="100000" sy="100000" kx="0" ky="0" algn="b" rotWithShape="0" blurRad="38100" dist="25400" dir="5400000">
+            <a:outerShdw blurRad="38100" dist="25400" dir="5400000" rotWithShape="0">
               <a:srgbClr val="000000">
                 <a:alpha val="50000"/>
               </a:srgbClr>
@@ -2948,19 +2662,20 @@
             <a:pPr lvl="0">
               <a:defRPr sz="2400"/>
             </a:pPr>
+            <a:endParaRPr/>
           </a:p>
         </p:txBody>
       </p:sp>
       <p:sp>
         <p:nvSpPr>
-          <p:cNvPr id="51" name="Shape 51"/>
+          <p:cNvPr id="52" name="Shape 52"/>
           <p:cNvSpPr/>
           <p:nvPr/>
         </p:nvSpPr>
         <p:spPr>
           <a:xfrm rot="16200000">
-            <a:off x="3647182" y="6450583"/>
-            <a:ext cx="1325910" cy="720874"/>
+            <a:off x="483331" y="7060208"/>
+            <a:ext cx="2545161" cy="720874"/>
           </a:xfrm>
           <a:prstGeom prst="leftRightArrow">
             <a:avLst>
@@ -2983,7 +2698,7 @@
             <a:miter lim="400000"/>
           </a:ln>
           <a:effectLst>
-            <a:outerShdw sx="100000" sy="100000" kx="0" ky="0" algn="b" rotWithShape="0" blurRad="38100" dist="25400" dir="5400000">
+            <a:outerShdw blurRad="38100" dist="25400" dir="5400000" rotWithShape="0">
               <a:srgbClr val="000000">
                 <a:alpha val="50000"/>
               </a:srgbClr>
@@ -2997,19 +2712,87 @@
             <a:pPr lvl="0">
               <a:defRPr sz="2400"/>
             </a:pPr>
+            <a:endParaRPr/>
           </a:p>
         </p:txBody>
       </p:sp>
       <p:sp>
         <p:nvSpPr>
-          <p:cNvPr id="52" name="Shape 52"/>
+          <p:cNvPr id="53" name="Shape 53"/>
           <p:cNvSpPr/>
           <p:nvPr/>
         </p:nvSpPr>
         <p:spPr>
-          <a:xfrm rot="16200000">
-            <a:off x="1092956" y="6450583"/>
-            <a:ext cx="1325911" cy="720874"/>
+          <a:xfrm>
+            <a:off x="756220" y="2705397"/>
+            <a:ext cx="7107834" cy="1485604"/>
+          </a:xfrm>
+          <a:prstGeom prst="rect">
+            <a:avLst/>
+          </a:prstGeom>
+          <a:blipFill>
+            <a:blip r:embed="rId2" cstate="print"/>
+          </a:blipFill>
+          <a:ln w="12700">
+            <a:miter lim="400000"/>
+          </a:ln>
+          <a:effectLst>
+            <a:outerShdw blurRad="38100" dist="25400" dir="5400000" rotWithShape="0">
+              <a:srgbClr val="000000">
+                <a:alpha val="50000"/>
+              </a:srgbClr>
+            </a:outerShdw>
+          </a:effectLst>
+          <a:extLst>
+            <a:ext uri="{C572A759-6A51-4108-AA02-DFA0A04FC94B}">
+              <ma14:wrappingTextBoxFlag xmlns:ma14="http://schemas.microsoft.com/office/mac/drawingml/2011/main" xmlns="" val="1"/>
+            </a:ext>
+          </a:extLst>
+        </p:spPr>
+        <p:txBody>
+          <a:bodyPr lIns="50800" tIns="50800" rIns="50800" bIns="50800" anchor="ctr"/>
+          <a:lstStyle>
+            <a:lvl1pPr>
+              <a:defRPr sz="2700" b="1">
+                <a:solidFill>
+                  <a:srgbClr val="FFFFFF"/>
+                </a:solidFill>
+                <a:latin typeface="Helvetica"/>
+                <a:ea typeface="Helvetica"/>
+                <a:cs typeface="Helvetica"/>
+                <a:sym typeface="Helvetica"/>
+              </a:defRPr>
+            </a:lvl1pPr>
+          </a:lstStyle>
+          <a:p>
+            <a:pPr lvl="0">
+              <a:defRPr sz="1800" b="0">
+                <a:solidFill>
+                  <a:srgbClr val="000000"/>
+                </a:solidFill>
+              </a:defRPr>
+            </a:pPr>
+            <a:r>
+              <a:rPr sz="2700" b="1">
+                <a:solidFill>
+                  <a:srgbClr val="FFFFFF"/>
+                </a:solidFill>
+              </a:rPr>
+              <a:t>GUI</a:t>
+            </a:r>
+          </a:p>
+        </p:txBody>
+      </p:sp>
+      <p:sp>
+        <p:nvSpPr>
+          <p:cNvPr id="54" name="Shape 54"/>
+          <p:cNvSpPr/>
+          <p:nvPr/>
+        </p:nvSpPr>
+        <p:spPr>
+          <a:xfrm rot="18900000">
+            <a:off x="7316376" y="2021325"/>
+            <a:ext cx="1590885" cy="720875"/>
           </a:xfrm>
           <a:prstGeom prst="leftRightArrow">
             <a:avLst>
@@ -3032,7 +2815,7 @@
             <a:miter lim="400000"/>
           </a:ln>
           <a:effectLst>
-            <a:outerShdw sx="100000" sy="100000" kx="0" ky="0" algn="b" rotWithShape="0" blurRad="38100" dist="25400" dir="5400000">
+            <a:outerShdw blurRad="38100" dist="25400" dir="5400000" rotWithShape="0">
               <a:srgbClr val="000000">
                 <a:alpha val="50000"/>
               </a:srgbClr>
@@ -3046,122 +2829,7 @@
             <a:pPr lvl="0">
               <a:defRPr sz="2400"/>
             </a:pPr>
-          </a:p>
-        </p:txBody>
-      </p:sp>
-      <p:sp>
-        <p:nvSpPr>
-          <p:cNvPr id="53" name="Shape 53"/>
-          <p:cNvSpPr/>
-          <p:nvPr/>
-        </p:nvSpPr>
-        <p:spPr>
-          <a:xfrm>
-            <a:off x="756220" y="2705397"/>
-            <a:ext cx="7107834" cy="1485604"/>
-          </a:xfrm>
-          <a:prstGeom prst="rect">
-            <a:avLst/>
-          </a:prstGeom>
-          <a:blipFill>
-            <a:blip r:embed="rId2"/>
-          </a:blipFill>
-          <a:ln w="12700">
-            <a:miter lim="400000"/>
-          </a:ln>
-          <a:effectLst>
-            <a:outerShdw sx="100000" sy="100000" kx="0" ky="0" algn="b" rotWithShape="0" blurRad="38100" dist="25400" dir="5400000">
-              <a:srgbClr val="000000">
-                <a:alpha val="50000"/>
-              </a:srgbClr>
-            </a:outerShdw>
-          </a:effectLst>
-          <a:extLst>
-            <a:ext uri="{C572A759-6A51-4108-AA02-DFA0A04FC94B}">
-              <ma14:wrappingTextBoxFlag xmlns:ma14="http://schemas.microsoft.com/office/mac/drawingml/2011/main" val="1"/>
-            </a:ext>
-          </a:extLst>
-        </p:spPr>
-        <p:txBody>
-          <a:bodyPr lIns="50800" tIns="50800" rIns="50800" bIns="50800" anchor="ctr"/>
-          <a:lstStyle>
-            <a:lvl1pPr>
-              <a:defRPr b="1" sz="2700">
-                <a:solidFill>
-                  <a:srgbClr val="FFFFFF"/>
-                </a:solidFill>
-                <a:latin typeface="Helvetica"/>
-                <a:ea typeface="Helvetica"/>
-                <a:cs typeface="Helvetica"/>
-                <a:sym typeface="Helvetica"/>
-              </a:defRPr>
-            </a:lvl1pPr>
-          </a:lstStyle>
-          <a:p>
-            <a:pPr lvl="0">
-              <a:defRPr b="0" sz="1800">
-                <a:solidFill>
-                  <a:srgbClr val="000000"/>
-                </a:solidFill>
-              </a:defRPr>
-            </a:pPr>
-            <a:r>
-              <a:rPr b="1" sz="2700">
-                <a:solidFill>
-                  <a:srgbClr val="FFFFFF"/>
-                </a:solidFill>
-              </a:rPr>
-              <a:t>GUI</a:t>
-            </a:r>
-          </a:p>
-        </p:txBody>
-      </p:sp>
-      <p:sp>
-        <p:nvSpPr>
-          <p:cNvPr id="54" name="Shape 54"/>
-          <p:cNvSpPr/>
-          <p:nvPr/>
-        </p:nvSpPr>
-        <p:spPr>
-          <a:xfrm rot="18900000">
-            <a:off x="7451799" y="2328440"/>
-            <a:ext cx="1325911" cy="720875"/>
-          </a:xfrm>
-          <a:prstGeom prst="leftRightArrow">
-            <a:avLst>
-              <a:gd name="adj1" fmla="val 43719"/>
-              <a:gd name="adj2" fmla="val 61352"/>
-            </a:avLst>
-          </a:prstGeom>
-          <a:gradFill>
-            <a:gsLst>
-              <a:gs pos="0">
-                <a:srgbClr val="FBFBFB"/>
-              </a:gs>
-              <a:gs pos="100000">
-                <a:srgbClr val="BEBEBE"/>
-              </a:gs>
-            </a:gsLst>
-            <a:lin ang="5400000"/>
-          </a:gradFill>
-          <a:ln w="12700">
-            <a:miter lim="400000"/>
-          </a:ln>
-          <a:effectLst>
-            <a:outerShdw sx="100000" sy="100000" kx="0" ky="0" algn="b" rotWithShape="0" blurRad="38100" dist="25400" dir="5400000">
-              <a:srgbClr val="000000">
-                <a:alpha val="50000"/>
-              </a:srgbClr>
-            </a:outerShdw>
-          </a:effectLst>
-        </p:spPr>
-        <p:txBody>
-          <a:bodyPr lIns="50800" tIns="50800" rIns="50800" bIns="50800" anchor="ctr"/>
-          <a:lstStyle/>
-          <a:p>
-            <a:pPr lvl="0">
-              <a:defRPr sz="2400"/>
-            </a:pPr>
+            <a:endParaRPr/>
           </a:p>
         </p:txBody>
       </p:sp>
@@ -3197,7 +2865,7 @@
             <a:miter lim="400000"/>
           </a:ln>
           <a:effectLst>
-            <a:outerShdw sx="100000" sy="100000" kx="0" ky="0" algn="b" rotWithShape="0" blurRad="38100" dist="25400" dir="5400000">
+            <a:outerShdw blurRad="38100" dist="25400" dir="5400000" rotWithShape="0">
               <a:srgbClr val="000000">
                 <a:alpha val="50000"/>
               </a:srgbClr>
@@ -3211,6 +2879,7 @@
             <a:pPr lvl="0">
               <a:defRPr sz="2400"/>
             </a:pPr>
+            <a:endParaRPr/>
           </a:p>
         </p:txBody>
       </p:sp>
@@ -3246,7 +2915,7 @@
             <a:miter lim="400000"/>
           </a:ln>
           <a:effectLst>
-            <a:outerShdw sx="100000" sy="100000" kx="0" ky="0" algn="b" rotWithShape="0" blurRad="38100" dist="25400" dir="5400000">
+            <a:outerShdw blurRad="38100" dist="25400" dir="5400000" rotWithShape="0">
               <a:srgbClr val="000000">
                 <a:alpha val="50000"/>
               </a:srgbClr>
@@ -3260,6 +2929,7 @@
             <a:pPr lvl="0">
               <a:defRPr sz="2400"/>
             </a:pPr>
+            <a:endParaRPr/>
           </a:p>
         </p:txBody>
       </p:sp>
@@ -3295,7 +2965,7 @@
             <a:miter lim="400000"/>
           </a:ln>
           <a:effectLst>
-            <a:outerShdw sx="100000" sy="100000" kx="0" ky="0" algn="b" rotWithShape="0" blurRad="38100" dist="25400" dir="5400000">
+            <a:outerShdw blurRad="38100" dist="25400" dir="5400000" rotWithShape="0">
               <a:srgbClr val="000000">
                 <a:alpha val="50000"/>
               </a:srgbClr>
@@ -3309,6 +2979,7 @@
             <a:pPr lvl="0">
               <a:defRPr sz="2400"/>
             </a:pPr>
+            <a:endParaRPr/>
           </a:p>
         </p:txBody>
       </p:sp>
@@ -3331,7 +3002,7 @@
           </a:ln>
           <a:extLst>
             <a:ext uri="{C572A759-6A51-4108-AA02-DFA0A04FC94B}">
-              <ma14:wrappingTextBoxFlag xmlns:ma14="http://schemas.microsoft.com/office/mac/drawingml/2011/main" val="1"/>
+              <ma14:wrappingTextBoxFlag xmlns:ma14="http://schemas.microsoft.com/office/mac/drawingml/2011/main" xmlns="" val="1"/>
             </a:ext>
           </a:extLst>
         </p:spPr>
@@ -3370,7 +3041,7 @@
           </a:ln>
           <a:extLst>
             <a:ext uri="{C572A759-6A51-4108-AA02-DFA0A04FC94B}">
-              <ma14:wrappingTextBoxFlag xmlns:ma14="http://schemas.microsoft.com/office/mac/drawingml/2011/main" val="1"/>
+              <ma14:wrappingTextBoxFlag xmlns:ma14="http://schemas.microsoft.com/office/mac/drawingml/2011/main" xmlns="" val="1"/>
             </a:ext>
           </a:extLst>
         </p:spPr>
@@ -3390,17 +3061,67 @@
           </a:p>
         </p:txBody>
       </p:sp>
+      <p:sp>
+        <p:nvSpPr>
+          <p:cNvPr id="23" name="Shape 44"/>
+          <p:cNvSpPr/>
+          <p:nvPr/>
+        </p:nvSpPr>
+        <p:spPr>
+          <a:xfrm rot="16200000">
+            <a:off x="9851169" y="7792727"/>
+            <a:ext cx="1368152" cy="720874"/>
+          </a:xfrm>
+          <a:prstGeom prst="leftRightArrow">
+            <a:avLst>
+              <a:gd name="adj1" fmla="val 43719"/>
+              <a:gd name="adj2" fmla="val 61352"/>
+            </a:avLst>
+          </a:prstGeom>
+          <a:gradFill>
+            <a:gsLst>
+              <a:gs pos="0">
+                <a:srgbClr val="FBFBFB"/>
+              </a:gs>
+              <a:gs pos="100000">
+                <a:srgbClr val="BEBEBE"/>
+              </a:gs>
+            </a:gsLst>
+            <a:lin ang="5400000"/>
+          </a:gradFill>
+          <a:ln w="12700">
+            <a:miter lim="400000"/>
+          </a:ln>
+          <a:effectLst>
+            <a:outerShdw blurRad="38100" dist="25400" dir="5400000" rotWithShape="0">
+              <a:srgbClr val="000000">
+                <a:alpha val="50000"/>
+              </a:srgbClr>
+            </a:outerShdw>
+          </a:effectLst>
+        </p:spPr>
+        <p:txBody>
+          <a:bodyPr lIns="50800" tIns="50800" rIns="50800" bIns="50800" anchor="ctr"/>
+          <a:lstStyle/>
+          <a:p>
+            <a:pPr lvl="0">
+              <a:defRPr sz="2400"/>
+            </a:pPr>
+            <a:endParaRPr/>
+          </a:p>
+        </p:txBody>
+      </p:sp>
     </p:spTree>
   </p:cSld>
   <p:clrMapOvr>
     <a:masterClrMapping/>
   </p:clrMapOvr>
-  <p:transition spd="med" advClick="1"/>
+  <p:transition spd="med"/>
 </p:sld>
 </file>
 
 <file path=ppt/theme/theme1.xml><?xml version="1.0" encoding="utf-8"?>
-<a:theme xmlns:a="http://schemas.openxmlformats.org/drawingml/2006/main" xmlns:r="http://schemas.openxmlformats.org/officeDocument/2006/relationships" name="White">
+<a:theme xmlns:a="http://schemas.openxmlformats.org/drawingml/2006/main" name="White">
   <a:themeElements>
     <a:clrScheme name="White">
       <a:dk1>
@@ -3526,7 +3247,7 @@
       <a:effectStyleLst>
         <a:effectStyle>
           <a:effectLst>
-            <a:outerShdw sx="100000" sy="100000" kx="0" ky="0" algn="b" rotWithShape="0" blurRad="38100" dist="25400" dir="5400000">
+            <a:outerShdw blurRad="38100" dist="25400" dir="5400000" rotWithShape="0">
               <a:srgbClr val="000000">
                 <a:alpha val="50000"/>
               </a:srgbClr>
@@ -3535,7 +3256,7 @@
         </a:effectStyle>
         <a:effectStyle>
           <a:effectLst>
-            <a:outerShdw sx="100000" sy="100000" kx="0" ky="0" algn="b" rotWithShape="0" blurRad="50800" dist="12700" dir="0">
+            <a:outerShdw blurRad="50800" dist="12700" rotWithShape="0">
               <a:srgbClr val="000000">
                 <a:alpha val="50000"/>
               </a:srgbClr>
@@ -3544,7 +3265,7 @@
         </a:effectStyle>
         <a:effectStyle>
           <a:effectLst>
-            <a:outerShdw sx="100000" sy="100000" kx="0" ky="0" algn="b" rotWithShape="0" blurRad="38100" dist="25400" dir="5400000">
+            <a:outerShdw blurRad="38100" dist="25400" dir="5400000" rotWithShape="0">
               <a:srgbClr val="000000">
                 <a:alpha val="50000"/>
               </a:srgbClr>
@@ -3608,8 +3329,8 @@
     <a:spDef>
       <a:spPr>
         <a:blipFill rotWithShape="1">
-          <a:blip r:embed="rId1"/>
-          <a:srcRect l="0" t="0" r="0" b="0"/>
+          <a:blip xmlns:r="http://schemas.openxmlformats.org/officeDocument/2006/relationships" r:embed="rId1"/>
+          <a:srcRect/>
           <a:tile tx="0" ty="0" sx="100000" sy="100000" flip="none" algn="tl"/>
         </a:blipFill>
         <a:ln w="12700" cap="flat">
@@ -3617,14 +3338,14 @@
           <a:miter lim="400000"/>
         </a:ln>
         <a:effectLst>
-          <a:outerShdw sx="100000" sy="100000" kx="0" ky="0" algn="b" rotWithShape="0" blurRad="38100" dist="25400" dir="5400000">
+          <a:outerShdw blurRad="38100" dist="25400" dir="5400000" rotWithShape="0">
             <a:srgbClr val="000000">
               <a:alpha val="50000"/>
             </a:srgbClr>
           </a:outerShdw>
         </a:effectLst>
       </a:spPr>
-      <a:bodyPr rot="0" spcFirstLastPara="1" vertOverflow="overflow" horzOverflow="overflow" vert="horz" wrap="square" lIns="50800" tIns="50800" rIns="50800" bIns="50800" numCol="1" spcCol="38100" rtlCol="0" anchor="ctr" upright="0">
+      <a:bodyPr rot="0" spcFirstLastPara="1" vertOverflow="overflow" horzOverflow="overflow" vert="horz" wrap="square" lIns="50800" tIns="50800" rIns="50800" bIns="50800" numCol="1" spcCol="38100" rtlCol="0" anchor="ctr">
         <a:spAutoFit/>
       </a:bodyPr>
       <a:lstStyle>
@@ -3643,7 +3364,7 @@
           <a:buFontTx/>
           <a:buNone/>
           <a:tabLst/>
-          <a:defRPr b="0" baseline="0" cap="none" i="0" spc="0" strike="noStrike" sz="2400" u="none" kumimoji="0" normalizeH="0">
+          <a:defRPr kumimoji="0" sz="2400" b="0" i="0" u="none" strike="noStrike" cap="none" spc="0" normalizeH="0" baseline="0">
             <a:ln>
               <a:noFill/>
             </a:ln>
@@ -3673,7 +3394,7 @@
           <a:buFontTx/>
           <a:buNone/>
           <a:tabLst/>
-          <a:defRPr b="0" baseline="0" cap="none" i="0" spc="0" strike="noStrike" sz="1800" u="none" kumimoji="0" normalizeH="0">
+          <a:defRPr kumimoji="0" sz="1800" b="0" i="0" u="none" strike="noStrike" cap="none" spc="0" normalizeH="0" baseline="0">
             <a:ln>
               <a:noFill/>
             </a:ln>
@@ -3699,7 +3420,7 @@
           <a:buFontTx/>
           <a:buNone/>
           <a:tabLst/>
-          <a:defRPr b="0" baseline="0" cap="none" i="0" spc="0" strike="noStrike" sz="1800" u="none" kumimoji="0" normalizeH="0">
+          <a:defRPr kumimoji="0" sz="1800" b="0" i="0" u="none" strike="noStrike" cap="none" spc="0" normalizeH="0" baseline="0">
             <a:ln>
               <a:noFill/>
             </a:ln>
@@ -3725,7 +3446,7 @@
           <a:buFontTx/>
           <a:buNone/>
           <a:tabLst/>
-          <a:defRPr b="0" baseline="0" cap="none" i="0" spc="0" strike="noStrike" sz="1800" u="none" kumimoji="0" normalizeH="0">
+          <a:defRPr kumimoji="0" sz="1800" b="0" i="0" u="none" strike="noStrike" cap="none" spc="0" normalizeH="0" baseline="0">
             <a:ln>
               <a:noFill/>
             </a:ln>
@@ -3751,7 +3472,7 @@
           <a:buFontTx/>
           <a:buNone/>
           <a:tabLst/>
-          <a:defRPr b="0" baseline="0" cap="none" i="0" spc="0" strike="noStrike" sz="1800" u="none" kumimoji="0" normalizeH="0">
+          <a:defRPr kumimoji="0" sz="1800" b="0" i="0" u="none" strike="noStrike" cap="none" spc="0" normalizeH="0" baseline="0">
             <a:ln>
               <a:noFill/>
             </a:ln>
@@ -3777,7 +3498,7 @@
           <a:buFontTx/>
           <a:buNone/>
           <a:tabLst/>
-          <a:defRPr b="0" baseline="0" cap="none" i="0" spc="0" strike="noStrike" sz="1800" u="none" kumimoji="0" normalizeH="0">
+          <a:defRPr kumimoji="0" sz="1800" b="0" i="0" u="none" strike="noStrike" cap="none" spc="0" normalizeH="0" baseline="0">
             <a:ln>
               <a:noFill/>
             </a:ln>
@@ -3803,7 +3524,7 @@
           <a:buFontTx/>
           <a:buNone/>
           <a:tabLst/>
-          <a:defRPr b="0" baseline="0" cap="none" i="0" spc="0" strike="noStrike" sz="1800" u="none" kumimoji="0" normalizeH="0">
+          <a:defRPr kumimoji="0" sz="1800" b="0" i="0" u="none" strike="noStrike" cap="none" spc="0" normalizeH="0" baseline="0">
             <a:ln>
               <a:noFill/>
             </a:ln>
@@ -3829,7 +3550,7 @@
           <a:buFontTx/>
           <a:buNone/>
           <a:tabLst/>
-          <a:defRPr b="0" baseline="0" cap="none" i="0" spc="0" strike="noStrike" sz="1800" u="none" kumimoji="0" normalizeH="0">
+          <a:defRPr kumimoji="0" sz="1800" b="0" i="0" u="none" strike="noStrike" cap="none" spc="0" normalizeH="0" baseline="0">
             <a:ln>
               <a:noFill/>
             </a:ln>
@@ -3855,7 +3576,7 @@
           <a:buFontTx/>
           <a:buNone/>
           <a:tabLst/>
-          <a:defRPr b="0" baseline="0" cap="none" i="0" spc="0" strike="noStrike" sz="1800" u="none" kumimoji="0" normalizeH="0">
+          <a:defRPr kumimoji="0" sz="1800" b="0" i="0" u="none" strike="noStrike" cap="none" spc="0" normalizeH="0" baseline="0">
             <a:ln>
               <a:noFill/>
             </a:ln>
@@ -3881,7 +3602,7 @@
           <a:buFontTx/>
           <a:buNone/>
           <a:tabLst/>
-          <a:defRPr b="0" baseline="0" cap="none" i="0" spc="0" strike="noStrike" sz="1800" u="none" kumimoji="0" normalizeH="0">
+          <a:defRPr kumimoji="0" sz="1800" b="0" i="0" u="none" strike="noStrike" cap="none" spc="0" normalizeH="0" baseline="0">
             <a:ln>
               <a:noFill/>
             </a:ln>
@@ -3894,9 +3615,15 @@
         </a:lvl9pPr>
       </a:lstStyle>
       <a:style>
-        <a:lnRef idx="0"/>
-        <a:fillRef idx="0"/>
-        <a:effectRef idx="0"/>
+        <a:lnRef idx="0">
+          <a:scrgbClr r="0" g="0" b="0"/>
+        </a:lnRef>
+        <a:fillRef idx="0">
+          <a:scrgbClr r="0" g="0" b="0"/>
+        </a:fillRef>
+        <a:effectRef idx="0">
+          <a:scrgbClr r="0" g="0" b="0"/>
+        </a:effectRef>
         <a:fontRef idx="none"/>
       </a:style>
     </a:spDef>
@@ -3912,7 +3639,7 @@
         </a:ln>
         <a:effectLst/>
       </a:spPr>
-      <a:bodyPr rot="0" spcFirstLastPara="1" vertOverflow="overflow" horzOverflow="overflow" vert="horz" wrap="square" lIns="91439" tIns="45719" rIns="91439" bIns="45719" numCol="1" spcCol="38100" rtlCol="0" anchor="t" upright="0">
+      <a:bodyPr rot="0" spcFirstLastPara="1" vertOverflow="overflow" horzOverflow="overflow" vert="horz" wrap="square" lIns="91439" tIns="45719" rIns="91439" bIns="45719" numCol="1" spcCol="38100" rtlCol="0" anchor="t">
         <a:noAutofit/>
       </a:bodyPr>
       <a:lstStyle>
@@ -3931,7 +3658,7 @@
           <a:buFontTx/>
           <a:buNone/>
           <a:tabLst/>
-          <a:defRPr b="0" baseline="0" cap="none" i="0" spc="0" strike="noStrike" sz="1800" u="none" kumimoji="0" normalizeH="0">
+          <a:defRPr kumimoji="0" sz="1800" b="0" i="0" u="none" strike="noStrike" cap="none" spc="0" normalizeH="0" baseline="0">
             <a:ln>
               <a:noFill/>
             </a:ln>
@@ -3957,7 +3684,7 @@
           <a:buFontTx/>
           <a:buNone/>
           <a:tabLst/>
-          <a:defRPr b="0" baseline="0" cap="none" i="0" spc="0" strike="noStrike" sz="1800" u="none" kumimoji="0" normalizeH="0">
+          <a:defRPr kumimoji="0" sz="1800" b="0" i="0" u="none" strike="noStrike" cap="none" spc="0" normalizeH="0" baseline="0">
             <a:ln>
               <a:noFill/>
             </a:ln>
@@ -3983,7 +3710,7 @@
           <a:buFontTx/>
           <a:buNone/>
           <a:tabLst/>
-          <a:defRPr b="0" baseline="0" cap="none" i="0" spc="0" strike="noStrike" sz="1800" u="none" kumimoji="0" normalizeH="0">
+          <a:defRPr kumimoji="0" sz="1800" b="0" i="0" u="none" strike="noStrike" cap="none" spc="0" normalizeH="0" baseline="0">
             <a:ln>
               <a:noFill/>
             </a:ln>
@@ -4009,7 +3736,7 @@
           <a:buFontTx/>
           <a:buNone/>
           <a:tabLst/>
-          <a:defRPr b="0" baseline="0" cap="none" i="0" spc="0" strike="noStrike" sz="1800" u="none" kumimoji="0" normalizeH="0">
+          <a:defRPr kumimoji="0" sz="1800" b="0" i="0" u="none" strike="noStrike" cap="none" spc="0" normalizeH="0" baseline="0">
             <a:ln>
               <a:noFill/>
             </a:ln>
@@ -4035,7 +3762,7 @@
           <a:buFontTx/>
           <a:buNone/>
           <a:tabLst/>
-          <a:defRPr b="0" baseline="0" cap="none" i="0" spc="0" strike="noStrike" sz="1800" u="none" kumimoji="0" normalizeH="0">
+          <a:defRPr kumimoji="0" sz="1800" b="0" i="0" u="none" strike="noStrike" cap="none" spc="0" normalizeH="0" baseline="0">
             <a:ln>
               <a:noFill/>
             </a:ln>
@@ -4061,7 +3788,7 @@
           <a:buFontTx/>
           <a:buNone/>
           <a:tabLst/>
-          <a:defRPr b="0" baseline="0" cap="none" i="0" spc="0" strike="noStrike" sz="1800" u="none" kumimoji="0" normalizeH="0">
+          <a:defRPr kumimoji="0" sz="1800" b="0" i="0" u="none" strike="noStrike" cap="none" spc="0" normalizeH="0" baseline="0">
             <a:ln>
               <a:noFill/>
             </a:ln>
@@ -4087,7 +3814,7 @@
           <a:buFontTx/>
           <a:buNone/>
           <a:tabLst/>
-          <a:defRPr b="0" baseline="0" cap="none" i="0" spc="0" strike="noStrike" sz="1800" u="none" kumimoji="0" normalizeH="0">
+          <a:defRPr kumimoji="0" sz="1800" b="0" i="0" u="none" strike="noStrike" cap="none" spc="0" normalizeH="0" baseline="0">
             <a:ln>
               <a:noFill/>
             </a:ln>
@@ -4113,7 +3840,7 @@
           <a:buFontTx/>
           <a:buNone/>
           <a:tabLst/>
-          <a:defRPr b="0" baseline="0" cap="none" i="0" spc="0" strike="noStrike" sz="1800" u="none" kumimoji="0" normalizeH="0">
+          <a:defRPr kumimoji="0" sz="1800" b="0" i="0" u="none" strike="noStrike" cap="none" spc="0" normalizeH="0" baseline="0">
             <a:ln>
               <a:noFill/>
             </a:ln>
@@ -4139,7 +3866,7 @@
           <a:buFontTx/>
           <a:buNone/>
           <a:tabLst/>
-          <a:defRPr b="0" baseline="0" cap="none" i="0" spc="0" strike="noStrike" sz="1800" u="none" kumimoji="0" normalizeH="0">
+          <a:defRPr kumimoji="0" sz="1800" b="0" i="0" u="none" strike="noStrike" cap="none" spc="0" normalizeH="0" baseline="0">
             <a:ln>
               <a:noFill/>
             </a:ln>
@@ -4165,7 +3892,7 @@
           <a:buFontTx/>
           <a:buNone/>
           <a:tabLst/>
-          <a:defRPr b="0" baseline="0" cap="none" i="0" spc="0" strike="noStrike" sz="1800" u="none" kumimoji="0" normalizeH="0">
+          <a:defRPr kumimoji="0" sz="1800" b="0" i="0" u="none" strike="noStrike" cap="none" spc="0" normalizeH="0" baseline="0">
             <a:ln>
               <a:noFill/>
             </a:ln>
@@ -4178,9 +3905,15 @@
         </a:lvl9pPr>
       </a:lstStyle>
       <a:style>
-        <a:lnRef idx="0"/>
-        <a:fillRef idx="0"/>
-        <a:effectRef idx="0"/>
+        <a:lnRef idx="0">
+          <a:scrgbClr r="0" g="0" b="0"/>
+        </a:lnRef>
+        <a:fillRef idx="0">
+          <a:scrgbClr r="0" g="0" b="0"/>
+        </a:fillRef>
+        <a:effectRef idx="0">
+          <a:scrgbClr r="0" g="0" b="0"/>
+        </a:effectRef>
         <a:fontRef idx="none"/>
       </a:style>
     </a:lnDef>
@@ -4193,7 +3926,7 @@
         </a:ln>
         <a:effectLst/>
       </a:spPr>
-      <a:bodyPr rot="0" spcFirstLastPara="1" vertOverflow="overflow" horzOverflow="overflow" vert="horz" wrap="square" lIns="50800" tIns="50800" rIns="50800" bIns="50800" numCol="1" spcCol="38100" rtlCol="0" anchor="ctr" upright="0">
+      <a:bodyPr rot="0" spcFirstLastPara="1" vertOverflow="overflow" horzOverflow="overflow" vert="horz" wrap="square" lIns="50800" tIns="50800" rIns="50800" bIns="50800" numCol="1" spcCol="38100" rtlCol="0" anchor="ctr">
         <a:spAutoFit/>
       </a:bodyPr>
       <a:lstStyle>
@@ -4212,7 +3945,7 @@
           <a:buFontTx/>
           <a:buNone/>
           <a:tabLst/>
-          <a:defRPr b="0" baseline="0" cap="none" i="0" spc="0" strike="noStrike" sz="3600" u="none" kumimoji="0" normalizeH="0">
+          <a:defRPr kumimoji="0" sz="3600" b="0" i="0" u="none" strike="noStrike" cap="none" spc="0" normalizeH="0" baseline="0">
             <a:ln>
               <a:noFill/>
             </a:ln>
@@ -4242,7 +3975,7 @@
           <a:buFontTx/>
           <a:buNone/>
           <a:tabLst/>
-          <a:defRPr b="0" baseline="0" cap="none" i="0" spc="0" strike="noStrike" sz="1800" u="none" kumimoji="0" normalizeH="0">
+          <a:defRPr kumimoji="0" sz="1800" b="0" i="0" u="none" strike="noStrike" cap="none" spc="0" normalizeH="0" baseline="0">
             <a:ln>
               <a:noFill/>
             </a:ln>
@@ -4268,7 +4001,7 @@
           <a:buFontTx/>
           <a:buNone/>
           <a:tabLst/>
-          <a:defRPr b="0" baseline="0" cap="none" i="0" spc="0" strike="noStrike" sz="1800" u="none" kumimoji="0" normalizeH="0">
+          <a:defRPr kumimoji="0" sz="1800" b="0" i="0" u="none" strike="noStrike" cap="none" spc="0" normalizeH="0" baseline="0">
             <a:ln>
               <a:noFill/>
             </a:ln>
@@ -4294,7 +4027,7 @@
           <a:buFontTx/>
           <a:buNone/>
           <a:tabLst/>
-          <a:defRPr b="0" baseline="0" cap="none" i="0" spc="0" strike="noStrike" sz="1800" u="none" kumimoji="0" normalizeH="0">
+          <a:defRPr kumimoji="0" sz="1800" b="0" i="0" u="none" strike="noStrike" cap="none" spc="0" normalizeH="0" baseline="0">
             <a:ln>
               <a:noFill/>
             </a:ln>
@@ -4320,7 +4053,7 @@
           <a:buFontTx/>
           <a:buNone/>
           <a:tabLst/>
-          <a:defRPr b="0" baseline="0" cap="none" i="0" spc="0" strike="noStrike" sz="1800" u="none" kumimoji="0" normalizeH="0">
+          <a:defRPr kumimoji="0" sz="1800" b="0" i="0" u="none" strike="noStrike" cap="none" spc="0" normalizeH="0" baseline="0">
             <a:ln>
               <a:noFill/>
             </a:ln>
@@ -4346,7 +4079,7 @@
           <a:buFontTx/>
           <a:buNone/>
           <a:tabLst/>
-          <a:defRPr b="0" baseline="0" cap="none" i="0" spc="0" strike="noStrike" sz="1800" u="none" kumimoji="0" normalizeH="0">
+          <a:defRPr kumimoji="0" sz="1800" b="0" i="0" u="none" strike="noStrike" cap="none" spc="0" normalizeH="0" baseline="0">
             <a:ln>
               <a:noFill/>
             </a:ln>
@@ -4372,7 +4105,7 @@
           <a:buFontTx/>
           <a:buNone/>
           <a:tabLst/>
-          <a:defRPr b="0" baseline="0" cap="none" i="0" spc="0" strike="noStrike" sz="1800" u="none" kumimoji="0" normalizeH="0">
+          <a:defRPr kumimoji="0" sz="1800" b="0" i="0" u="none" strike="noStrike" cap="none" spc="0" normalizeH="0" baseline="0">
             <a:ln>
               <a:noFill/>
             </a:ln>
@@ -4398,7 +4131,7 @@
           <a:buFontTx/>
           <a:buNone/>
           <a:tabLst/>
-          <a:defRPr b="0" baseline="0" cap="none" i="0" spc="0" strike="noStrike" sz="1800" u="none" kumimoji="0" normalizeH="0">
+          <a:defRPr kumimoji="0" sz="1800" b="0" i="0" u="none" strike="noStrike" cap="none" spc="0" normalizeH="0" baseline="0">
             <a:ln>
               <a:noFill/>
             </a:ln>
@@ -4424,7 +4157,7 @@
           <a:buFontTx/>
           <a:buNone/>
           <a:tabLst/>
-          <a:defRPr b="0" baseline="0" cap="none" i="0" spc="0" strike="noStrike" sz="1800" u="none" kumimoji="0" normalizeH="0">
+          <a:defRPr kumimoji="0" sz="1800" b="0" i="0" u="none" strike="noStrike" cap="none" spc="0" normalizeH="0" baseline="0">
             <a:ln>
               <a:noFill/>
             </a:ln>
@@ -4450,7 +4183,7 @@
           <a:buFontTx/>
           <a:buNone/>
           <a:tabLst/>
-          <a:defRPr b="0" baseline="0" cap="none" i="0" spc="0" strike="noStrike" sz="1800" u="none" kumimoji="0" normalizeH="0">
+          <a:defRPr kumimoji="0" sz="1800" b="0" i="0" u="none" strike="noStrike" cap="none" spc="0" normalizeH="0" baseline="0">
             <a:ln>
               <a:noFill/>
             </a:ln>
@@ -4463,18 +4196,25 @@
         </a:lvl9pPr>
       </a:lstStyle>
       <a:style>
-        <a:lnRef idx="0"/>
-        <a:fillRef idx="0"/>
-        <a:effectRef idx="0"/>
+        <a:lnRef idx="0">
+          <a:scrgbClr r="0" g="0" b="0"/>
+        </a:lnRef>
+        <a:fillRef idx="0">
+          <a:scrgbClr r="0" g="0" b="0"/>
+        </a:fillRef>
+        <a:effectRef idx="0">
+          <a:scrgbClr r="0" g="0" b="0"/>
+        </a:effectRef>
         <a:fontRef idx="none"/>
       </a:style>
     </a:txDef>
   </a:objectDefaults>
+  <a:extraClrSchemeLst/>
 </a:theme>
 </file>
 
 <file path=ppt/theme/theme2.xml><?xml version="1.0" encoding="utf-8"?>
-<a:theme xmlns:a="http://schemas.openxmlformats.org/drawingml/2006/main" xmlns:r="http://schemas.openxmlformats.org/officeDocument/2006/relationships" name="White">
+<a:theme xmlns:a="http://schemas.openxmlformats.org/drawingml/2006/main" name="White">
   <a:themeElements>
     <a:clrScheme name="White">
       <a:dk1>
@@ -4600,7 +4340,7 @@
       <a:effectStyleLst>
         <a:effectStyle>
           <a:effectLst>
-            <a:outerShdw sx="100000" sy="100000" kx="0" ky="0" algn="b" rotWithShape="0" blurRad="38100" dist="25400" dir="5400000">
+            <a:outerShdw blurRad="38100" dist="25400" dir="5400000" rotWithShape="0">
               <a:srgbClr val="000000">
                 <a:alpha val="50000"/>
               </a:srgbClr>
@@ -4609,7 +4349,7 @@
         </a:effectStyle>
         <a:effectStyle>
           <a:effectLst>
-            <a:outerShdw sx="100000" sy="100000" kx="0" ky="0" algn="b" rotWithShape="0" blurRad="50800" dist="12700" dir="0">
+            <a:outerShdw blurRad="50800" dist="12700" rotWithShape="0">
               <a:srgbClr val="000000">
                 <a:alpha val="50000"/>
               </a:srgbClr>
@@ -4618,7 +4358,7 @@
         </a:effectStyle>
         <a:effectStyle>
           <a:effectLst>
-            <a:outerShdw sx="100000" sy="100000" kx="0" ky="0" algn="b" rotWithShape="0" blurRad="38100" dist="25400" dir="5400000">
+            <a:outerShdw blurRad="38100" dist="25400" dir="5400000" rotWithShape="0">
               <a:srgbClr val="000000">
                 <a:alpha val="50000"/>
               </a:srgbClr>
@@ -4682,8 +4422,8 @@
     <a:spDef>
       <a:spPr>
         <a:blipFill rotWithShape="1">
-          <a:blip r:embed="rId1"/>
-          <a:srcRect l="0" t="0" r="0" b="0"/>
+          <a:blip xmlns:r="http://schemas.openxmlformats.org/officeDocument/2006/relationships" r:embed="rId1"/>
+          <a:srcRect/>
           <a:tile tx="0" ty="0" sx="100000" sy="100000" flip="none" algn="tl"/>
         </a:blipFill>
         <a:ln w="12700" cap="flat">
@@ -4691,14 +4431,14 @@
           <a:miter lim="400000"/>
         </a:ln>
         <a:effectLst>
-          <a:outerShdw sx="100000" sy="100000" kx="0" ky="0" algn="b" rotWithShape="0" blurRad="38100" dist="25400" dir="5400000">
+          <a:outerShdw blurRad="38100" dist="25400" dir="5400000" rotWithShape="0">
             <a:srgbClr val="000000">
               <a:alpha val="50000"/>
             </a:srgbClr>
           </a:outerShdw>
         </a:effectLst>
       </a:spPr>
-      <a:bodyPr rot="0" spcFirstLastPara="1" vertOverflow="overflow" horzOverflow="overflow" vert="horz" wrap="square" lIns="50800" tIns="50800" rIns="50800" bIns="50800" numCol="1" spcCol="38100" rtlCol="0" anchor="ctr" upright="0">
+      <a:bodyPr rot="0" spcFirstLastPara="1" vertOverflow="overflow" horzOverflow="overflow" vert="horz" wrap="square" lIns="50800" tIns="50800" rIns="50800" bIns="50800" numCol="1" spcCol="38100" rtlCol="0" anchor="ctr">
         <a:spAutoFit/>
       </a:bodyPr>
       <a:lstStyle>
@@ -4717,7 +4457,7 @@
           <a:buFontTx/>
           <a:buNone/>
           <a:tabLst/>
-          <a:defRPr b="0" baseline="0" cap="none" i="0" spc="0" strike="noStrike" sz="2400" u="none" kumimoji="0" normalizeH="0">
+          <a:defRPr kumimoji="0" sz="2400" b="0" i="0" u="none" strike="noStrike" cap="none" spc="0" normalizeH="0" baseline="0">
             <a:ln>
               <a:noFill/>
             </a:ln>
@@ -4747,7 +4487,7 @@
           <a:buFontTx/>
           <a:buNone/>
           <a:tabLst/>
-          <a:defRPr b="0" baseline="0" cap="none" i="0" spc="0" strike="noStrike" sz="1800" u="none" kumimoji="0" normalizeH="0">
+          <a:defRPr kumimoji="0" sz="1800" b="0" i="0" u="none" strike="noStrike" cap="none" spc="0" normalizeH="0" baseline="0">
             <a:ln>
               <a:noFill/>
             </a:ln>
@@ -4773,7 +4513,7 @@
           <a:buFontTx/>
           <a:buNone/>
           <a:tabLst/>
-          <a:defRPr b="0" baseline="0" cap="none" i="0" spc="0" strike="noStrike" sz="1800" u="none" kumimoji="0" normalizeH="0">
+          <a:defRPr kumimoji="0" sz="1800" b="0" i="0" u="none" strike="noStrike" cap="none" spc="0" normalizeH="0" baseline="0">
             <a:ln>
               <a:noFill/>
             </a:ln>
@@ -4799,7 +4539,7 @@
           <a:buFontTx/>
           <a:buNone/>
           <a:tabLst/>
-          <a:defRPr b="0" baseline="0" cap="none" i="0" spc="0" strike="noStrike" sz="1800" u="none" kumimoji="0" normalizeH="0">
+          <a:defRPr kumimoji="0" sz="1800" b="0" i="0" u="none" strike="noStrike" cap="none" spc="0" normalizeH="0" baseline="0">
             <a:ln>
               <a:noFill/>
             </a:ln>
@@ -4825,7 +4565,7 @@
           <a:buFontTx/>
           <a:buNone/>
           <a:tabLst/>
-          <a:defRPr b="0" baseline="0" cap="none" i="0" spc="0" strike="noStrike" sz="1800" u="none" kumimoji="0" normalizeH="0">
+          <a:defRPr kumimoji="0" sz="1800" b="0" i="0" u="none" strike="noStrike" cap="none" spc="0" normalizeH="0" baseline="0">
             <a:ln>
               <a:noFill/>
             </a:ln>
@@ -4851,7 +4591,7 @@
           <a:buFontTx/>
           <a:buNone/>
           <a:tabLst/>
-          <a:defRPr b="0" baseline="0" cap="none" i="0" spc="0" strike="noStrike" sz="1800" u="none" kumimoji="0" normalizeH="0">
+          <a:defRPr kumimoji="0" sz="1800" b="0" i="0" u="none" strike="noStrike" cap="none" spc="0" normalizeH="0" baseline="0">
             <a:ln>
               <a:noFill/>
             </a:ln>
@@ -4877,7 +4617,7 @@
           <a:buFontTx/>
           <a:buNone/>
           <a:tabLst/>
-          <a:defRPr b="0" baseline="0" cap="none" i="0" spc="0" strike="noStrike" sz="1800" u="none" kumimoji="0" normalizeH="0">
+          <a:defRPr kumimoji="0" sz="1800" b="0" i="0" u="none" strike="noStrike" cap="none" spc="0" normalizeH="0" baseline="0">
             <a:ln>
               <a:noFill/>
             </a:ln>
@@ -4903,7 +4643,7 @@
           <a:buFontTx/>
           <a:buNone/>
           <a:tabLst/>
-          <a:defRPr b="0" baseline="0" cap="none" i="0" spc="0" strike="noStrike" sz="1800" u="none" kumimoji="0" normalizeH="0">
+          <a:defRPr kumimoji="0" sz="1800" b="0" i="0" u="none" strike="noStrike" cap="none" spc="0" normalizeH="0" baseline="0">
             <a:ln>
               <a:noFill/>
             </a:ln>
@@ -4929,7 +4669,7 @@
           <a:buFontTx/>
           <a:buNone/>
           <a:tabLst/>
-          <a:defRPr b="0" baseline="0" cap="none" i="0" spc="0" strike="noStrike" sz="1800" u="none" kumimoji="0" normalizeH="0">
+          <a:defRPr kumimoji="0" sz="1800" b="0" i="0" u="none" strike="noStrike" cap="none" spc="0" normalizeH="0" baseline="0">
             <a:ln>
               <a:noFill/>
             </a:ln>
@@ -4955,7 +4695,7 @@
           <a:buFontTx/>
           <a:buNone/>
           <a:tabLst/>
-          <a:defRPr b="0" baseline="0" cap="none" i="0" spc="0" strike="noStrike" sz="1800" u="none" kumimoji="0" normalizeH="0">
+          <a:defRPr kumimoji="0" sz="1800" b="0" i="0" u="none" strike="noStrike" cap="none" spc="0" normalizeH="0" baseline="0">
             <a:ln>
               <a:noFill/>
             </a:ln>
@@ -4968,9 +4708,15 @@
         </a:lvl9pPr>
       </a:lstStyle>
       <a:style>
-        <a:lnRef idx="0"/>
-        <a:fillRef idx="0"/>
-        <a:effectRef idx="0"/>
+        <a:lnRef idx="0">
+          <a:scrgbClr r="0" g="0" b="0"/>
+        </a:lnRef>
+        <a:fillRef idx="0">
+          <a:scrgbClr r="0" g="0" b="0"/>
+        </a:fillRef>
+        <a:effectRef idx="0">
+          <a:scrgbClr r="0" g="0" b="0"/>
+        </a:effectRef>
         <a:fontRef idx="none"/>
       </a:style>
     </a:spDef>
@@ -4986,7 +4732,7 @@
         </a:ln>
         <a:effectLst/>
       </a:spPr>
-      <a:bodyPr rot="0" spcFirstLastPara="1" vertOverflow="overflow" horzOverflow="overflow" vert="horz" wrap="square" lIns="91439" tIns="45719" rIns="91439" bIns="45719" numCol="1" spcCol="38100" rtlCol="0" anchor="t" upright="0">
+      <a:bodyPr rot="0" spcFirstLastPara="1" vertOverflow="overflow" horzOverflow="overflow" vert="horz" wrap="square" lIns="91439" tIns="45719" rIns="91439" bIns="45719" numCol="1" spcCol="38100" rtlCol="0" anchor="t">
         <a:noAutofit/>
       </a:bodyPr>
       <a:lstStyle>
@@ -5005,7 +4751,7 @@
           <a:buFontTx/>
           <a:buNone/>
           <a:tabLst/>
-          <a:defRPr b="0" baseline="0" cap="none" i="0" spc="0" strike="noStrike" sz="1800" u="none" kumimoji="0" normalizeH="0">
+          <a:defRPr kumimoji="0" sz="1800" b="0" i="0" u="none" strike="noStrike" cap="none" spc="0" normalizeH="0" baseline="0">
             <a:ln>
               <a:noFill/>
             </a:ln>
@@ -5031,7 +4777,7 @@
           <a:buFontTx/>
           <a:buNone/>
           <a:tabLst/>
-          <a:defRPr b="0" baseline="0" cap="none" i="0" spc="0" strike="noStrike" sz="1800" u="none" kumimoji="0" normalizeH="0">
+          <a:defRPr kumimoji="0" sz="1800" b="0" i="0" u="none" strike="noStrike" cap="none" spc="0" normalizeH="0" baseline="0">
             <a:ln>
               <a:noFill/>
             </a:ln>
@@ -5057,7 +4803,7 @@
           <a:buFontTx/>
           <a:buNone/>
           <a:tabLst/>
-          <a:defRPr b="0" baseline="0" cap="none" i="0" spc="0" strike="noStrike" sz="1800" u="none" kumimoji="0" normalizeH="0">
+          <a:defRPr kumimoji="0" sz="1800" b="0" i="0" u="none" strike="noStrike" cap="none" spc="0" normalizeH="0" baseline="0">
             <a:ln>
               <a:noFill/>
             </a:ln>
@@ -5083,7 +4829,7 @@
           <a:buFontTx/>
           <a:buNone/>
           <a:tabLst/>
-          <a:defRPr b="0" baseline="0" cap="none" i="0" spc="0" strike="noStrike" sz="1800" u="none" kumimoji="0" normalizeH="0">
+          <a:defRPr kumimoji="0" sz="1800" b="0" i="0" u="none" strike="noStrike" cap="none" spc="0" normalizeH="0" baseline="0">
             <a:ln>
               <a:noFill/>
             </a:ln>
@@ -5109,7 +4855,7 @@
           <a:buFontTx/>
           <a:buNone/>
           <a:tabLst/>
-          <a:defRPr b="0" baseline="0" cap="none" i="0" spc="0" strike="noStrike" sz="1800" u="none" kumimoji="0" normalizeH="0">
+          <a:defRPr kumimoji="0" sz="1800" b="0" i="0" u="none" strike="noStrike" cap="none" spc="0" normalizeH="0" baseline="0">
             <a:ln>
               <a:noFill/>
             </a:ln>
@@ -5135,7 +4881,7 @@
           <a:buFontTx/>
           <a:buNone/>
           <a:tabLst/>
-          <a:defRPr b="0" baseline="0" cap="none" i="0" spc="0" strike="noStrike" sz="1800" u="none" kumimoji="0" normalizeH="0">
+          <a:defRPr kumimoji="0" sz="1800" b="0" i="0" u="none" strike="noStrike" cap="none" spc="0" normalizeH="0" baseline="0">
             <a:ln>
               <a:noFill/>
             </a:ln>
@@ -5161,7 +4907,7 @@
           <a:buFontTx/>
           <a:buNone/>
           <a:tabLst/>
-          <a:defRPr b="0" baseline="0" cap="none" i="0" spc="0" strike="noStrike" sz="1800" u="none" kumimoji="0" normalizeH="0">
+          <a:defRPr kumimoji="0" sz="1800" b="0" i="0" u="none" strike="noStrike" cap="none" spc="0" normalizeH="0" baseline="0">
             <a:ln>
               <a:noFill/>
             </a:ln>
@@ -5187,7 +4933,7 @@
           <a:buFontTx/>
           <a:buNone/>
           <a:tabLst/>
-          <a:defRPr b="0" baseline="0" cap="none" i="0" spc="0" strike="noStrike" sz="1800" u="none" kumimoji="0" normalizeH="0">
+          <a:defRPr kumimoji="0" sz="1800" b="0" i="0" u="none" strike="noStrike" cap="none" spc="0" normalizeH="0" baseline="0">
             <a:ln>
               <a:noFill/>
             </a:ln>
@@ -5213,7 +4959,7 @@
           <a:buFontTx/>
           <a:buNone/>
           <a:tabLst/>
-          <a:defRPr b="0" baseline="0" cap="none" i="0" spc="0" strike="noStrike" sz="1800" u="none" kumimoji="0" normalizeH="0">
+          <a:defRPr kumimoji="0" sz="1800" b="0" i="0" u="none" strike="noStrike" cap="none" spc="0" normalizeH="0" baseline="0">
             <a:ln>
               <a:noFill/>
             </a:ln>
@@ -5239,7 +4985,7 @@
           <a:buFontTx/>
           <a:buNone/>
           <a:tabLst/>
-          <a:defRPr b="0" baseline="0" cap="none" i="0" spc="0" strike="noStrike" sz="1800" u="none" kumimoji="0" normalizeH="0">
+          <a:defRPr kumimoji="0" sz="1800" b="0" i="0" u="none" strike="noStrike" cap="none" spc="0" normalizeH="0" baseline="0">
             <a:ln>
               <a:noFill/>
             </a:ln>
@@ -5252,9 +4998,15 @@
         </a:lvl9pPr>
       </a:lstStyle>
       <a:style>
-        <a:lnRef idx="0"/>
-        <a:fillRef idx="0"/>
-        <a:effectRef idx="0"/>
+        <a:lnRef idx="0">
+          <a:scrgbClr r="0" g="0" b="0"/>
+        </a:lnRef>
+        <a:fillRef idx="0">
+          <a:scrgbClr r="0" g="0" b="0"/>
+        </a:fillRef>
+        <a:effectRef idx="0">
+          <a:scrgbClr r="0" g="0" b="0"/>
+        </a:effectRef>
         <a:fontRef idx="none"/>
       </a:style>
     </a:lnDef>
@@ -5267,7 +5019,7 @@
         </a:ln>
         <a:effectLst/>
       </a:spPr>
-      <a:bodyPr rot="0" spcFirstLastPara="1" vertOverflow="overflow" horzOverflow="overflow" vert="horz" wrap="square" lIns="50800" tIns="50800" rIns="50800" bIns="50800" numCol="1" spcCol="38100" rtlCol="0" anchor="ctr" upright="0">
+      <a:bodyPr rot="0" spcFirstLastPara="1" vertOverflow="overflow" horzOverflow="overflow" vert="horz" wrap="square" lIns="50800" tIns="50800" rIns="50800" bIns="50800" numCol="1" spcCol="38100" rtlCol="0" anchor="ctr">
         <a:spAutoFit/>
       </a:bodyPr>
       <a:lstStyle>
@@ -5286,7 +5038,7 @@
           <a:buFontTx/>
           <a:buNone/>
           <a:tabLst/>
-          <a:defRPr b="0" baseline="0" cap="none" i="0" spc="0" strike="noStrike" sz="3600" u="none" kumimoji="0" normalizeH="0">
+          <a:defRPr kumimoji="0" sz="3600" b="0" i="0" u="none" strike="noStrike" cap="none" spc="0" normalizeH="0" baseline="0">
             <a:ln>
               <a:noFill/>
             </a:ln>
@@ -5316,7 +5068,7 @@
           <a:buFontTx/>
           <a:buNone/>
           <a:tabLst/>
-          <a:defRPr b="0" baseline="0" cap="none" i="0" spc="0" strike="noStrike" sz="1800" u="none" kumimoji="0" normalizeH="0">
+          <a:defRPr kumimoji="0" sz="1800" b="0" i="0" u="none" strike="noStrike" cap="none" spc="0" normalizeH="0" baseline="0">
             <a:ln>
               <a:noFill/>
             </a:ln>
@@ -5342,7 +5094,7 @@
           <a:buFontTx/>
           <a:buNone/>
           <a:tabLst/>
-          <a:defRPr b="0" baseline="0" cap="none" i="0" spc="0" strike="noStrike" sz="1800" u="none" kumimoji="0" normalizeH="0">
+          <a:defRPr kumimoji="0" sz="1800" b="0" i="0" u="none" strike="noStrike" cap="none" spc="0" normalizeH="0" baseline="0">
             <a:ln>
               <a:noFill/>
             </a:ln>
@@ -5368,7 +5120,7 @@
           <a:buFontTx/>
           <a:buNone/>
           <a:tabLst/>
-          <a:defRPr b="0" baseline="0" cap="none" i="0" spc="0" strike="noStrike" sz="1800" u="none" kumimoji="0" normalizeH="0">
+          <a:defRPr kumimoji="0" sz="1800" b="0" i="0" u="none" strike="noStrike" cap="none" spc="0" normalizeH="0" baseline="0">
             <a:ln>
               <a:noFill/>
             </a:ln>
@@ -5394,7 +5146,7 @@
           <a:buFontTx/>
           <a:buNone/>
           <a:tabLst/>
-          <a:defRPr b="0" baseline="0" cap="none" i="0" spc="0" strike="noStrike" sz="1800" u="none" kumimoji="0" normalizeH="0">
+          <a:defRPr kumimoji="0" sz="1800" b="0" i="0" u="none" strike="noStrike" cap="none" spc="0" normalizeH="0" baseline="0">
             <a:ln>
               <a:noFill/>
             </a:ln>
@@ -5420,7 +5172,7 @@
           <a:buFontTx/>
           <a:buNone/>
           <a:tabLst/>
-          <a:defRPr b="0" baseline="0" cap="none" i="0" spc="0" strike="noStrike" sz="1800" u="none" kumimoji="0" normalizeH="0">
+          <a:defRPr kumimoji="0" sz="1800" b="0" i="0" u="none" strike="noStrike" cap="none" spc="0" normalizeH="0" baseline="0">
             <a:ln>
               <a:noFill/>
             </a:ln>
@@ -5446,7 +5198,7 @@
           <a:buFontTx/>
           <a:buNone/>
           <a:tabLst/>
-          <a:defRPr b="0" baseline="0" cap="none" i="0" spc="0" strike="noStrike" sz="1800" u="none" kumimoji="0" normalizeH="0">
+          <a:defRPr kumimoji="0" sz="1800" b="0" i="0" u="none" strike="noStrike" cap="none" spc="0" normalizeH="0" baseline="0">
             <a:ln>
               <a:noFill/>
             </a:ln>
@@ -5472,7 +5224,7 @@
           <a:buFontTx/>
           <a:buNone/>
           <a:tabLst/>
-          <a:defRPr b="0" baseline="0" cap="none" i="0" spc="0" strike="noStrike" sz="1800" u="none" kumimoji="0" normalizeH="0">
+          <a:defRPr kumimoji="0" sz="1800" b="0" i="0" u="none" strike="noStrike" cap="none" spc="0" normalizeH="0" baseline="0">
             <a:ln>
               <a:noFill/>
             </a:ln>
@@ -5498,7 +5250,7 @@
           <a:buFontTx/>
           <a:buNone/>
           <a:tabLst/>
-          <a:defRPr b="0" baseline="0" cap="none" i="0" spc="0" strike="noStrike" sz="1800" u="none" kumimoji="0" normalizeH="0">
+          <a:defRPr kumimoji="0" sz="1800" b="0" i="0" u="none" strike="noStrike" cap="none" spc="0" normalizeH="0" baseline="0">
             <a:ln>
               <a:noFill/>
             </a:ln>
@@ -5524,7 +5276,7 @@
           <a:buFontTx/>
           <a:buNone/>
           <a:tabLst/>
-          <a:defRPr b="0" baseline="0" cap="none" i="0" spc="0" strike="noStrike" sz="1800" u="none" kumimoji="0" normalizeH="0">
+          <a:defRPr kumimoji="0" sz="1800" b="0" i="0" u="none" strike="noStrike" cap="none" spc="0" normalizeH="0" baseline="0">
             <a:ln>
               <a:noFill/>
             </a:ln>
@@ -5537,12 +5289,19 @@
         </a:lvl9pPr>
       </a:lstStyle>
       <a:style>
-        <a:lnRef idx="0"/>
-        <a:fillRef idx="0"/>
-        <a:effectRef idx="0"/>
+        <a:lnRef idx="0">
+          <a:scrgbClr r="0" g="0" b="0"/>
+        </a:lnRef>
+        <a:fillRef idx="0">
+          <a:scrgbClr r="0" g="0" b="0"/>
+        </a:fillRef>
+        <a:effectRef idx="0">
+          <a:scrgbClr r="0" g="0" b="0"/>
+        </a:effectRef>
         <a:fontRef idx="none"/>
       </a:style>
     </a:txDef>
   </a:objectDefaults>
+  <a:extraClrSchemeLst/>
 </a:theme>
 </file>
</xml_diff>

<commit_message>
push changed dock and architecture from alex
</commit_message>
<xml_diff>
--- a/Organisation/Architektur.pptx
+++ b/Organisation/Architektur.pptx
@@ -2,14 +2,14 @@
 <file path=ppt/presentation.xml><?xml version="1.0" encoding="utf-8"?>
 <p:presentation xmlns:a="http://schemas.openxmlformats.org/drawingml/2006/main" xmlns:r="http://schemas.openxmlformats.org/officeDocument/2006/relationships" xmlns:p="http://schemas.openxmlformats.org/presentationml/2006/main">
   <p:sldMasterIdLst>
-    <p:sldMasterId id="2147483648" r:id="rId5"/>
+    <p:sldMasterId id="2147483648" r:id="rId1"/>
   </p:sldMasterIdLst>
   <p:notesMasterIdLst>
-    <p:notesMasterId r:id="rId7"/>
+    <p:notesMasterId r:id="rId4"/>
   </p:notesMasterIdLst>
   <p:sldIdLst>
-    <p:sldId id="256" r:id="rId8"/>
-    <p:sldId id="257" r:id="rId9"/>
+    <p:sldId id="256" r:id="rId2"/>
+    <p:sldId id="257" r:id="rId3"/>
   </p:sldIdLst>
   <p:sldSz cx="13004800" cy="9753600"/>
   <p:notesSz cx="6858000" cy="9144000"/>
@@ -90,13 +90,14 @@
 </p:presentation>
 </file>
 
-<file path=ppt/commentAuthors.xml><?xml version="1.0" encoding="utf-8"?>
-<p:cmAuthorLst xmlns:a="http://schemas.openxmlformats.org/drawingml/2006/main" xmlns:r="http://schemas.openxmlformats.org/officeDocument/2006/relationships" xmlns:p="http://schemas.openxmlformats.org/presentationml/2006/main"/>
-</file>
-
 <file path=ppt/notesMasters/notesMaster1.xml><?xml version="1.0" encoding="utf-8"?>
 <p:notesMaster xmlns:a="http://schemas.openxmlformats.org/drawingml/2006/main" xmlns:r="http://schemas.openxmlformats.org/officeDocument/2006/relationships" xmlns:p="http://schemas.openxmlformats.org/presentationml/2006/main">
   <p:cSld>
+    <p:bg>
+      <p:bgRef idx="1001">
+        <a:schemeClr val="bg1"/>
+      </p:bgRef>
+    </p:bg>
     <p:spTree>
       <p:nvGrpSpPr>
         <p:cNvPr id="1" name=""/>
@@ -114,7 +115,9 @@
       <p:sp>
         <p:nvSpPr>
           <p:cNvPr id="29" name="Shape 29"/>
-          <p:cNvSpPr/>
+          <p:cNvSpPr>
+            <a:spLocks noGrp="1" noRot="1" noChangeAspect="1"/>
+          </p:cNvSpPr>
           <p:nvPr>
             <p:ph type="sldImg"/>
           </p:nvPr>
@@ -133,13 +136,16 @@
           <a:lstStyle/>
           <a:p>
             <a:pPr lvl="0"/>
+            <a:endParaRPr/>
           </a:p>
         </p:txBody>
       </p:sp>
       <p:sp>
         <p:nvSpPr>
           <p:cNvPr id="30" name="Shape 30"/>
-          <p:cNvSpPr/>
+          <p:cNvSpPr>
+            <a:spLocks noGrp="1"/>
+          </p:cNvSpPr>
           <p:nvPr>
             <p:ph type="body" sz="quarter" idx="1"/>
           </p:nvPr>
@@ -158,6 +164,7 @@
           <a:lstStyle/>
           <a:p>
             <a:pPr lvl="0"/>
+            <a:endParaRPr/>
           </a:p>
         </p:txBody>
       </p:sp>
@@ -269,7 +276,7 @@
 </file>
 
 <file path=ppt/slideLayouts/slideLayout1.xml><?xml version="1.0" encoding="utf-8"?>
-<p:sldLayout xmlns:a="http://schemas.openxmlformats.org/drawingml/2006/main" xmlns:r="http://schemas.openxmlformats.org/officeDocument/2006/relationships" xmlns:p="http://schemas.openxmlformats.org/presentationml/2006/main" type="tx" showMasterSp="1" showMasterPhAnim="1">
+<p:sldLayout xmlns:a="http://schemas.openxmlformats.org/drawingml/2006/main" xmlns:r="http://schemas.openxmlformats.org/officeDocument/2006/relationships" xmlns:p="http://schemas.openxmlformats.org/presentationml/2006/main" type="tx">
   <p:cSld name="Titel &amp; Untertitel">
     <p:spTree>
       <p:nvGrpSpPr>
@@ -288,7 +295,9 @@
       <p:sp>
         <p:nvSpPr>
           <p:cNvPr id="5" name="Shape 5"/>
-          <p:cNvSpPr/>
+          <p:cNvSpPr>
+            <a:spLocks noGrp="1"/>
+          </p:cNvSpPr>
           <p:nvPr>
             <p:ph type="title"/>
           </p:nvPr>
@@ -319,7 +328,9 @@
       <p:sp>
         <p:nvSpPr>
           <p:cNvPr id="6" name="Shape 6"/>
-          <p:cNvSpPr/>
+          <p:cNvSpPr>
+            <a:spLocks noGrp="1"/>
+          </p:cNvSpPr>
           <p:nvPr>
             <p:ph type="body" idx="1"/>
           </p:nvPr>
@@ -385,7 +396,6 @@
               <a:rPr sz="3200"/>
               <a:t>Textebene 1</a:t>
             </a:r>
-            <a:endParaRPr sz="3200"/>
           </a:p>
           <a:p>
             <a:pPr lvl="1">
@@ -395,7 +405,6 @@
               <a:rPr sz="3200"/>
               <a:t>Textebene 2</a:t>
             </a:r>
-            <a:endParaRPr sz="3200"/>
           </a:p>
           <a:p>
             <a:pPr lvl="2">
@@ -405,7 +414,6 @@
               <a:rPr sz="3200"/>
               <a:t>Textebene 3</a:t>
             </a:r>
-            <a:endParaRPr sz="3200"/>
           </a:p>
           <a:p>
             <a:pPr lvl="3">
@@ -415,7 +423,6 @@
               <a:rPr sz="3200"/>
               <a:t>Textebene 4</a:t>
             </a:r>
-            <a:endParaRPr sz="3200"/>
           </a:p>
           <a:p>
             <a:pPr lvl="4">
@@ -433,12 +440,12 @@
   <p:clrMapOvr>
     <a:masterClrMapping/>
   </p:clrMapOvr>
-  <p:transition spd="med" advClick="1"/>
+  <p:transition spd="med"/>
 </p:sldLayout>
 </file>
 
 <file path=ppt/slideLayouts/slideLayout10.xml><?xml version="1.0" encoding="utf-8"?>
-<p:sldLayout xmlns:a="http://schemas.openxmlformats.org/drawingml/2006/main" xmlns:r="http://schemas.openxmlformats.org/officeDocument/2006/relationships" xmlns:p="http://schemas.openxmlformats.org/presentationml/2006/main" type="tx" showMasterSp="1" showMasterPhAnim="1">
+<p:sldLayout xmlns:a="http://schemas.openxmlformats.org/drawingml/2006/main" xmlns:r="http://schemas.openxmlformats.org/officeDocument/2006/relationships" xmlns:p="http://schemas.openxmlformats.org/presentationml/2006/main" type="tx">
   <p:cSld name="Zitat">
     <p:spTree>
       <p:nvGrpSpPr>
@@ -459,12 +466,12 @@
   <p:clrMapOvr>
     <a:masterClrMapping/>
   </p:clrMapOvr>
-  <p:transition spd="med" advClick="1"/>
+  <p:transition spd="med"/>
 </p:sldLayout>
 </file>
 
 <file path=ppt/slideLayouts/slideLayout11.xml><?xml version="1.0" encoding="utf-8"?>
-<p:sldLayout xmlns:a="http://schemas.openxmlformats.org/drawingml/2006/main" xmlns:r="http://schemas.openxmlformats.org/officeDocument/2006/relationships" xmlns:p="http://schemas.openxmlformats.org/presentationml/2006/main" type="tx" showMasterSp="1" showMasterPhAnim="1">
+<p:sldLayout xmlns:a="http://schemas.openxmlformats.org/drawingml/2006/main" xmlns:r="http://schemas.openxmlformats.org/officeDocument/2006/relationships" xmlns:p="http://schemas.openxmlformats.org/presentationml/2006/main" type="tx">
   <p:cSld name="Foto">
     <p:spTree>
       <p:nvGrpSpPr>
@@ -485,12 +492,12 @@
   <p:clrMapOvr>
     <a:masterClrMapping/>
   </p:clrMapOvr>
-  <p:transition spd="med" advClick="1"/>
+  <p:transition spd="med"/>
 </p:sldLayout>
 </file>
 
 <file path=ppt/slideLayouts/slideLayout12.xml><?xml version="1.0" encoding="utf-8"?>
-<p:sldLayout xmlns:a="http://schemas.openxmlformats.org/drawingml/2006/main" xmlns:r="http://schemas.openxmlformats.org/officeDocument/2006/relationships" xmlns:p="http://schemas.openxmlformats.org/presentationml/2006/main" type="tx" showMasterSp="1" showMasterPhAnim="1">
+<p:sldLayout xmlns:a="http://schemas.openxmlformats.org/drawingml/2006/main" xmlns:r="http://schemas.openxmlformats.org/officeDocument/2006/relationships" xmlns:p="http://schemas.openxmlformats.org/presentationml/2006/main" type="tx">
   <p:cSld name="Leer">
     <p:spTree>
       <p:nvGrpSpPr>
@@ -511,12 +518,12 @@
   <p:clrMapOvr>
     <a:masterClrMapping/>
   </p:clrMapOvr>
-  <p:transition spd="med" advClick="1"/>
+  <p:transition spd="med"/>
 </p:sldLayout>
 </file>
 
 <file path=ppt/slideLayouts/slideLayout2.xml><?xml version="1.0" encoding="utf-8"?>
-<p:sldLayout xmlns:a="http://schemas.openxmlformats.org/drawingml/2006/main" xmlns:r="http://schemas.openxmlformats.org/officeDocument/2006/relationships" xmlns:p="http://schemas.openxmlformats.org/presentationml/2006/main" type="tx" showMasterSp="1" showMasterPhAnim="1">
+<p:sldLayout xmlns:a="http://schemas.openxmlformats.org/drawingml/2006/main" xmlns:r="http://schemas.openxmlformats.org/officeDocument/2006/relationships" xmlns:p="http://schemas.openxmlformats.org/presentationml/2006/main" type="tx">
   <p:cSld name="Foto - Horizontal">
     <p:spTree>
       <p:nvGrpSpPr>
@@ -535,7 +542,9 @@
       <p:sp>
         <p:nvSpPr>
           <p:cNvPr id="8" name="Shape 8"/>
-          <p:cNvSpPr/>
+          <p:cNvSpPr>
+            <a:spLocks noGrp="1"/>
+          </p:cNvSpPr>
           <p:nvPr>
             <p:ph type="title"/>
           </p:nvPr>
@@ -566,7 +575,9 @@
       <p:sp>
         <p:nvSpPr>
           <p:cNvPr id="9" name="Shape 9"/>
-          <p:cNvSpPr/>
+          <p:cNvSpPr>
+            <a:spLocks noGrp="1"/>
+          </p:cNvSpPr>
           <p:nvPr>
             <p:ph type="body" idx="1"/>
           </p:nvPr>
@@ -632,7 +643,6 @@
               <a:rPr sz="3200"/>
               <a:t>Textebene 1</a:t>
             </a:r>
-            <a:endParaRPr sz="3200"/>
           </a:p>
           <a:p>
             <a:pPr lvl="1">
@@ -642,7 +652,6 @@
               <a:rPr sz="3200"/>
               <a:t>Textebene 2</a:t>
             </a:r>
-            <a:endParaRPr sz="3200"/>
           </a:p>
           <a:p>
             <a:pPr lvl="2">
@@ -652,7 +661,6 @@
               <a:rPr sz="3200"/>
               <a:t>Textebene 3</a:t>
             </a:r>
-            <a:endParaRPr sz="3200"/>
           </a:p>
           <a:p>
             <a:pPr lvl="3">
@@ -662,7 +670,6 @@
               <a:rPr sz="3200"/>
               <a:t>Textebene 4</a:t>
             </a:r>
-            <a:endParaRPr sz="3200"/>
           </a:p>
           <a:p>
             <a:pPr lvl="4">
@@ -680,12 +687,12 @@
   <p:clrMapOvr>
     <a:masterClrMapping/>
   </p:clrMapOvr>
-  <p:transition spd="med" advClick="1"/>
+  <p:transition spd="med"/>
 </p:sldLayout>
 </file>
 
 <file path=ppt/slideLayouts/slideLayout3.xml><?xml version="1.0" encoding="utf-8"?>
-<p:sldLayout xmlns:a="http://schemas.openxmlformats.org/drawingml/2006/main" xmlns:r="http://schemas.openxmlformats.org/officeDocument/2006/relationships" xmlns:p="http://schemas.openxmlformats.org/presentationml/2006/main" type="tx" showMasterSp="1" showMasterPhAnim="1">
+<p:sldLayout xmlns:a="http://schemas.openxmlformats.org/drawingml/2006/main" xmlns:r="http://schemas.openxmlformats.org/officeDocument/2006/relationships" xmlns:p="http://schemas.openxmlformats.org/presentationml/2006/main" type="tx">
   <p:cSld name="Titel - Mitte">
     <p:spTree>
       <p:nvGrpSpPr>
@@ -704,7 +711,9 @@
       <p:sp>
         <p:nvSpPr>
           <p:cNvPr id="11" name="Shape 11"/>
-          <p:cNvSpPr/>
+          <p:cNvSpPr>
+            <a:spLocks noGrp="1"/>
+          </p:cNvSpPr>
           <p:nvPr>
             <p:ph type="title"/>
           </p:nvPr>
@@ -737,12 +746,12 @@
   <p:clrMapOvr>
     <a:masterClrMapping/>
   </p:clrMapOvr>
-  <p:transition spd="med" advClick="1"/>
+  <p:transition spd="med"/>
 </p:sldLayout>
 </file>
 
 <file path=ppt/slideLayouts/slideLayout4.xml><?xml version="1.0" encoding="utf-8"?>
-<p:sldLayout xmlns:a="http://schemas.openxmlformats.org/drawingml/2006/main" xmlns:r="http://schemas.openxmlformats.org/officeDocument/2006/relationships" xmlns:p="http://schemas.openxmlformats.org/presentationml/2006/main" type="tx" showMasterSp="1" showMasterPhAnim="1">
+<p:sldLayout xmlns:a="http://schemas.openxmlformats.org/drawingml/2006/main" xmlns:r="http://schemas.openxmlformats.org/officeDocument/2006/relationships" xmlns:p="http://schemas.openxmlformats.org/presentationml/2006/main" type="tx">
   <p:cSld name="Foto - Vertikal">
     <p:spTree>
       <p:nvGrpSpPr>
@@ -761,7 +770,9 @@
       <p:sp>
         <p:nvSpPr>
           <p:cNvPr id="13" name="Shape 13"/>
-          <p:cNvSpPr/>
+          <p:cNvSpPr>
+            <a:spLocks noGrp="1"/>
+          </p:cNvSpPr>
           <p:nvPr>
             <p:ph type="title"/>
           </p:nvPr>
@@ -796,7 +807,9 @@
       <p:sp>
         <p:nvSpPr>
           <p:cNvPr id="14" name="Shape 14"/>
-          <p:cNvSpPr/>
+          <p:cNvSpPr>
+            <a:spLocks noGrp="1"/>
+          </p:cNvSpPr>
           <p:nvPr>
             <p:ph type="body" idx="1"/>
           </p:nvPr>
@@ -862,7 +875,6 @@
               <a:rPr sz="3200"/>
               <a:t>Textebene 1</a:t>
             </a:r>
-            <a:endParaRPr sz="3200"/>
           </a:p>
           <a:p>
             <a:pPr lvl="1">
@@ -872,7 +884,6 @@
               <a:rPr sz="3200"/>
               <a:t>Textebene 2</a:t>
             </a:r>
-            <a:endParaRPr sz="3200"/>
           </a:p>
           <a:p>
             <a:pPr lvl="2">
@@ -882,7 +893,6 @@
               <a:rPr sz="3200"/>
               <a:t>Textebene 3</a:t>
             </a:r>
-            <a:endParaRPr sz="3200"/>
           </a:p>
           <a:p>
             <a:pPr lvl="3">
@@ -892,7 +902,6 @@
               <a:rPr sz="3200"/>
               <a:t>Textebene 4</a:t>
             </a:r>
-            <a:endParaRPr sz="3200"/>
           </a:p>
           <a:p>
             <a:pPr lvl="4">
@@ -910,12 +919,12 @@
   <p:clrMapOvr>
     <a:masterClrMapping/>
   </p:clrMapOvr>
-  <p:transition spd="med" advClick="1"/>
+  <p:transition spd="med"/>
 </p:sldLayout>
 </file>
 
 <file path=ppt/slideLayouts/slideLayout5.xml><?xml version="1.0" encoding="utf-8"?>
-<p:sldLayout xmlns:a="http://schemas.openxmlformats.org/drawingml/2006/main" xmlns:r="http://schemas.openxmlformats.org/officeDocument/2006/relationships" xmlns:p="http://schemas.openxmlformats.org/presentationml/2006/main" type="tx" showMasterSp="1" showMasterPhAnim="1">
+<p:sldLayout xmlns:a="http://schemas.openxmlformats.org/drawingml/2006/main" xmlns:r="http://schemas.openxmlformats.org/officeDocument/2006/relationships" xmlns:p="http://schemas.openxmlformats.org/presentationml/2006/main" type="tx">
   <p:cSld name="Titel - Oben">
     <p:spTree>
       <p:nvGrpSpPr>
@@ -934,7 +943,9 @@
       <p:sp>
         <p:nvSpPr>
           <p:cNvPr id="16" name="Shape 16"/>
-          <p:cNvSpPr/>
+          <p:cNvSpPr>
+            <a:spLocks noGrp="1"/>
+          </p:cNvSpPr>
           <p:nvPr>
             <p:ph type="title"/>
           </p:nvPr>
@@ -967,12 +978,12 @@
   <p:clrMapOvr>
     <a:masterClrMapping/>
   </p:clrMapOvr>
-  <p:transition spd="med" advClick="1"/>
+  <p:transition spd="med"/>
 </p:sldLayout>
 </file>
 
 <file path=ppt/slideLayouts/slideLayout6.xml><?xml version="1.0" encoding="utf-8"?>
-<p:sldLayout xmlns:a="http://schemas.openxmlformats.org/drawingml/2006/main" xmlns:r="http://schemas.openxmlformats.org/officeDocument/2006/relationships" xmlns:p="http://schemas.openxmlformats.org/presentationml/2006/main" type="tx" showMasterSp="1" showMasterPhAnim="1">
+<p:sldLayout xmlns:a="http://schemas.openxmlformats.org/drawingml/2006/main" xmlns:r="http://schemas.openxmlformats.org/officeDocument/2006/relationships" xmlns:p="http://schemas.openxmlformats.org/presentationml/2006/main" type="tx">
   <p:cSld name="Titel &amp; Aufzählung">
     <p:spTree>
       <p:nvGrpSpPr>
@@ -991,7 +1002,9 @@
       <p:sp>
         <p:nvSpPr>
           <p:cNvPr id="18" name="Shape 18"/>
-          <p:cNvSpPr/>
+          <p:cNvSpPr>
+            <a:spLocks noGrp="1"/>
+          </p:cNvSpPr>
           <p:nvPr>
             <p:ph type="title"/>
           </p:nvPr>
@@ -1018,7 +1031,9 @@
       <p:sp>
         <p:nvSpPr>
           <p:cNvPr id="19" name="Shape 19"/>
-          <p:cNvSpPr/>
+          <p:cNvSpPr>
+            <a:spLocks noGrp="1"/>
+          </p:cNvSpPr>
           <p:nvPr>
             <p:ph type="body" idx="1"/>
           </p:nvPr>
@@ -1039,7 +1054,6 @@
               <a:rPr sz="3600"/>
               <a:t>Textebene 1</a:t>
             </a:r>
-            <a:endParaRPr sz="3600"/>
           </a:p>
           <a:p>
             <a:pPr lvl="1">
@@ -1049,7 +1063,6 @@
               <a:rPr sz="3600"/>
               <a:t>Textebene 2</a:t>
             </a:r>
-            <a:endParaRPr sz="3600"/>
           </a:p>
           <a:p>
             <a:pPr lvl="2">
@@ -1059,7 +1072,6 @@
               <a:rPr sz="3600"/>
               <a:t>Textebene 3</a:t>
             </a:r>
-            <a:endParaRPr sz="3600"/>
           </a:p>
           <a:p>
             <a:pPr lvl="3">
@@ -1069,7 +1081,6 @@
               <a:rPr sz="3600"/>
               <a:t>Textebene 4</a:t>
             </a:r>
-            <a:endParaRPr sz="3600"/>
           </a:p>
           <a:p>
             <a:pPr lvl="4">
@@ -1087,12 +1098,12 @@
   <p:clrMapOvr>
     <a:masterClrMapping/>
   </p:clrMapOvr>
-  <p:transition spd="med" advClick="1"/>
+  <p:transition spd="med"/>
 </p:sldLayout>
 </file>
 
 <file path=ppt/slideLayouts/slideLayout7.xml><?xml version="1.0" encoding="utf-8"?>
-<p:sldLayout xmlns:a="http://schemas.openxmlformats.org/drawingml/2006/main" xmlns:r="http://schemas.openxmlformats.org/officeDocument/2006/relationships" xmlns:p="http://schemas.openxmlformats.org/presentationml/2006/main" type="tx" showMasterSp="1" showMasterPhAnim="1">
+<p:sldLayout xmlns:a="http://schemas.openxmlformats.org/drawingml/2006/main" xmlns:r="http://schemas.openxmlformats.org/officeDocument/2006/relationships" xmlns:p="http://schemas.openxmlformats.org/presentationml/2006/main" type="tx">
   <p:cSld name="Titel, Aufzählung &amp; Foto">
     <p:spTree>
       <p:nvGrpSpPr>
@@ -1111,7 +1122,9 @@
       <p:sp>
         <p:nvSpPr>
           <p:cNvPr id="21" name="Shape 21"/>
-          <p:cNvSpPr/>
+          <p:cNvSpPr>
+            <a:spLocks noGrp="1"/>
+          </p:cNvSpPr>
           <p:nvPr>
             <p:ph type="title"/>
           </p:nvPr>
@@ -1138,7 +1151,9 @@
       <p:sp>
         <p:nvSpPr>
           <p:cNvPr id="22" name="Shape 22"/>
-          <p:cNvSpPr/>
+          <p:cNvSpPr>
+            <a:spLocks noGrp="1"/>
+          </p:cNvSpPr>
           <p:nvPr>
             <p:ph type="body" idx="1"/>
           </p:nvPr>
@@ -1194,7 +1209,6 @@
               <a:rPr sz="2800"/>
               <a:t>Textebene 1</a:t>
             </a:r>
-            <a:endParaRPr sz="2800"/>
           </a:p>
           <a:p>
             <a:pPr lvl="1">
@@ -1204,7 +1218,6 @@
               <a:rPr sz="2800"/>
               <a:t>Textebene 2</a:t>
             </a:r>
-            <a:endParaRPr sz="2800"/>
           </a:p>
           <a:p>
             <a:pPr lvl="2">
@@ -1214,7 +1227,6 @@
               <a:rPr sz="2800"/>
               <a:t>Textebene 3</a:t>
             </a:r>
-            <a:endParaRPr sz="2800"/>
           </a:p>
           <a:p>
             <a:pPr lvl="3">
@@ -1224,7 +1236,6 @@
               <a:rPr sz="2800"/>
               <a:t>Textebene 4</a:t>
             </a:r>
-            <a:endParaRPr sz="2800"/>
           </a:p>
           <a:p>
             <a:pPr lvl="4">
@@ -1242,12 +1253,12 @@
   <p:clrMapOvr>
     <a:masterClrMapping/>
   </p:clrMapOvr>
-  <p:transition spd="med" advClick="1"/>
+  <p:transition spd="med"/>
 </p:sldLayout>
 </file>
 
 <file path=ppt/slideLayouts/slideLayout8.xml><?xml version="1.0" encoding="utf-8"?>
-<p:sldLayout xmlns:a="http://schemas.openxmlformats.org/drawingml/2006/main" xmlns:r="http://schemas.openxmlformats.org/officeDocument/2006/relationships" xmlns:p="http://schemas.openxmlformats.org/presentationml/2006/main" type="tx" showMasterSp="1" showMasterPhAnim="1">
+<p:sldLayout xmlns:a="http://schemas.openxmlformats.org/drawingml/2006/main" xmlns:r="http://schemas.openxmlformats.org/officeDocument/2006/relationships" xmlns:p="http://schemas.openxmlformats.org/presentationml/2006/main" type="tx">
   <p:cSld name="Punkte">
     <p:spTree>
       <p:nvGrpSpPr>
@@ -1266,7 +1277,9 @@
       <p:sp>
         <p:nvSpPr>
           <p:cNvPr id="24" name="Shape 24"/>
-          <p:cNvSpPr/>
+          <p:cNvSpPr>
+            <a:spLocks noGrp="1"/>
+          </p:cNvSpPr>
           <p:nvPr>
             <p:ph type="body" idx="1"/>
           </p:nvPr>
@@ -1291,7 +1304,6 @@
               <a:rPr sz="3600"/>
               <a:t>Textebene 1</a:t>
             </a:r>
-            <a:endParaRPr sz="3600"/>
           </a:p>
           <a:p>
             <a:pPr lvl="1">
@@ -1301,7 +1313,6 @@
               <a:rPr sz="3600"/>
               <a:t>Textebene 2</a:t>
             </a:r>
-            <a:endParaRPr sz="3600"/>
           </a:p>
           <a:p>
             <a:pPr lvl="2">
@@ -1311,7 +1322,6 @@
               <a:rPr sz="3600"/>
               <a:t>Textebene 3</a:t>
             </a:r>
-            <a:endParaRPr sz="3600"/>
           </a:p>
           <a:p>
             <a:pPr lvl="3">
@@ -1321,7 +1331,6 @@
               <a:rPr sz="3600"/>
               <a:t>Textebene 4</a:t>
             </a:r>
-            <a:endParaRPr sz="3600"/>
           </a:p>
           <a:p>
             <a:pPr lvl="4">
@@ -1339,12 +1348,12 @@
   <p:clrMapOvr>
     <a:masterClrMapping/>
   </p:clrMapOvr>
-  <p:transition spd="med" advClick="1"/>
+  <p:transition spd="med"/>
 </p:sldLayout>
 </file>
 
 <file path=ppt/slideLayouts/slideLayout9.xml><?xml version="1.0" encoding="utf-8"?>
-<p:sldLayout xmlns:a="http://schemas.openxmlformats.org/drawingml/2006/main" xmlns:r="http://schemas.openxmlformats.org/officeDocument/2006/relationships" xmlns:p="http://schemas.openxmlformats.org/presentationml/2006/main" type="tx" showMasterSp="1" showMasterPhAnim="1">
+<p:sldLayout xmlns:a="http://schemas.openxmlformats.org/drawingml/2006/main" xmlns:r="http://schemas.openxmlformats.org/officeDocument/2006/relationships" xmlns:p="http://schemas.openxmlformats.org/presentationml/2006/main" type="tx">
   <p:cSld name="Foto - 3 Stück">
     <p:spTree>
       <p:nvGrpSpPr>
@@ -1365,7 +1374,7 @@
   <p:clrMapOvr>
     <a:masterClrMapping/>
   </p:clrMapOvr>
-  <p:transition spd="med" advClick="1"/>
+  <p:transition spd="med"/>
 </p:sldLayout>
 </file>
 
@@ -1377,6 +1386,7 @@
         <a:solidFill>
           <a:srgbClr val="FFFFFF"/>
         </a:solidFill>
+        <a:effectLst/>
       </p:bgPr>
     </p:bg>
     <p:spTree>
@@ -1396,7 +1406,9 @@
       <p:sp>
         <p:nvSpPr>
           <p:cNvPr id="2" name="Shape 2"/>
-          <p:cNvSpPr/>
+          <p:cNvSpPr>
+            <a:spLocks noGrp="1"/>
+          </p:cNvSpPr>
           <p:nvPr>
             <p:ph type="title"/>
           </p:nvPr>
@@ -1414,13 +1426,13 @@
           </a:ln>
           <a:extLst>
             <a:ext uri="{C572A759-6A51-4108-AA02-DFA0A04FC94B}">
-              <ma14:wrappingTextBoxFlag xmlns:ma14="http://schemas.microsoft.com/office/mac/drawingml/2011/main" val="1"/>
+              <ma14:wrappingTextBoxFlag xmlns:ma14="http://schemas.microsoft.com/office/mac/drawingml/2011/main" xmlns="" val="1"/>
             </a:ext>
           </a:extLst>
         </p:spPr>
         <p:txBody>
           <a:bodyPr lIns="0" tIns="0" rIns="0" bIns="0" anchor="ctr">
-            <a:normAutofit fontScale="100000" lnSpcReduction="0"/>
+            <a:normAutofit/>
           </a:bodyPr>
           <a:lstStyle/>
           <a:p>
@@ -1437,7 +1449,9 @@
       <p:sp>
         <p:nvSpPr>
           <p:cNvPr id="3" name="Shape 3"/>
-          <p:cNvSpPr/>
+          <p:cNvSpPr>
+            <a:spLocks noGrp="1"/>
+          </p:cNvSpPr>
           <p:nvPr>
             <p:ph type="body" idx="1"/>
           </p:nvPr>
@@ -1455,13 +1469,13 @@
           </a:ln>
           <a:extLst>
             <a:ext uri="{C572A759-6A51-4108-AA02-DFA0A04FC94B}">
-              <ma14:wrappingTextBoxFlag xmlns:ma14="http://schemas.microsoft.com/office/mac/drawingml/2011/main" val="1"/>
+              <ma14:wrappingTextBoxFlag xmlns:ma14="http://schemas.microsoft.com/office/mac/drawingml/2011/main" xmlns="" val="1"/>
             </a:ext>
           </a:extLst>
         </p:spPr>
         <p:txBody>
           <a:bodyPr lIns="0" tIns="0" rIns="0" bIns="0" anchor="ctr">
-            <a:normAutofit fontScale="100000" lnSpcReduction="0"/>
+            <a:normAutofit/>
           </a:bodyPr>
           <a:lstStyle/>
           <a:p>
@@ -1472,7 +1486,6 @@
               <a:rPr sz="3600"/>
               <a:t>Textebene 1</a:t>
             </a:r>
-            <a:endParaRPr sz="3600"/>
           </a:p>
           <a:p>
             <a:pPr lvl="1">
@@ -1482,7 +1495,6 @@
               <a:rPr sz="3600"/>
               <a:t>Textebene 2</a:t>
             </a:r>
-            <a:endParaRPr sz="3600"/>
           </a:p>
           <a:p>
             <a:pPr lvl="2">
@@ -1492,7 +1504,6 @@
               <a:rPr sz="3600"/>
               <a:t>Textebene 3</a:t>
             </a:r>
-            <a:endParaRPr sz="3600"/>
           </a:p>
           <a:p>
             <a:pPr lvl="3">
@@ -1502,7 +1513,6 @@
               <a:rPr sz="3600"/>
               <a:t>Textebene 4</a:t>
             </a:r>
-            <a:endParaRPr sz="3600"/>
           </a:p>
           <a:p>
             <a:pPr lvl="4">
@@ -1519,20 +1529,20 @@
   </p:cSld>
   <p:clrMap bg1="lt1" tx1="dk1" bg2="lt2" tx2="dk2" accent1="accent1" accent2="accent2" accent3="accent3" accent4="accent4" accent5="accent5" accent6="accent6" hlink="hlink" folHlink="folHlink"/>
   <p:sldLayoutIdLst>
-    <p:sldLayoutId id="2147483649" r:id="rId2"/>
-    <p:sldLayoutId id="2147483650" r:id="rId3"/>
-    <p:sldLayoutId id="2147483651" r:id="rId4"/>
-    <p:sldLayoutId id="2147483652" r:id="rId5"/>
-    <p:sldLayoutId id="2147483653" r:id="rId6"/>
-    <p:sldLayoutId id="2147483654" r:id="rId7"/>
-    <p:sldLayoutId id="2147483655" r:id="rId8"/>
-    <p:sldLayoutId id="2147483656" r:id="rId9"/>
-    <p:sldLayoutId id="2147483657" r:id="rId10"/>
-    <p:sldLayoutId id="2147483658" r:id="rId11"/>
-    <p:sldLayoutId id="2147483659" r:id="rId12"/>
-    <p:sldLayoutId id="2147483660" r:id="rId13"/>
+    <p:sldLayoutId id="2147483649" r:id="rId1"/>
+    <p:sldLayoutId id="2147483650" r:id="rId2"/>
+    <p:sldLayoutId id="2147483651" r:id="rId3"/>
+    <p:sldLayoutId id="2147483652" r:id="rId4"/>
+    <p:sldLayoutId id="2147483653" r:id="rId5"/>
+    <p:sldLayoutId id="2147483654" r:id="rId6"/>
+    <p:sldLayoutId id="2147483655" r:id="rId7"/>
+    <p:sldLayoutId id="2147483656" r:id="rId8"/>
+    <p:sldLayoutId id="2147483657" r:id="rId9"/>
+    <p:sldLayoutId id="2147483658" r:id="rId10"/>
+    <p:sldLayoutId id="2147483659" r:id="rId11"/>
+    <p:sldLayoutId id="2147483660" r:id="rId12"/>
   </p:sldLayoutIdLst>
-  <p:transition spd="med" advClick="1"/>
+  <p:transition spd="med"/>
   <p:txStyles>
     <p:titleStyle>
       <a:lvl1pPr algn="ctr" defTabSz="584200">
@@ -1833,7 +1843,7 @@
 </file>
 
 <file path=ppt/slides/slide1.xml><?xml version="1.0" encoding="utf-8"?>
-<p:sld xmlns:a="http://schemas.openxmlformats.org/drawingml/2006/main" xmlns:r="http://schemas.openxmlformats.org/officeDocument/2006/relationships" xmlns:p="http://schemas.openxmlformats.org/presentationml/2006/main" showMasterSp="1" showMasterPhAnim="1">
+<p:sld xmlns:a="http://schemas.openxmlformats.org/drawingml/2006/main" xmlns:r="http://schemas.openxmlformats.org/officeDocument/2006/relationships" xmlns:p="http://schemas.openxmlformats.org/presentationml/2006/main">
   <p:cSld>
     <p:spTree>
       <p:nvGrpSpPr>
@@ -1857,8 +1867,8 @@
         </p:nvGrpSpPr>
         <p:grpSpPr>
           <a:xfrm>
-            <a:off x="8446616" y="6677000"/>
-            <a:ext cx="4232674" cy="1152129"/>
+            <a:off x="669752" y="6893023"/>
+            <a:ext cx="12009538" cy="1152129"/>
             <a:chOff x="0" y="0"/>
             <a:chExt cx="4232673" cy="1152128"/>
           </a:xfrm>
@@ -1878,8 +1888,8 @@
               <a:avLst/>
             </a:prstGeom>
             <a:blipFill rotWithShape="1">
-              <a:blip r:embed="rId2"/>
-              <a:srcRect l="0" t="0" r="0" b="0"/>
+              <a:blip r:embed="rId2" cstate="print"/>
+              <a:srcRect/>
               <a:tile tx="0" ty="0" sx="100000" sy="100000" flip="none" algn="tl"/>
             </a:blipFill>
             <a:ln w="12700" cap="flat">
@@ -1887,7 +1897,7 @@
               <a:miter lim="400000"/>
             </a:ln>
             <a:effectLst>
-              <a:outerShdw sx="100000" sy="100000" kx="0" ky="0" algn="b" rotWithShape="0" blurRad="38100" dist="25400" dir="5400000">
+              <a:outerShdw blurRad="38100" dist="25400" dir="5400000" rotWithShape="0">
                 <a:srgbClr val="000000">
                   <a:alpha val="50000"/>
                 </a:srgbClr>
@@ -1901,7 +1911,7 @@
             <a:lstStyle/>
             <a:p>
               <a:pPr lvl="0">
-                <a:defRPr b="1" sz="2700">
+                <a:defRPr sz="2700" b="1">
                   <a:solidFill>
                     <a:srgbClr val="FFFFFF"/>
                   </a:solidFill>
@@ -1911,6 +1921,7 @@
                   <a:sym typeface="Helvetica"/>
                 </a:defRPr>
               </a:pPr>
+              <a:endParaRPr/>
             </a:p>
           </p:txBody>
         </p:sp>
@@ -1936,7 +1947,7 @@
             <a:effectLst/>
             <a:extLst>
               <a:ext uri="{C572A759-6A51-4108-AA02-DFA0A04FC94B}">
-                <ma14:wrappingTextBoxFlag xmlns:ma14="http://schemas.microsoft.com/office/mac/drawingml/2011/main" val="1"/>
+                <ma14:wrappingTextBoxFlag xmlns:ma14="http://schemas.microsoft.com/office/mac/drawingml/2011/main" xmlns="" val="1"/>
               </a:ext>
             </a:extLst>
           </p:spPr>
@@ -1950,7 +1961,7 @@
                 <a:defRPr sz="1800"/>
               </a:pPr>
               <a:r>
-                <a:rPr b="1" sz="2700">
+                <a:rPr sz="2700" b="1">
                   <a:solidFill>
                     <a:srgbClr val="FFFFFF"/>
                   </a:solidFill>
@@ -1959,19 +1970,7 @@
                   <a:cs typeface="+mj-cs"/>
                   <a:sym typeface="Helvetica"/>
                 </a:rPr>
-                <a:t>DA</a:t>
-              </a:r>
-              <a:r>
-                <a:rPr b="1" sz="2700">
-                  <a:solidFill>
-                    <a:srgbClr val="FFFFFF"/>
-                  </a:solidFill>
-                  <a:latin typeface="+mj-lt"/>
-                  <a:ea typeface="+mj-ea"/>
-                  <a:cs typeface="+mj-cs"/>
-                  <a:sym typeface="Helvetica"/>
-                </a:rPr>
-                <a:t>O</a:t>
+                <a:t>DAO</a:t>
               </a:r>
             </a:p>
           </p:txBody>
@@ -2006,8 +2005,8 @@
               <a:avLst/>
             </a:prstGeom>
             <a:blipFill rotWithShape="1">
-              <a:blip r:embed="rId2"/>
-              <a:srcRect l="0" t="0" r="0" b="0"/>
+              <a:blip r:embed="rId2" cstate="print"/>
+              <a:srcRect/>
               <a:tile tx="0" ty="0" sx="100000" sy="100000" flip="none" algn="tl"/>
             </a:blipFill>
             <a:ln w="12700" cap="flat">
@@ -2015,7 +2014,7 @@
               <a:miter lim="400000"/>
             </a:ln>
             <a:effectLst>
-              <a:outerShdw sx="100000" sy="100000" kx="0" ky="0" algn="b" rotWithShape="0" blurRad="38100" dist="25400" dir="5400000">
+              <a:outerShdw blurRad="38100" dist="25400" dir="5400000" rotWithShape="0">
                 <a:srgbClr val="000000">
                   <a:alpha val="50000"/>
                 </a:srgbClr>
@@ -2036,6 +2035,7 @@
                   <a:sym typeface="Helvetica"/>
                 </a:defRPr>
               </a:pPr>
+              <a:endParaRPr/>
             </a:p>
           </p:txBody>
         </p:sp>
@@ -2061,7 +2061,7 @@
             <a:effectLst/>
             <a:extLst>
               <a:ext uri="{C572A759-6A51-4108-AA02-DFA0A04FC94B}">
-                <ma14:wrappingTextBoxFlag xmlns:ma14="http://schemas.microsoft.com/office/mac/drawingml/2011/main" val="1"/>
+                <ma14:wrappingTextBoxFlag xmlns:ma14="http://schemas.microsoft.com/office/mac/drawingml/2011/main" xmlns="" val="1"/>
               </a:ext>
             </a:extLst>
           </p:spPr>
@@ -2071,7 +2071,7 @@
             </a:bodyPr>
             <a:lstStyle>
               <a:lvl1pPr>
-                <a:defRPr b="1" sz="2700">
+                <a:defRPr sz="2700" b="1">
                   <a:solidFill>
                     <a:srgbClr val="FFFFFF"/>
                   </a:solidFill>
@@ -2084,14 +2084,14 @@
             </a:lstStyle>
             <a:p>
               <a:pPr lvl="0">
-                <a:defRPr b="0" sz="1800">
+                <a:defRPr sz="1800" b="0">
                   <a:solidFill>
                     <a:srgbClr val="000000"/>
                   </a:solidFill>
                 </a:defRPr>
               </a:pPr>
               <a:r>
-                <a:rPr b="1" sz="2700">
+                <a:rPr sz="2700" b="1">
                   <a:solidFill>
                     <a:srgbClr val="FFFFFF"/>
                   </a:solidFill>
@@ -2131,8 +2131,8 @@
               <a:avLst/>
             </a:prstGeom>
             <a:blipFill rotWithShape="1">
-              <a:blip r:embed="rId2"/>
-              <a:srcRect l="0" t="0" r="0" b="0"/>
+              <a:blip r:embed="rId2" cstate="print"/>
+              <a:srcRect/>
               <a:tile tx="0" ty="0" sx="100000" sy="100000" flip="none" algn="tl"/>
             </a:blipFill>
             <a:ln w="12700" cap="flat">
@@ -2140,7 +2140,7 @@
               <a:miter lim="400000"/>
             </a:ln>
             <a:effectLst>
-              <a:outerShdw sx="100000" sy="100000" kx="0" ky="0" algn="b" rotWithShape="0" blurRad="38100" dist="25400" dir="5400000">
+              <a:outerShdw blurRad="38100" dist="25400" dir="5400000" rotWithShape="0">
                 <a:srgbClr val="000000">
                   <a:alpha val="50000"/>
                 </a:srgbClr>
@@ -2161,6 +2161,7 @@
                   <a:sym typeface="Helvetica"/>
                 </a:defRPr>
               </a:pPr>
+              <a:endParaRPr/>
             </a:p>
           </p:txBody>
         </p:sp>
@@ -2186,7 +2187,7 @@
             <a:effectLst/>
             <a:extLst>
               <a:ext uri="{C572A759-6A51-4108-AA02-DFA0A04FC94B}">
-                <ma14:wrappingTextBoxFlag xmlns:ma14="http://schemas.microsoft.com/office/mac/drawingml/2011/main" val="1"/>
+                <ma14:wrappingTextBoxFlag xmlns:ma14="http://schemas.microsoft.com/office/mac/drawingml/2011/main" xmlns="" val="1"/>
               </a:ext>
             </a:extLst>
           </p:spPr>
@@ -2196,7 +2197,7 @@
             </a:bodyPr>
             <a:lstStyle>
               <a:lvl1pPr>
-                <a:defRPr b="1" sz="2700">
+                <a:defRPr sz="2700" b="1">
                   <a:solidFill>
                     <a:srgbClr val="FFFFFF"/>
                   </a:solidFill>
@@ -2209,14 +2210,14 @@
             </a:lstStyle>
             <a:p>
               <a:pPr lvl="0">
-                <a:defRPr b="0" sz="1800">
+                <a:defRPr sz="1800" b="0">
                   <a:solidFill>
                     <a:srgbClr val="000000"/>
                   </a:solidFill>
                 </a:defRPr>
               </a:pPr>
               <a:r>
-                <a:rPr b="1" sz="2700">
+                <a:rPr sz="2700" b="1">
                   <a:solidFill>
                     <a:srgbClr val="FFFFFF"/>
                   </a:solidFill>
@@ -2256,8 +2257,8 @@
               <a:avLst/>
             </a:prstGeom>
             <a:blipFill rotWithShape="1">
-              <a:blip r:embed="rId2"/>
-              <a:srcRect l="0" t="0" r="0" b="0"/>
+              <a:blip r:embed="rId2" cstate="print"/>
+              <a:srcRect/>
               <a:tile tx="0" ty="0" sx="100000" sy="100000" flip="none" algn="tl"/>
             </a:blipFill>
             <a:ln w="12700" cap="flat">
@@ -2265,7 +2266,7 @@
               <a:miter lim="400000"/>
             </a:ln>
             <a:effectLst>
-              <a:outerShdw sx="100000" sy="100000" kx="0" ky="0" algn="b" rotWithShape="0" blurRad="38100" dist="25400" dir="5400000">
+              <a:outerShdw blurRad="38100" dist="25400" dir="5400000" rotWithShape="0">
                 <a:srgbClr val="000000">
                   <a:alpha val="50000"/>
                 </a:srgbClr>
@@ -2279,7 +2280,7 @@
             <a:lstStyle/>
             <a:p>
               <a:pPr lvl="0">
-                <a:defRPr b="1" sz="2700">
+                <a:defRPr sz="2700" b="1">
                   <a:solidFill>
                     <a:srgbClr val="FFFFFF"/>
                   </a:solidFill>
@@ -2289,6 +2290,7 @@
                   <a:sym typeface="Helvetica"/>
                 </a:defRPr>
               </a:pPr>
+              <a:endParaRPr/>
             </a:p>
           </p:txBody>
         </p:sp>
@@ -2314,7 +2316,7 @@
             <a:effectLst/>
             <a:extLst>
               <a:ext uri="{C572A759-6A51-4108-AA02-DFA0A04FC94B}">
-                <ma14:wrappingTextBoxFlag xmlns:ma14="http://schemas.microsoft.com/office/mac/drawingml/2011/main" val="1"/>
+                <ma14:wrappingTextBoxFlag xmlns:ma14="http://schemas.microsoft.com/office/mac/drawingml/2011/main" xmlns="" val="1"/>
               </a:ext>
             </a:extLst>
           </p:spPr>
@@ -2328,7 +2330,7 @@
                 <a:defRPr sz="1800"/>
               </a:pPr>
               <a:r>
-                <a:rPr b="1" sz="2700">
+                <a:rPr sz="2700" b="1">
                   <a:solidFill>
                     <a:srgbClr val="FFFFFF"/>
                   </a:solidFill>
@@ -2337,19 +2339,7 @@
                   <a:cs typeface="+mj-cs"/>
                   <a:sym typeface="Helvetica"/>
                 </a:rPr>
-                <a:t>LOGI</a:t>
-              </a:r>
-              <a:r>
-                <a:rPr b="1" sz="2700">
-                  <a:solidFill>
-                    <a:srgbClr val="FFFFFF"/>
-                  </a:solidFill>
-                  <a:latin typeface="+mj-lt"/>
-                  <a:ea typeface="+mj-ea"/>
-                  <a:cs typeface="+mj-cs"/>
-                  <a:sym typeface="Helvetica"/>
-                </a:rPr>
-                <a:t>K</a:t>
+                <a:t>LOGIK</a:t>
               </a:r>
             </a:p>
           </p:txBody>
@@ -2384,8 +2374,8 @@
               <a:avLst/>
             </a:prstGeom>
             <a:blipFill rotWithShape="1">
-              <a:blip r:embed="rId2"/>
-              <a:srcRect l="0" t="0" r="0" b="0"/>
+              <a:blip r:embed="rId2" cstate="print"/>
+              <a:srcRect/>
               <a:tile tx="0" ty="0" sx="100000" sy="100000" flip="none" algn="tl"/>
             </a:blipFill>
             <a:ln w="12700" cap="flat">
@@ -2393,7 +2383,7 @@
               <a:miter lim="400000"/>
             </a:ln>
             <a:effectLst>
-              <a:outerShdw sx="100000" sy="100000" kx="0" ky="0" algn="b" rotWithShape="0" blurRad="38100" dist="25400" dir="5400000">
+              <a:outerShdw blurRad="38100" dist="25400" dir="5400000" rotWithShape="0">
                 <a:srgbClr val="000000">
                   <a:alpha val="50000"/>
                 </a:srgbClr>
@@ -2414,6 +2404,7 @@
                   <a:sym typeface="Helvetica"/>
                 </a:defRPr>
               </a:pPr>
+              <a:endParaRPr/>
             </a:p>
           </p:txBody>
         </p:sp>
@@ -2439,7 +2430,7 @@
             <a:effectLst/>
             <a:extLst>
               <a:ext uri="{C572A759-6A51-4108-AA02-DFA0A04FC94B}">
-                <ma14:wrappingTextBoxFlag xmlns:ma14="http://schemas.microsoft.com/office/mac/drawingml/2011/main" val="1"/>
+                <ma14:wrappingTextBoxFlag xmlns:ma14="http://schemas.microsoft.com/office/mac/drawingml/2011/main" xmlns="" val="1"/>
               </a:ext>
             </a:extLst>
           </p:spPr>
@@ -2449,7 +2440,7 @@
             </a:bodyPr>
             <a:lstStyle>
               <a:lvl1pPr>
-                <a:defRPr b="1" sz="2700">
+                <a:defRPr sz="2700" b="1">
                   <a:solidFill>
                     <a:srgbClr val="FFFFFF"/>
                   </a:solidFill>
@@ -2462,14 +2453,14 @@
             </a:lstStyle>
             <a:p>
               <a:pPr lvl="0">
-                <a:defRPr b="0" sz="1800">
+                <a:defRPr sz="1800" b="0">
                   <a:solidFill>
                     <a:srgbClr val="000000"/>
                   </a:solidFill>
                 </a:defRPr>
               </a:pPr>
               <a:r>
-                <a:rPr b="1" sz="2700">
+                <a:rPr sz="2700" b="1">
                   <a:solidFill>
                     <a:srgbClr val="FFFFFF"/>
                   </a:solidFill>
@@ -2512,7 +2503,7 @@
             <a:miter lim="400000"/>
           </a:ln>
           <a:effectLst>
-            <a:outerShdw sx="100000" sy="100000" kx="0" ky="0" algn="b" rotWithShape="0" blurRad="38100" dist="25400" dir="5400000">
+            <a:outerShdw blurRad="38100" dist="25400" dir="5400000" rotWithShape="0">
               <a:srgbClr val="000000">
                 <a:alpha val="50000"/>
               </a:srgbClr>
@@ -2526,6 +2517,7 @@
             <a:pPr lvl="0">
               <a:defRPr sz="2400"/>
             </a:pPr>
+            <a:endParaRPr/>
           </a:p>
         </p:txBody>
       </p:sp>
@@ -2561,7 +2553,7 @@
             <a:miter lim="400000"/>
           </a:ln>
           <a:effectLst>
-            <a:outerShdw sx="100000" sy="100000" kx="0" ky="0" algn="b" rotWithShape="0" blurRad="38100" dist="25400" dir="5400000">
+            <a:outerShdw blurRad="38100" dist="25400" dir="5400000" rotWithShape="0">
               <a:srgbClr val="000000">
                 <a:alpha val="50000"/>
               </a:srgbClr>
@@ -2575,6 +2567,7 @@
             <a:pPr lvl="0">
               <a:defRPr sz="2400"/>
             </a:pPr>
+            <a:endParaRPr/>
           </a:p>
         </p:txBody>
       </p:sp>
@@ -2610,7 +2603,7 @@
             <a:miter lim="400000"/>
           </a:ln>
           <a:effectLst>
-            <a:outerShdw sx="100000" sy="100000" kx="0" ky="0" algn="b" rotWithShape="0" blurRad="38100" dist="25400" dir="5400000">
+            <a:outerShdw blurRad="38100" dist="25400" dir="5400000" rotWithShape="0">
               <a:srgbClr val="000000">
                 <a:alpha val="50000"/>
               </a:srgbClr>
@@ -2624,6 +2617,7 @@
             <a:pPr lvl="0">
               <a:defRPr sz="2400"/>
             </a:pPr>
+            <a:endParaRPr/>
           </a:p>
         </p:txBody>
       </p:sp>
@@ -2656,8 +2650,8 @@
               <a:avLst/>
             </a:prstGeom>
             <a:blipFill rotWithShape="1">
-              <a:blip r:embed="rId2"/>
-              <a:srcRect l="0" t="0" r="0" b="0"/>
+              <a:blip r:embed="rId2" cstate="print"/>
+              <a:srcRect/>
               <a:tile tx="0" ty="0" sx="100000" sy="100000" flip="none" algn="tl"/>
             </a:blipFill>
             <a:ln w="12700" cap="flat">
@@ -2665,7 +2659,7 @@
               <a:miter lim="400000"/>
             </a:ln>
             <a:effectLst>
-              <a:outerShdw sx="100000" sy="100000" kx="0" ky="0" algn="b" rotWithShape="0" blurRad="38100" dist="25400" dir="5400000">
+              <a:outerShdw blurRad="38100" dist="25400" dir="5400000" rotWithShape="0">
                 <a:srgbClr val="000000">
                   <a:alpha val="50000"/>
                 </a:srgbClr>
@@ -2686,6 +2680,7 @@
                   <a:sym typeface="Helvetica"/>
                 </a:defRPr>
               </a:pPr>
+              <a:endParaRPr/>
             </a:p>
           </p:txBody>
         </p:sp>
@@ -2711,7 +2706,7 @@
             <a:effectLst/>
             <a:extLst>
               <a:ext uri="{C572A759-6A51-4108-AA02-DFA0A04FC94B}">
-                <ma14:wrappingTextBoxFlag xmlns:ma14="http://schemas.microsoft.com/office/mac/drawingml/2011/main" val="1"/>
+                <ma14:wrappingTextBoxFlag xmlns:ma14="http://schemas.microsoft.com/office/mac/drawingml/2011/main" xmlns="" val="1"/>
               </a:ext>
             </a:extLst>
           </p:spPr>
@@ -2721,7 +2716,7 @@
             </a:bodyPr>
             <a:lstStyle>
               <a:lvl1pPr>
-                <a:defRPr b="1" sz="2700">
+                <a:defRPr sz="2700" b="1">
                   <a:solidFill>
                     <a:srgbClr val="FFFFFF"/>
                   </a:solidFill>
@@ -2734,14 +2729,14 @@
             </a:lstStyle>
             <a:p>
               <a:pPr lvl="0">
-                <a:defRPr b="0" sz="1800">
+                <a:defRPr sz="1800" b="0">
                   <a:solidFill>
                     <a:srgbClr val="000000"/>
                   </a:solidFill>
                 </a:defRPr>
               </a:pPr>
               <a:r>
-                <a:rPr b="1" sz="2700">
+                <a:rPr sz="2700" b="1">
                   <a:solidFill>
                     <a:srgbClr val="FFFFFF"/>
                   </a:solidFill>
@@ -2781,8 +2776,8 @@
               <a:avLst/>
             </a:prstGeom>
             <a:blipFill rotWithShape="1">
-              <a:blip r:embed="rId2"/>
-              <a:srcRect l="0" t="0" r="0" b="0"/>
+              <a:blip r:embed="rId2" cstate="print"/>
+              <a:srcRect/>
               <a:tile tx="0" ty="0" sx="100000" sy="100000" flip="none" algn="tl"/>
             </a:blipFill>
             <a:ln w="12700" cap="flat">
@@ -2790,7 +2785,7 @@
               <a:miter lim="400000"/>
             </a:ln>
             <a:effectLst>
-              <a:outerShdw sx="100000" sy="100000" kx="0" ky="0" algn="b" rotWithShape="0" blurRad="38100" dist="25400" dir="5400000">
+              <a:outerShdw blurRad="38100" dist="25400" dir="5400000" rotWithShape="0">
                 <a:srgbClr val="000000">
                   <a:alpha val="50000"/>
                 </a:srgbClr>
@@ -2811,6 +2806,7 @@
                   <a:sym typeface="Helvetica"/>
                 </a:defRPr>
               </a:pPr>
+              <a:endParaRPr/>
             </a:p>
           </p:txBody>
         </p:sp>
@@ -2836,7 +2832,7 @@
             <a:effectLst/>
             <a:extLst>
               <a:ext uri="{C572A759-6A51-4108-AA02-DFA0A04FC94B}">
-                <ma14:wrappingTextBoxFlag xmlns:ma14="http://schemas.microsoft.com/office/mac/drawingml/2011/main" val="1"/>
+                <ma14:wrappingTextBoxFlag xmlns:ma14="http://schemas.microsoft.com/office/mac/drawingml/2011/main" xmlns="" val="1"/>
               </a:ext>
             </a:extLst>
           </p:spPr>
@@ -2846,7 +2842,7 @@
             </a:bodyPr>
             <a:lstStyle>
               <a:lvl1pPr>
-                <a:defRPr b="1" sz="2700">
+                <a:defRPr sz="2700" b="1">
                   <a:solidFill>
                     <a:srgbClr val="FFFFFF"/>
                   </a:solidFill>
@@ -2859,14 +2855,14 @@
             </a:lstStyle>
             <a:p>
               <a:pPr lvl="0">
-                <a:defRPr b="0" sz="1800">
+                <a:defRPr sz="1800" b="0">
                   <a:solidFill>
                     <a:srgbClr val="000000"/>
                   </a:solidFill>
                 </a:defRPr>
               </a:pPr>
               <a:r>
-                <a:rPr b="1" sz="2700">
+                <a:rPr sz="2700" b="1">
                   <a:solidFill>
                     <a:srgbClr val="FFFFFF"/>
                   </a:solidFill>
@@ -2885,7 +2881,7 @@
         </p:nvGrpSpPr>
         <p:grpSpPr>
           <a:xfrm>
-            <a:off x="5805139" y="5047207"/>
+            <a:off x="5638304" y="5047207"/>
             <a:ext cx="2109045" cy="1485604"/>
             <a:chOff x="0" y="0"/>
             <a:chExt cx="2109043" cy="1485603"/>
@@ -2906,8 +2902,8 @@
               <a:avLst/>
             </a:prstGeom>
             <a:blipFill rotWithShape="1">
-              <a:blip r:embed="rId2"/>
-              <a:srcRect l="0" t="0" r="0" b="0"/>
+              <a:blip r:embed="rId2" cstate="print"/>
+              <a:srcRect/>
               <a:tile tx="0" ty="0" sx="100000" sy="100000" flip="none" algn="tl"/>
             </a:blipFill>
             <a:ln w="12700" cap="flat">
@@ -2915,7 +2911,7 @@
               <a:miter lim="400000"/>
             </a:ln>
             <a:effectLst>
-              <a:outerShdw sx="100000" sy="100000" kx="0" ky="0" algn="b" rotWithShape="0" blurRad="38100" dist="25400" dir="5400000">
+              <a:outerShdw blurRad="38100" dist="25400" dir="5400000" rotWithShape="0">
                 <a:srgbClr val="000000">
                   <a:alpha val="50000"/>
                 </a:srgbClr>
@@ -2936,6 +2932,7 @@
                   <a:sym typeface="Helvetica"/>
                 </a:defRPr>
               </a:pPr>
+              <a:endParaRPr/>
             </a:p>
           </p:txBody>
         </p:sp>
@@ -2961,7 +2958,7 @@
             <a:effectLst/>
             <a:extLst>
               <a:ext uri="{C572A759-6A51-4108-AA02-DFA0A04FC94B}">
-                <ma14:wrappingTextBoxFlag xmlns:ma14="http://schemas.microsoft.com/office/mac/drawingml/2011/main" val="1"/>
+                <ma14:wrappingTextBoxFlag xmlns:ma14="http://schemas.microsoft.com/office/mac/drawingml/2011/main" xmlns="" val="1"/>
               </a:ext>
             </a:extLst>
           </p:spPr>
@@ -2971,7 +2968,7 @@
             </a:bodyPr>
             <a:lstStyle>
               <a:lvl1pPr>
-                <a:defRPr b="1" sz="2700">
+                <a:defRPr sz="2700" b="1">
                   <a:solidFill>
                     <a:srgbClr val="FFFFFF"/>
                   </a:solidFill>
@@ -2984,14 +2981,14 @@
             </a:lstStyle>
             <a:p>
               <a:pPr lvl="0">
-                <a:defRPr b="0" sz="1800">
+                <a:defRPr sz="1800" b="0">
                   <a:solidFill>
                     <a:srgbClr val="000000"/>
                   </a:solidFill>
                 </a:defRPr>
               </a:pPr>
               <a:r>
-                <a:rPr b="1" sz="2700">
+                <a:rPr sz="2700" b="1" dirty="0">
                   <a:solidFill>
                     <a:srgbClr val="FFFFFF"/>
                   </a:solidFill>
@@ -3010,8 +3007,8 @@
         </p:nvSpPr>
         <p:spPr>
           <a:xfrm rot="16200000">
-            <a:off x="5591781" y="7060209"/>
-            <a:ext cx="2545164" cy="720875"/>
+            <a:off x="6181033" y="6304123"/>
+            <a:ext cx="1032991" cy="720875"/>
           </a:xfrm>
           <a:prstGeom prst="leftRightArrow">
             <a:avLst>
@@ -3034,7 +3031,7 @@
             <a:miter lim="400000"/>
           </a:ln>
           <a:effectLst>
-            <a:outerShdw sx="100000" sy="100000" kx="0" ky="0" algn="b" rotWithShape="0" blurRad="38100" dist="25400" dir="5400000">
+            <a:outerShdw blurRad="38100" dist="25400" dir="5400000" rotWithShape="0">
               <a:srgbClr val="000000">
                 <a:alpha val="50000"/>
               </a:srgbClr>
@@ -3048,6 +3045,7 @@
             <a:pPr lvl="0">
               <a:defRPr sz="2400"/>
             </a:pPr>
+            <a:endParaRPr/>
           </a:p>
         </p:txBody>
       </p:sp>
@@ -3059,8 +3057,8 @@
         </p:nvSpPr>
         <p:spPr>
           <a:xfrm rot="16200000">
-            <a:off x="3037557" y="7060207"/>
-            <a:ext cx="2545160" cy="720875"/>
+            <a:off x="3793641" y="6304124"/>
+            <a:ext cx="1032993" cy="720875"/>
           </a:xfrm>
           <a:prstGeom prst="leftRightArrow">
             <a:avLst>
@@ -3083,7 +3081,7 @@
             <a:miter lim="400000"/>
           </a:ln>
           <a:effectLst>
-            <a:outerShdw sx="100000" sy="100000" kx="0" ky="0" algn="b" rotWithShape="0" blurRad="38100" dist="25400" dir="5400000">
+            <a:outerShdw blurRad="38100" dist="25400" dir="5400000" rotWithShape="0">
               <a:srgbClr val="000000">
                 <a:alpha val="50000"/>
               </a:srgbClr>
@@ -3097,6 +3095,7 @@
             <a:pPr lvl="0">
               <a:defRPr sz="2400"/>
             </a:pPr>
+            <a:endParaRPr/>
           </a:p>
         </p:txBody>
       </p:sp>
@@ -3108,8 +3107,8 @@
         </p:nvSpPr>
         <p:spPr>
           <a:xfrm rot="16200000">
-            <a:off x="483331" y="7060207"/>
-            <a:ext cx="2545161" cy="720875"/>
+            <a:off x="1239416" y="6304122"/>
+            <a:ext cx="1032992" cy="720875"/>
           </a:xfrm>
           <a:prstGeom prst="leftRightArrow">
             <a:avLst>
@@ -3132,7 +3131,7 @@
             <a:miter lim="400000"/>
           </a:ln>
           <a:effectLst>
-            <a:outerShdw sx="100000" sy="100000" kx="0" ky="0" algn="b" rotWithShape="0" blurRad="38100" dist="25400" dir="5400000">
+            <a:outerShdw blurRad="38100" dist="25400" dir="5400000" rotWithShape="0">
               <a:srgbClr val="000000">
                 <a:alpha val="50000"/>
               </a:srgbClr>
@@ -3146,6 +3145,7 @@
             <a:pPr lvl="0">
               <a:defRPr sz="2400"/>
             </a:pPr>
+            <a:endParaRPr/>
           </a:p>
         </p:txBody>
       </p:sp>
@@ -3178,8 +3178,8 @@
               <a:avLst/>
             </a:prstGeom>
             <a:blipFill rotWithShape="1">
-              <a:blip r:embed="rId2"/>
-              <a:srcRect l="0" t="0" r="0" b="0"/>
+              <a:blip r:embed="rId2" cstate="print"/>
+              <a:srcRect/>
               <a:tile tx="0" ty="0" sx="100000" sy="100000" flip="none" algn="tl"/>
             </a:blipFill>
             <a:ln w="12700" cap="flat">
@@ -3187,7 +3187,7 @@
               <a:miter lim="400000"/>
             </a:ln>
             <a:effectLst>
-              <a:outerShdw sx="100000" sy="100000" kx="0" ky="0" algn="b" rotWithShape="0" blurRad="38100" dist="25400" dir="5400000">
+              <a:outerShdw blurRad="38100" dist="25400" dir="5400000" rotWithShape="0">
                 <a:srgbClr val="000000">
                   <a:alpha val="50000"/>
                 </a:srgbClr>
@@ -3208,6 +3208,7 @@
                   <a:sym typeface="Helvetica"/>
                 </a:defRPr>
               </a:pPr>
+              <a:endParaRPr/>
             </a:p>
           </p:txBody>
         </p:sp>
@@ -3233,7 +3234,7 @@
             <a:effectLst/>
             <a:extLst>
               <a:ext uri="{C572A759-6A51-4108-AA02-DFA0A04FC94B}">
-                <ma14:wrappingTextBoxFlag xmlns:ma14="http://schemas.microsoft.com/office/mac/drawingml/2011/main" val="1"/>
+                <ma14:wrappingTextBoxFlag xmlns:ma14="http://schemas.microsoft.com/office/mac/drawingml/2011/main" xmlns="" val="1"/>
               </a:ext>
             </a:extLst>
           </p:spPr>
@@ -3243,7 +3244,7 @@
             </a:bodyPr>
             <a:lstStyle>
               <a:lvl1pPr>
-                <a:defRPr b="1" sz="2700">
+                <a:defRPr sz="2700" b="1">
                   <a:solidFill>
                     <a:srgbClr val="FFFFFF"/>
                   </a:solidFill>
@@ -3256,14 +3257,14 @@
             </a:lstStyle>
             <a:p>
               <a:pPr lvl="0">
-                <a:defRPr b="0" sz="1800">
+                <a:defRPr sz="1800" b="0">
                   <a:solidFill>
                     <a:srgbClr val="000000"/>
                   </a:solidFill>
                 </a:defRPr>
               </a:pPr>
               <a:r>
-                <a:rPr b="1" sz="2700">
+                <a:rPr sz="2700" b="1">
                   <a:solidFill>
                     <a:srgbClr val="FFFFFF"/>
                   </a:solidFill>
@@ -3306,7 +3307,7 @@
             <a:miter lim="400000"/>
           </a:ln>
           <a:effectLst>
-            <a:outerShdw sx="100000" sy="100000" kx="0" ky="0" algn="b" rotWithShape="0" blurRad="38100" dist="25400" dir="5400000">
+            <a:outerShdw blurRad="38100" dist="25400" dir="5400000" rotWithShape="0">
               <a:srgbClr val="000000">
                 <a:alpha val="50000"/>
               </a:srgbClr>
@@ -3320,6 +3321,7 @@
             <a:pPr lvl="0">
               <a:defRPr sz="2400"/>
             </a:pPr>
+            <a:endParaRPr/>
           </a:p>
         </p:txBody>
       </p:sp>
@@ -3331,7 +3333,7 @@
         </p:nvSpPr>
         <p:spPr>
           <a:xfrm rot="16200000">
-            <a:off x="6192006" y="4278883"/>
+            <a:off x="6025171" y="4278883"/>
             <a:ext cx="1325912" cy="720875"/>
           </a:xfrm>
           <a:prstGeom prst="leftRightArrow">
@@ -3355,7 +3357,7 @@
             <a:miter lim="400000"/>
           </a:ln>
           <a:effectLst>
-            <a:outerShdw sx="100000" sy="100000" kx="0" ky="0" algn="b" rotWithShape="0" blurRad="38100" dist="25400" dir="5400000">
+            <a:outerShdw blurRad="38100" dist="25400" dir="5400000" rotWithShape="0">
               <a:srgbClr val="000000">
                 <a:alpha val="50000"/>
               </a:srgbClr>
@@ -3369,6 +3371,7 @@
             <a:pPr lvl="0">
               <a:defRPr sz="2400"/>
             </a:pPr>
+            <a:endParaRPr/>
           </a:p>
         </p:txBody>
       </p:sp>
@@ -3404,7 +3407,7 @@
             <a:miter lim="400000"/>
           </a:ln>
           <a:effectLst>
-            <a:outerShdw sx="100000" sy="100000" kx="0" ky="0" algn="b" rotWithShape="0" blurRad="38100" dist="25400" dir="5400000">
+            <a:outerShdw blurRad="38100" dist="25400" dir="5400000" rotWithShape="0">
               <a:srgbClr val="000000">
                 <a:alpha val="50000"/>
               </a:srgbClr>
@@ -3418,6 +3421,7 @@
             <a:pPr lvl="0">
               <a:defRPr sz="2400"/>
             </a:pPr>
+            <a:endParaRPr/>
           </a:p>
         </p:txBody>
       </p:sp>
@@ -3453,7 +3457,7 @@
             <a:miter lim="400000"/>
           </a:ln>
           <a:effectLst>
-            <a:outerShdw sx="100000" sy="100000" kx="0" ky="0" algn="b" rotWithShape="0" blurRad="38100" dist="25400" dir="5400000">
+            <a:outerShdw blurRad="38100" dist="25400" dir="5400000" rotWithShape="0">
               <a:srgbClr val="000000">
                 <a:alpha val="50000"/>
               </a:srgbClr>
@@ -3467,6 +3471,7 @@
             <a:pPr lvl="0">
               <a:defRPr sz="2400"/>
             </a:pPr>
+            <a:endParaRPr/>
           </a:p>
         </p:txBody>
       </p:sp>
@@ -3489,7 +3494,7 @@
           </a:ln>
           <a:extLst>
             <a:ext uri="{C572A759-6A51-4108-AA02-DFA0A04FC94B}">
-              <ma14:wrappingTextBoxFlag xmlns:ma14="http://schemas.microsoft.com/office/mac/drawingml/2011/main" val="1"/>
+              <ma14:wrappingTextBoxFlag xmlns:ma14="http://schemas.microsoft.com/office/mac/drawingml/2011/main" xmlns="" val="1"/>
             </a:ext>
           </a:extLst>
         </p:spPr>
@@ -3528,7 +3533,7 @@
           </a:ln>
           <a:extLst>
             <a:ext uri="{C572A759-6A51-4108-AA02-DFA0A04FC94B}">
-              <ma14:wrappingTextBoxFlag xmlns:ma14="http://schemas.microsoft.com/office/mac/drawingml/2011/main" val="1"/>
+              <ma14:wrappingTextBoxFlag xmlns:ma14="http://schemas.microsoft.com/office/mac/drawingml/2011/main" xmlns="" val="1"/>
             </a:ext>
           </a:extLst>
         </p:spPr>
@@ -3556,8 +3561,8 @@
         </p:nvSpPr>
         <p:spPr>
           <a:xfrm rot="16200000">
-            <a:off x="9851169" y="7792726"/>
-            <a:ext cx="1368153" cy="720875"/>
+            <a:off x="6214768" y="7828730"/>
+            <a:ext cx="1008112" cy="720875"/>
           </a:xfrm>
           <a:prstGeom prst="leftRightArrow">
             <a:avLst>
@@ -3580,7 +3585,7 @@
             <a:miter lim="400000"/>
           </a:ln>
           <a:effectLst>
-            <a:outerShdw sx="100000" sy="100000" kx="0" ky="0" algn="b" rotWithShape="0" blurRad="38100" dist="25400" dir="5400000">
+            <a:outerShdw blurRad="38100" dist="25400" dir="5400000" rotWithShape="0">
               <a:srgbClr val="000000">
                 <a:alpha val="50000"/>
               </a:srgbClr>
@@ -3594,6 +3599,7 @@
             <a:pPr lvl="0">
               <a:defRPr sz="2400"/>
             </a:pPr>
+            <a:endParaRPr dirty="0"/>
           </a:p>
         </p:txBody>
       </p:sp>
@@ -3602,12 +3608,12 @@
   <p:clrMapOvr>
     <a:masterClrMapping/>
   </p:clrMapOvr>
-  <p:transition spd="med" advClick="1"/>
+  <p:transition spd="med"/>
 </p:sld>
 </file>
 
 <file path=ppt/slides/slide2.xml><?xml version="1.0" encoding="utf-8"?>
-<p:sld xmlns:a="http://schemas.openxmlformats.org/drawingml/2006/main" xmlns:r="http://schemas.openxmlformats.org/officeDocument/2006/relationships" xmlns:p="http://schemas.openxmlformats.org/presentationml/2006/main" showMasterSp="1" showMasterPhAnim="1">
+<p:sld xmlns:a="http://schemas.openxmlformats.org/drawingml/2006/main" xmlns:r="http://schemas.openxmlformats.org/officeDocument/2006/relationships" xmlns:p="http://schemas.openxmlformats.org/presentationml/2006/main">
   <p:cSld>
     <p:spTree>
       <p:nvGrpSpPr>
@@ -3652,8 +3658,8 @@
               <a:avLst/>
             </a:prstGeom>
             <a:blipFill rotWithShape="1">
-              <a:blip r:embed="rId2"/>
-              <a:srcRect l="0" t="0" r="0" b="0"/>
+              <a:blip r:embed="rId2" cstate="print"/>
+              <a:srcRect/>
               <a:tile tx="0" ty="0" sx="100000" sy="100000" flip="none" algn="tl"/>
             </a:blipFill>
             <a:ln w="12700" cap="flat">
@@ -3661,7 +3667,7 @@
               <a:miter lim="400000"/>
             </a:ln>
             <a:effectLst>
-              <a:outerShdw sx="100000" sy="100000" kx="0" ky="0" algn="b" rotWithShape="0" blurRad="38100" dist="25400" dir="5400000">
+              <a:outerShdw blurRad="38100" dist="25400" dir="5400000" rotWithShape="0">
                 <a:srgbClr val="000000">
                   <a:alpha val="50000"/>
                 </a:srgbClr>
@@ -3682,6 +3688,7 @@
                   <a:sym typeface="Helvetica"/>
                 </a:defRPr>
               </a:pPr>
+              <a:endParaRPr/>
             </a:p>
           </p:txBody>
         </p:sp>
@@ -3707,7 +3714,7 @@
             <a:effectLst/>
             <a:extLst>
               <a:ext uri="{C572A759-6A51-4108-AA02-DFA0A04FC94B}">
-                <ma14:wrappingTextBoxFlag xmlns:ma14="http://schemas.microsoft.com/office/mac/drawingml/2011/main" val="1"/>
+                <ma14:wrappingTextBoxFlag xmlns:ma14="http://schemas.microsoft.com/office/mac/drawingml/2011/main" xmlns="" val="1"/>
               </a:ext>
             </a:extLst>
           </p:spPr>
@@ -3717,7 +3724,7 @@
             </a:bodyPr>
             <a:lstStyle>
               <a:lvl1pPr>
-                <a:defRPr b="1" sz="2400">
+                <a:defRPr sz="2400" b="1">
                   <a:solidFill>
                     <a:srgbClr val="FFFFFF"/>
                   </a:solidFill>
@@ -3730,14 +3737,14 @@
             </a:lstStyle>
             <a:p>
               <a:pPr lvl="0">
-                <a:defRPr b="0" sz="1800">
+                <a:defRPr sz="1800" b="0">
                   <a:solidFill>
                     <a:srgbClr val="000000"/>
                   </a:solidFill>
                 </a:defRPr>
               </a:pPr>
               <a:r>
-                <a:rPr b="1" sz="2400">
+                <a:rPr sz="2400" b="1">
                   <a:solidFill>
                     <a:srgbClr val="FFFFFF"/>
                   </a:solidFill>
@@ -3777,8 +3784,8 @@
               <a:avLst/>
             </a:prstGeom>
             <a:blipFill rotWithShape="1">
-              <a:blip r:embed="rId2"/>
-              <a:srcRect l="0" t="0" r="0" b="0"/>
+              <a:blip r:embed="rId2" cstate="print"/>
+              <a:srcRect/>
               <a:tile tx="0" ty="0" sx="100000" sy="100000" flip="none" algn="tl"/>
             </a:blipFill>
             <a:ln w="12700" cap="flat">
@@ -3786,7 +3793,7 @@
               <a:miter lim="400000"/>
             </a:ln>
             <a:effectLst>
-              <a:outerShdw sx="100000" sy="100000" kx="0" ky="0" algn="b" rotWithShape="0" blurRad="38100" dist="25400" dir="5400000">
+              <a:outerShdw blurRad="38100" dist="25400" dir="5400000" rotWithShape="0">
                 <a:srgbClr val="000000">
                   <a:alpha val="50000"/>
                 </a:srgbClr>
@@ -3807,6 +3814,7 @@
                   <a:sym typeface="Helvetica"/>
                 </a:defRPr>
               </a:pPr>
+              <a:endParaRPr/>
             </a:p>
           </p:txBody>
         </p:sp>
@@ -3832,7 +3840,7 @@
             <a:effectLst/>
             <a:extLst>
               <a:ext uri="{C572A759-6A51-4108-AA02-DFA0A04FC94B}">
-                <ma14:wrappingTextBoxFlag xmlns:ma14="http://schemas.microsoft.com/office/mac/drawingml/2011/main" val="1"/>
+                <ma14:wrappingTextBoxFlag xmlns:ma14="http://schemas.microsoft.com/office/mac/drawingml/2011/main" xmlns="" val="1"/>
               </a:ext>
             </a:extLst>
           </p:spPr>
@@ -3842,7 +3850,7 @@
             </a:bodyPr>
             <a:lstStyle>
               <a:lvl1pPr>
-                <a:defRPr b="1" sz="2400">
+                <a:defRPr sz="2400" b="1">
                   <a:solidFill>
                     <a:srgbClr val="FFFFFF"/>
                   </a:solidFill>
@@ -3855,14 +3863,14 @@
             </a:lstStyle>
             <a:p>
               <a:pPr lvl="0">
-                <a:defRPr b="0" sz="1800">
+                <a:defRPr sz="1800" b="0">
                   <a:solidFill>
                     <a:srgbClr val="000000"/>
                   </a:solidFill>
                 </a:defRPr>
               </a:pPr>
               <a:r>
-                <a:rPr b="1" sz="2400">
+                <a:rPr sz="2400" b="1">
                   <a:solidFill>
                     <a:srgbClr val="FFFFFF"/>
                   </a:solidFill>
@@ -3902,8 +3910,8 @@
               <a:avLst/>
             </a:prstGeom>
             <a:blipFill rotWithShape="1">
-              <a:blip r:embed="rId2"/>
-              <a:srcRect l="0" t="0" r="0" b="0"/>
+              <a:blip r:embed="rId2" cstate="print"/>
+              <a:srcRect/>
               <a:tile tx="0" ty="0" sx="100000" sy="100000" flip="none" algn="tl"/>
             </a:blipFill>
             <a:ln w="12700" cap="flat">
@@ -3911,7 +3919,7 @@
               <a:miter lim="400000"/>
             </a:ln>
             <a:effectLst>
-              <a:outerShdw sx="100000" sy="100000" kx="0" ky="0" algn="b" rotWithShape="0" blurRad="38100" dist="25400" dir="5400000">
+              <a:outerShdw blurRad="38100" dist="25400" dir="5400000" rotWithShape="0">
                 <a:srgbClr val="000000">
                   <a:alpha val="50000"/>
                 </a:srgbClr>
@@ -3932,6 +3940,7 @@
                   <a:sym typeface="Helvetica"/>
                 </a:defRPr>
               </a:pPr>
+              <a:endParaRPr/>
             </a:p>
           </p:txBody>
         </p:sp>
@@ -3957,7 +3966,7 @@
             <a:effectLst/>
             <a:extLst>
               <a:ext uri="{C572A759-6A51-4108-AA02-DFA0A04FC94B}">
-                <ma14:wrappingTextBoxFlag xmlns:ma14="http://schemas.microsoft.com/office/mac/drawingml/2011/main" val="1"/>
+                <ma14:wrappingTextBoxFlag xmlns:ma14="http://schemas.microsoft.com/office/mac/drawingml/2011/main" xmlns="" val="1"/>
               </a:ext>
             </a:extLst>
           </p:spPr>
@@ -3967,7 +3976,7 @@
             </a:bodyPr>
             <a:lstStyle>
               <a:lvl1pPr>
-                <a:defRPr b="1" sz="2400">
+                <a:defRPr sz="2400" b="1">
                   <a:solidFill>
                     <a:srgbClr val="FFFFFF"/>
                   </a:solidFill>
@@ -3980,14 +3989,14 @@
             </a:lstStyle>
             <a:p>
               <a:pPr lvl="0">
-                <a:defRPr b="0" sz="1800">
+                <a:defRPr sz="1800" b="0">
                   <a:solidFill>
                     <a:srgbClr val="000000"/>
                   </a:solidFill>
                 </a:defRPr>
               </a:pPr>
               <a:r>
-                <a:rPr b="1" sz="2400">
+                <a:rPr sz="2400" b="1">
                   <a:solidFill>
                     <a:srgbClr val="FFFFFF"/>
                   </a:solidFill>
@@ -4027,8 +4036,8 @@
               <a:avLst/>
             </a:prstGeom>
             <a:blipFill rotWithShape="1">
-              <a:blip r:embed="rId2"/>
-              <a:srcRect l="0" t="0" r="0" b="0"/>
+              <a:blip r:embed="rId2" cstate="print"/>
+              <a:srcRect/>
               <a:tile tx="0" ty="0" sx="100000" sy="100000" flip="none" algn="tl"/>
             </a:blipFill>
             <a:ln w="12700" cap="flat">
@@ -4036,7 +4045,7 @@
               <a:miter lim="400000"/>
             </a:ln>
             <a:effectLst>
-              <a:outerShdw sx="100000" sy="100000" kx="0" ky="0" algn="b" rotWithShape="0" blurRad="38100" dist="25400" dir="5400000">
+              <a:outerShdw blurRad="38100" dist="25400" dir="5400000" rotWithShape="0">
                 <a:srgbClr val="000000">
                   <a:alpha val="50000"/>
                 </a:srgbClr>
@@ -4057,6 +4066,7 @@
                   <a:sym typeface="Helvetica"/>
                 </a:defRPr>
               </a:pPr>
+              <a:endParaRPr/>
             </a:p>
           </p:txBody>
         </p:sp>
@@ -4082,7 +4092,7 @@
             <a:effectLst/>
             <a:extLst>
               <a:ext uri="{C572A759-6A51-4108-AA02-DFA0A04FC94B}">
-                <ma14:wrappingTextBoxFlag xmlns:ma14="http://schemas.microsoft.com/office/mac/drawingml/2011/main" val="1"/>
+                <ma14:wrappingTextBoxFlag xmlns:ma14="http://schemas.microsoft.com/office/mac/drawingml/2011/main" xmlns="" val="1"/>
               </a:ext>
             </a:extLst>
           </p:spPr>
@@ -4092,7 +4102,7 @@
             </a:bodyPr>
             <a:lstStyle>
               <a:lvl1pPr>
-                <a:defRPr b="1" sz="2400">
+                <a:defRPr sz="2400" b="1">
                   <a:solidFill>
                     <a:srgbClr val="FFFFFF"/>
                   </a:solidFill>
@@ -4105,14 +4115,14 @@
             </a:lstStyle>
             <a:p>
               <a:pPr lvl="0">
-                <a:defRPr b="0" sz="1800">
+                <a:defRPr sz="1800" b="0">
                   <a:solidFill>
                     <a:srgbClr val="000000"/>
                   </a:solidFill>
                 </a:defRPr>
               </a:pPr>
               <a:r>
-                <a:rPr b="1" sz="2400">
+                <a:rPr sz="2400" b="1">
                   <a:solidFill>
                     <a:srgbClr val="FFFFFF"/>
                   </a:solidFill>
@@ -4155,7 +4165,7 @@
             <a:miter lim="400000"/>
           </a:ln>
           <a:effectLst>
-            <a:outerShdw sx="100000" sy="100000" kx="0" ky="0" algn="b" rotWithShape="0" blurRad="38100" dist="25400" dir="5400000">
+            <a:outerShdw blurRad="38100" dist="25400" dir="5400000" rotWithShape="0">
               <a:srgbClr val="000000">
                 <a:alpha val="50000"/>
               </a:srgbClr>
@@ -4169,6 +4179,7 @@
             <a:pPr lvl="0">
               <a:defRPr sz="2400"/>
             </a:pPr>
+            <a:endParaRPr/>
           </a:p>
         </p:txBody>
       </p:sp>
@@ -4204,7 +4215,7 @@
             <a:miter lim="400000"/>
           </a:ln>
           <a:effectLst>
-            <a:outerShdw sx="100000" sy="100000" kx="0" ky="0" algn="b" rotWithShape="0" blurRad="38100" dist="25400" dir="5400000">
+            <a:outerShdw blurRad="38100" dist="25400" dir="5400000" rotWithShape="0">
               <a:srgbClr val="000000">
                 <a:alpha val="50000"/>
               </a:srgbClr>
@@ -4218,6 +4229,7 @@
             <a:pPr lvl="0">
               <a:defRPr sz="2400"/>
             </a:pPr>
+            <a:endParaRPr/>
           </a:p>
         </p:txBody>
       </p:sp>
@@ -4253,7 +4265,7 @@
             <a:miter lim="400000"/>
           </a:ln>
           <a:effectLst>
-            <a:outerShdw sx="100000" sy="100000" kx="0" ky="0" algn="b" rotWithShape="0" blurRad="38100" dist="25400" dir="5400000">
+            <a:outerShdw blurRad="38100" dist="25400" dir="5400000" rotWithShape="0">
               <a:srgbClr val="000000">
                 <a:alpha val="50000"/>
               </a:srgbClr>
@@ -4267,6 +4279,7 @@
             <a:pPr lvl="0">
               <a:defRPr sz="2400"/>
             </a:pPr>
+            <a:endParaRPr/>
           </a:p>
         </p:txBody>
       </p:sp>
@@ -4275,12 +4288,12 @@
   <p:clrMapOvr>
     <a:masterClrMapping/>
   </p:clrMapOvr>
-  <p:transition spd="med" advClick="1"/>
+  <p:transition spd="med"/>
 </p:sld>
 </file>
 
 <file path=ppt/theme/theme1.xml><?xml version="1.0" encoding="utf-8"?>
-<a:theme xmlns:a="http://schemas.openxmlformats.org/drawingml/2006/main" xmlns:r="http://schemas.openxmlformats.org/officeDocument/2006/relationships" name="Default">
+<a:theme xmlns:a="http://schemas.openxmlformats.org/drawingml/2006/main" name="Default">
   <a:themeElements>
     <a:clrScheme name="Default">
       <a:dk1>
@@ -4406,7 +4419,7 @@
       <a:effectStyleLst>
         <a:effectStyle>
           <a:effectLst>
-            <a:outerShdw sx="100000" sy="100000" kx="0" ky="0" algn="b" rotWithShape="0" blurRad="38100" dist="25400" dir="5400000">
+            <a:outerShdw blurRad="38100" dist="25400" dir="5400000" rotWithShape="0">
               <a:srgbClr val="000000">
                 <a:alpha val="50000"/>
               </a:srgbClr>
@@ -4415,7 +4428,7 @@
         </a:effectStyle>
         <a:effectStyle>
           <a:effectLst>
-            <a:outerShdw sx="100000" sy="100000" kx="0" ky="0" algn="b" rotWithShape="0" blurRad="38100" dist="25400" dir="5400000">
+            <a:outerShdw blurRad="38100" dist="25400" dir="5400000" rotWithShape="0">
               <a:srgbClr val="000000">
                 <a:alpha val="50000"/>
               </a:srgbClr>
@@ -4424,7 +4437,7 @@
         </a:effectStyle>
         <a:effectStyle>
           <a:effectLst>
-            <a:outerShdw sx="100000" sy="100000" kx="0" ky="0" algn="b" rotWithShape="0" blurRad="38100" dist="25400" dir="5400000">
+            <a:outerShdw blurRad="38100" dist="25400" dir="5400000" rotWithShape="0">
               <a:srgbClr val="000000">
                 <a:alpha val="50000"/>
               </a:srgbClr>
@@ -4498,14 +4511,14 @@
           <a:bevel/>
         </a:ln>
         <a:effectLst>
-          <a:outerShdw sx="100000" sy="100000" kx="0" ky="0" algn="b" rotWithShape="0" blurRad="38100" dist="25400" dir="5400000">
+          <a:outerShdw blurRad="38100" dist="25400" dir="5400000" rotWithShape="0">
             <a:srgbClr val="000000">
               <a:alpha val="50000"/>
             </a:srgbClr>
           </a:outerShdw>
         </a:effectLst>
       </a:spPr>
-      <a:bodyPr rot="0" spcFirstLastPara="1" vertOverflow="overflow" horzOverflow="overflow" vert="horz" wrap="square" lIns="50800" tIns="50800" rIns="50800" bIns="50800" numCol="1" spcCol="38100" rtlCol="0" anchor="ctr" upright="0">
+      <a:bodyPr rot="0" spcFirstLastPara="1" vertOverflow="overflow" horzOverflow="overflow" vert="horz" wrap="square" lIns="50800" tIns="50800" rIns="50800" bIns="50800" numCol="1" spcCol="38100" rtlCol="0" anchor="ctr">
         <a:spAutoFit/>
       </a:bodyPr>
       <a:lstStyle>
@@ -4524,7 +4537,7 @@
           <a:buFontTx/>
           <a:buNone/>
           <a:tabLst/>
-          <a:defRPr b="0" baseline="0" cap="none" i="0" spc="0" strike="noStrike" sz="3600" u="none" kumimoji="0" normalizeH="0">
+          <a:defRPr kumimoji="0" sz="3600" b="0" i="0" u="none" strike="noStrike" cap="none" spc="0" normalizeH="0" baseline="0">
             <a:ln>
               <a:noFill/>
             </a:ln>
@@ -4554,7 +4567,7 @@
           <a:buFontTx/>
           <a:buNone/>
           <a:tabLst/>
-          <a:defRPr b="0" baseline="0" cap="none" i="0" spc="0" strike="noStrike" sz="1800" u="none" kumimoji="0" normalizeH="0">
+          <a:defRPr kumimoji="0" sz="1800" b="0" i="0" u="none" strike="noStrike" cap="none" spc="0" normalizeH="0" baseline="0">
             <a:ln>
               <a:noFill/>
             </a:ln>
@@ -4580,7 +4593,7 @@
           <a:buFontTx/>
           <a:buNone/>
           <a:tabLst/>
-          <a:defRPr b="0" baseline="0" cap="none" i="0" spc="0" strike="noStrike" sz="1800" u="none" kumimoji="0" normalizeH="0">
+          <a:defRPr kumimoji="0" sz="1800" b="0" i="0" u="none" strike="noStrike" cap="none" spc="0" normalizeH="0" baseline="0">
             <a:ln>
               <a:noFill/>
             </a:ln>
@@ -4606,7 +4619,7 @@
           <a:buFontTx/>
           <a:buNone/>
           <a:tabLst/>
-          <a:defRPr b="0" baseline="0" cap="none" i="0" spc="0" strike="noStrike" sz="1800" u="none" kumimoji="0" normalizeH="0">
+          <a:defRPr kumimoji="0" sz="1800" b="0" i="0" u="none" strike="noStrike" cap="none" spc="0" normalizeH="0" baseline="0">
             <a:ln>
               <a:noFill/>
             </a:ln>
@@ -4632,7 +4645,7 @@
           <a:buFontTx/>
           <a:buNone/>
           <a:tabLst/>
-          <a:defRPr b="0" baseline="0" cap="none" i="0" spc="0" strike="noStrike" sz="1800" u="none" kumimoji="0" normalizeH="0">
+          <a:defRPr kumimoji="0" sz="1800" b="0" i="0" u="none" strike="noStrike" cap="none" spc="0" normalizeH="0" baseline="0">
             <a:ln>
               <a:noFill/>
             </a:ln>
@@ -4658,7 +4671,7 @@
           <a:buFontTx/>
           <a:buNone/>
           <a:tabLst/>
-          <a:defRPr b="0" baseline="0" cap="none" i="0" spc="0" strike="noStrike" sz="1800" u="none" kumimoji="0" normalizeH="0">
+          <a:defRPr kumimoji="0" sz="1800" b="0" i="0" u="none" strike="noStrike" cap="none" spc="0" normalizeH="0" baseline="0">
             <a:ln>
               <a:noFill/>
             </a:ln>
@@ -4684,7 +4697,7 @@
           <a:buFontTx/>
           <a:buNone/>
           <a:tabLst/>
-          <a:defRPr b="0" baseline="0" cap="none" i="0" spc="0" strike="noStrike" sz="1800" u="none" kumimoji="0" normalizeH="0">
+          <a:defRPr kumimoji="0" sz="1800" b="0" i="0" u="none" strike="noStrike" cap="none" spc="0" normalizeH="0" baseline="0">
             <a:ln>
               <a:noFill/>
             </a:ln>
@@ -4710,7 +4723,7 @@
           <a:buFontTx/>
           <a:buNone/>
           <a:tabLst/>
-          <a:defRPr b="0" baseline="0" cap="none" i="0" spc="0" strike="noStrike" sz="1800" u="none" kumimoji="0" normalizeH="0">
+          <a:defRPr kumimoji="0" sz="1800" b="0" i="0" u="none" strike="noStrike" cap="none" spc="0" normalizeH="0" baseline="0">
             <a:ln>
               <a:noFill/>
             </a:ln>
@@ -4736,7 +4749,7 @@
           <a:buFontTx/>
           <a:buNone/>
           <a:tabLst/>
-          <a:defRPr b="0" baseline="0" cap="none" i="0" spc="0" strike="noStrike" sz="1800" u="none" kumimoji="0" normalizeH="0">
+          <a:defRPr kumimoji="0" sz="1800" b="0" i="0" u="none" strike="noStrike" cap="none" spc="0" normalizeH="0" baseline="0">
             <a:ln>
               <a:noFill/>
             </a:ln>
@@ -4762,7 +4775,7 @@
           <a:buFontTx/>
           <a:buNone/>
           <a:tabLst/>
-          <a:defRPr b="0" baseline="0" cap="none" i="0" spc="0" strike="noStrike" sz="1800" u="none" kumimoji="0" normalizeH="0">
+          <a:defRPr kumimoji="0" sz="1800" b="0" i="0" u="none" strike="noStrike" cap="none" spc="0" normalizeH="0" baseline="0">
             <a:ln>
               <a:noFill/>
             </a:ln>
@@ -4775,9 +4788,15 @@
         </a:lvl9pPr>
       </a:lstStyle>
       <a:style>
-        <a:lnRef idx="0"/>
-        <a:fillRef idx="0"/>
-        <a:effectRef idx="0"/>
+        <a:lnRef idx="0">
+          <a:scrgbClr r="0" g="0" b="0"/>
+        </a:lnRef>
+        <a:fillRef idx="0">
+          <a:scrgbClr r="0" g="0" b="0"/>
+        </a:fillRef>
+        <a:effectRef idx="0">
+          <a:scrgbClr r="0" g="0" b="0"/>
+        </a:effectRef>
         <a:fontRef idx="none"/>
       </a:style>
     </a:spDef>
@@ -4792,14 +4811,14 @@
           <a:bevel/>
         </a:ln>
         <a:effectLst>
-          <a:outerShdw sx="100000" sy="100000" kx="0" ky="0" algn="b" rotWithShape="0" blurRad="38100" dist="25400" dir="5400000">
+          <a:outerShdw blurRad="38100" dist="25400" dir="5400000" rotWithShape="0">
             <a:srgbClr val="000000">
               <a:alpha val="50000"/>
             </a:srgbClr>
           </a:outerShdw>
         </a:effectLst>
       </a:spPr>
-      <a:bodyPr rot="0" spcFirstLastPara="1" vertOverflow="overflow" horzOverflow="overflow" vert="horz" wrap="square" lIns="91439" tIns="45719" rIns="91439" bIns="45719" numCol="1" spcCol="38100" rtlCol="0" anchor="t" upright="0">
+      <a:bodyPr rot="0" spcFirstLastPara="1" vertOverflow="overflow" horzOverflow="overflow" vert="horz" wrap="square" lIns="91439" tIns="45719" rIns="91439" bIns="45719" numCol="1" spcCol="38100" rtlCol="0" anchor="t">
         <a:noAutofit/>
       </a:bodyPr>
       <a:lstStyle>
@@ -4818,7 +4837,7 @@
           <a:buFontTx/>
           <a:buNone/>
           <a:tabLst/>
-          <a:defRPr b="0" baseline="0" cap="none" i="0" spc="0" strike="noStrike" sz="1800" u="none" kumimoji="0" normalizeH="0">
+          <a:defRPr kumimoji="0" sz="1800" b="0" i="0" u="none" strike="noStrike" cap="none" spc="0" normalizeH="0" baseline="0">
             <a:ln>
               <a:noFill/>
             </a:ln>
@@ -4844,7 +4863,7 @@
           <a:buFontTx/>
           <a:buNone/>
           <a:tabLst/>
-          <a:defRPr b="0" baseline="0" cap="none" i="0" spc="0" strike="noStrike" sz="1800" u="none" kumimoji="0" normalizeH="0">
+          <a:defRPr kumimoji="0" sz="1800" b="0" i="0" u="none" strike="noStrike" cap="none" spc="0" normalizeH="0" baseline="0">
             <a:ln>
               <a:noFill/>
             </a:ln>
@@ -4870,7 +4889,7 @@
           <a:buFontTx/>
           <a:buNone/>
           <a:tabLst/>
-          <a:defRPr b="0" baseline="0" cap="none" i="0" spc="0" strike="noStrike" sz="1800" u="none" kumimoji="0" normalizeH="0">
+          <a:defRPr kumimoji="0" sz="1800" b="0" i="0" u="none" strike="noStrike" cap="none" spc="0" normalizeH="0" baseline="0">
             <a:ln>
               <a:noFill/>
             </a:ln>
@@ -4896,7 +4915,7 @@
           <a:buFontTx/>
           <a:buNone/>
           <a:tabLst/>
-          <a:defRPr b="0" baseline="0" cap="none" i="0" spc="0" strike="noStrike" sz="1800" u="none" kumimoji="0" normalizeH="0">
+          <a:defRPr kumimoji="0" sz="1800" b="0" i="0" u="none" strike="noStrike" cap="none" spc="0" normalizeH="0" baseline="0">
             <a:ln>
               <a:noFill/>
             </a:ln>
@@ -4922,7 +4941,7 @@
           <a:buFontTx/>
           <a:buNone/>
           <a:tabLst/>
-          <a:defRPr b="0" baseline="0" cap="none" i="0" spc="0" strike="noStrike" sz="1800" u="none" kumimoji="0" normalizeH="0">
+          <a:defRPr kumimoji="0" sz="1800" b="0" i="0" u="none" strike="noStrike" cap="none" spc="0" normalizeH="0" baseline="0">
             <a:ln>
               <a:noFill/>
             </a:ln>
@@ -4948,7 +4967,7 @@
           <a:buFontTx/>
           <a:buNone/>
           <a:tabLst/>
-          <a:defRPr b="0" baseline="0" cap="none" i="0" spc="0" strike="noStrike" sz="1800" u="none" kumimoji="0" normalizeH="0">
+          <a:defRPr kumimoji="0" sz="1800" b="0" i="0" u="none" strike="noStrike" cap="none" spc="0" normalizeH="0" baseline="0">
             <a:ln>
               <a:noFill/>
             </a:ln>
@@ -4974,7 +4993,7 @@
           <a:buFontTx/>
           <a:buNone/>
           <a:tabLst/>
-          <a:defRPr b="0" baseline="0" cap="none" i="0" spc="0" strike="noStrike" sz="1800" u="none" kumimoji="0" normalizeH="0">
+          <a:defRPr kumimoji="0" sz="1800" b="0" i="0" u="none" strike="noStrike" cap="none" spc="0" normalizeH="0" baseline="0">
             <a:ln>
               <a:noFill/>
             </a:ln>
@@ -5000,7 +5019,7 @@
           <a:buFontTx/>
           <a:buNone/>
           <a:tabLst/>
-          <a:defRPr b="0" baseline="0" cap="none" i="0" spc="0" strike="noStrike" sz="1800" u="none" kumimoji="0" normalizeH="0">
+          <a:defRPr kumimoji="0" sz="1800" b="0" i="0" u="none" strike="noStrike" cap="none" spc="0" normalizeH="0" baseline="0">
             <a:ln>
               <a:noFill/>
             </a:ln>
@@ -5026,7 +5045,7 @@
           <a:buFontTx/>
           <a:buNone/>
           <a:tabLst/>
-          <a:defRPr b="0" baseline="0" cap="none" i="0" spc="0" strike="noStrike" sz="1800" u="none" kumimoji="0" normalizeH="0">
+          <a:defRPr kumimoji="0" sz="1800" b="0" i="0" u="none" strike="noStrike" cap="none" spc="0" normalizeH="0" baseline="0">
             <a:ln>
               <a:noFill/>
             </a:ln>
@@ -5052,7 +5071,7 @@
           <a:buFontTx/>
           <a:buNone/>
           <a:tabLst/>
-          <a:defRPr b="0" baseline="0" cap="none" i="0" spc="0" strike="noStrike" sz="1800" u="none" kumimoji="0" normalizeH="0">
+          <a:defRPr kumimoji="0" sz="1800" b="0" i="0" u="none" strike="noStrike" cap="none" spc="0" normalizeH="0" baseline="0">
             <a:ln>
               <a:noFill/>
             </a:ln>
@@ -5065,9 +5084,15 @@
         </a:lvl9pPr>
       </a:lstStyle>
       <a:style>
-        <a:lnRef idx="0"/>
-        <a:fillRef idx="0"/>
-        <a:effectRef idx="0"/>
+        <a:lnRef idx="0">
+          <a:scrgbClr r="0" g="0" b="0"/>
+        </a:lnRef>
+        <a:fillRef idx="0">
+          <a:scrgbClr r="0" g="0" b="0"/>
+        </a:fillRef>
+        <a:effectRef idx="0">
+          <a:scrgbClr r="0" g="0" b="0"/>
+        </a:effectRef>
         <a:fontRef idx="none"/>
       </a:style>
     </a:lnDef>
@@ -5080,7 +5105,7 @@
         </a:ln>
         <a:effectLst/>
       </a:spPr>
-      <a:bodyPr rot="0" spcFirstLastPara="1" vertOverflow="overflow" horzOverflow="overflow" vert="horz" wrap="square" lIns="50800" tIns="50800" rIns="50800" bIns="50800" numCol="1" spcCol="38100" rtlCol="0" anchor="ctr" upright="0">
+      <a:bodyPr rot="0" spcFirstLastPara="1" vertOverflow="overflow" horzOverflow="overflow" vert="horz" wrap="square" lIns="50800" tIns="50800" rIns="50800" bIns="50800" numCol="1" spcCol="38100" rtlCol="0" anchor="ctr">
         <a:spAutoFit/>
       </a:bodyPr>
       <a:lstStyle>
@@ -5099,7 +5124,7 @@
           <a:buFontTx/>
           <a:buNone/>
           <a:tabLst/>
-          <a:defRPr b="0" baseline="0" cap="none" i="0" spc="0" strike="noStrike" sz="3600" u="none" kumimoji="0" normalizeH="0">
+          <a:defRPr kumimoji="0" sz="3600" b="0" i="0" u="none" strike="noStrike" cap="none" spc="0" normalizeH="0" baseline="0">
             <a:ln>
               <a:noFill/>
             </a:ln>
@@ -5129,7 +5154,7 @@
           <a:buFontTx/>
           <a:buNone/>
           <a:tabLst/>
-          <a:defRPr b="0" baseline="0" cap="none" i="0" spc="0" strike="noStrike" sz="1800" u="none" kumimoji="0" normalizeH="0">
+          <a:defRPr kumimoji="0" sz="1800" b="0" i="0" u="none" strike="noStrike" cap="none" spc="0" normalizeH="0" baseline="0">
             <a:ln>
               <a:noFill/>
             </a:ln>
@@ -5155,7 +5180,7 @@
           <a:buFontTx/>
           <a:buNone/>
           <a:tabLst/>
-          <a:defRPr b="0" baseline="0" cap="none" i="0" spc="0" strike="noStrike" sz="1800" u="none" kumimoji="0" normalizeH="0">
+          <a:defRPr kumimoji="0" sz="1800" b="0" i="0" u="none" strike="noStrike" cap="none" spc="0" normalizeH="0" baseline="0">
             <a:ln>
               <a:noFill/>
             </a:ln>
@@ -5181,7 +5206,7 @@
           <a:buFontTx/>
           <a:buNone/>
           <a:tabLst/>
-          <a:defRPr b="0" baseline="0" cap="none" i="0" spc="0" strike="noStrike" sz="1800" u="none" kumimoji="0" normalizeH="0">
+          <a:defRPr kumimoji="0" sz="1800" b="0" i="0" u="none" strike="noStrike" cap="none" spc="0" normalizeH="0" baseline="0">
             <a:ln>
               <a:noFill/>
             </a:ln>
@@ -5207,7 +5232,7 @@
           <a:buFontTx/>
           <a:buNone/>
           <a:tabLst/>
-          <a:defRPr b="0" baseline="0" cap="none" i="0" spc="0" strike="noStrike" sz="1800" u="none" kumimoji="0" normalizeH="0">
+          <a:defRPr kumimoji="0" sz="1800" b="0" i="0" u="none" strike="noStrike" cap="none" spc="0" normalizeH="0" baseline="0">
             <a:ln>
               <a:noFill/>
             </a:ln>
@@ -5233,7 +5258,7 @@
           <a:buFontTx/>
           <a:buNone/>
           <a:tabLst/>
-          <a:defRPr b="0" baseline="0" cap="none" i="0" spc="0" strike="noStrike" sz="1800" u="none" kumimoji="0" normalizeH="0">
+          <a:defRPr kumimoji="0" sz="1800" b="0" i="0" u="none" strike="noStrike" cap="none" spc="0" normalizeH="0" baseline="0">
             <a:ln>
               <a:noFill/>
             </a:ln>
@@ -5259,7 +5284,7 @@
           <a:buFontTx/>
           <a:buNone/>
           <a:tabLst/>
-          <a:defRPr b="0" baseline="0" cap="none" i="0" spc="0" strike="noStrike" sz="1800" u="none" kumimoji="0" normalizeH="0">
+          <a:defRPr kumimoji="0" sz="1800" b="0" i="0" u="none" strike="noStrike" cap="none" spc="0" normalizeH="0" baseline="0">
             <a:ln>
               <a:noFill/>
             </a:ln>
@@ -5285,7 +5310,7 @@
           <a:buFontTx/>
           <a:buNone/>
           <a:tabLst/>
-          <a:defRPr b="0" baseline="0" cap="none" i="0" spc="0" strike="noStrike" sz="1800" u="none" kumimoji="0" normalizeH="0">
+          <a:defRPr kumimoji="0" sz="1800" b="0" i="0" u="none" strike="noStrike" cap="none" spc="0" normalizeH="0" baseline="0">
             <a:ln>
               <a:noFill/>
             </a:ln>
@@ -5311,7 +5336,7 @@
           <a:buFontTx/>
           <a:buNone/>
           <a:tabLst/>
-          <a:defRPr b="0" baseline="0" cap="none" i="0" spc="0" strike="noStrike" sz="1800" u="none" kumimoji="0" normalizeH="0">
+          <a:defRPr kumimoji="0" sz="1800" b="0" i="0" u="none" strike="noStrike" cap="none" spc="0" normalizeH="0" baseline="0">
             <a:ln>
               <a:noFill/>
             </a:ln>
@@ -5337,7 +5362,7 @@
           <a:buFontTx/>
           <a:buNone/>
           <a:tabLst/>
-          <a:defRPr b="0" baseline="0" cap="none" i="0" spc="0" strike="noStrike" sz="1800" u="none" kumimoji="0" normalizeH="0">
+          <a:defRPr kumimoji="0" sz="1800" b="0" i="0" u="none" strike="noStrike" cap="none" spc="0" normalizeH="0" baseline="0">
             <a:ln>
               <a:noFill/>
             </a:ln>
@@ -5350,18 +5375,25 @@
         </a:lvl9pPr>
       </a:lstStyle>
       <a:style>
-        <a:lnRef idx="0"/>
-        <a:fillRef idx="0"/>
-        <a:effectRef idx="0"/>
+        <a:lnRef idx="0">
+          <a:scrgbClr r="0" g="0" b="0"/>
+        </a:lnRef>
+        <a:fillRef idx="0">
+          <a:scrgbClr r="0" g="0" b="0"/>
+        </a:fillRef>
+        <a:effectRef idx="0">
+          <a:scrgbClr r="0" g="0" b="0"/>
+        </a:effectRef>
         <a:fontRef idx="none"/>
       </a:style>
     </a:txDef>
   </a:objectDefaults>
+  <a:extraClrSchemeLst/>
 </a:theme>
 </file>
 
 <file path=ppt/theme/theme2.xml><?xml version="1.0" encoding="utf-8"?>
-<a:theme xmlns:a="http://schemas.openxmlformats.org/drawingml/2006/main" xmlns:r="http://schemas.openxmlformats.org/officeDocument/2006/relationships" name="Default">
+<a:theme xmlns:a="http://schemas.openxmlformats.org/drawingml/2006/main" name="Default">
   <a:themeElements>
     <a:clrScheme name="Default">
       <a:dk1>
@@ -5487,7 +5519,7 @@
       <a:effectStyleLst>
         <a:effectStyle>
           <a:effectLst>
-            <a:outerShdw sx="100000" sy="100000" kx="0" ky="0" algn="b" rotWithShape="0" blurRad="38100" dist="25400" dir="5400000">
+            <a:outerShdw blurRad="38100" dist="25400" dir="5400000" rotWithShape="0">
               <a:srgbClr val="000000">
                 <a:alpha val="50000"/>
               </a:srgbClr>
@@ -5496,7 +5528,7 @@
         </a:effectStyle>
         <a:effectStyle>
           <a:effectLst>
-            <a:outerShdw sx="100000" sy="100000" kx="0" ky="0" algn="b" rotWithShape="0" blurRad="38100" dist="25400" dir="5400000">
+            <a:outerShdw blurRad="38100" dist="25400" dir="5400000" rotWithShape="0">
               <a:srgbClr val="000000">
                 <a:alpha val="50000"/>
               </a:srgbClr>
@@ -5505,7 +5537,7 @@
         </a:effectStyle>
         <a:effectStyle>
           <a:effectLst>
-            <a:outerShdw sx="100000" sy="100000" kx="0" ky="0" algn="b" rotWithShape="0" blurRad="38100" dist="25400" dir="5400000">
+            <a:outerShdw blurRad="38100" dist="25400" dir="5400000" rotWithShape="0">
               <a:srgbClr val="000000">
                 <a:alpha val="50000"/>
               </a:srgbClr>
@@ -5579,14 +5611,14 @@
           <a:bevel/>
         </a:ln>
         <a:effectLst>
-          <a:outerShdw sx="100000" sy="100000" kx="0" ky="0" algn="b" rotWithShape="0" blurRad="38100" dist="25400" dir="5400000">
+          <a:outerShdw blurRad="38100" dist="25400" dir="5400000" rotWithShape="0">
             <a:srgbClr val="000000">
               <a:alpha val="50000"/>
             </a:srgbClr>
           </a:outerShdw>
         </a:effectLst>
       </a:spPr>
-      <a:bodyPr rot="0" spcFirstLastPara="1" vertOverflow="overflow" horzOverflow="overflow" vert="horz" wrap="square" lIns="50800" tIns="50800" rIns="50800" bIns="50800" numCol="1" spcCol="38100" rtlCol="0" anchor="ctr" upright="0">
+      <a:bodyPr rot="0" spcFirstLastPara="1" vertOverflow="overflow" horzOverflow="overflow" vert="horz" wrap="square" lIns="50800" tIns="50800" rIns="50800" bIns="50800" numCol="1" spcCol="38100" rtlCol="0" anchor="ctr">
         <a:spAutoFit/>
       </a:bodyPr>
       <a:lstStyle>
@@ -5605,7 +5637,7 @@
           <a:buFontTx/>
           <a:buNone/>
           <a:tabLst/>
-          <a:defRPr b="0" baseline="0" cap="none" i="0" spc="0" strike="noStrike" sz="3600" u="none" kumimoji="0" normalizeH="0">
+          <a:defRPr kumimoji="0" sz="3600" b="0" i="0" u="none" strike="noStrike" cap="none" spc="0" normalizeH="0" baseline="0">
             <a:ln>
               <a:noFill/>
             </a:ln>
@@ -5635,7 +5667,7 @@
           <a:buFontTx/>
           <a:buNone/>
           <a:tabLst/>
-          <a:defRPr b="0" baseline="0" cap="none" i="0" spc="0" strike="noStrike" sz="1800" u="none" kumimoji="0" normalizeH="0">
+          <a:defRPr kumimoji="0" sz="1800" b="0" i="0" u="none" strike="noStrike" cap="none" spc="0" normalizeH="0" baseline="0">
             <a:ln>
               <a:noFill/>
             </a:ln>
@@ -5661,7 +5693,7 @@
           <a:buFontTx/>
           <a:buNone/>
           <a:tabLst/>
-          <a:defRPr b="0" baseline="0" cap="none" i="0" spc="0" strike="noStrike" sz="1800" u="none" kumimoji="0" normalizeH="0">
+          <a:defRPr kumimoji="0" sz="1800" b="0" i="0" u="none" strike="noStrike" cap="none" spc="0" normalizeH="0" baseline="0">
             <a:ln>
               <a:noFill/>
             </a:ln>
@@ -5687,7 +5719,7 @@
           <a:buFontTx/>
           <a:buNone/>
           <a:tabLst/>
-          <a:defRPr b="0" baseline="0" cap="none" i="0" spc="0" strike="noStrike" sz="1800" u="none" kumimoji="0" normalizeH="0">
+          <a:defRPr kumimoji="0" sz="1800" b="0" i="0" u="none" strike="noStrike" cap="none" spc="0" normalizeH="0" baseline="0">
             <a:ln>
               <a:noFill/>
             </a:ln>
@@ -5713,7 +5745,7 @@
           <a:buFontTx/>
           <a:buNone/>
           <a:tabLst/>
-          <a:defRPr b="0" baseline="0" cap="none" i="0" spc="0" strike="noStrike" sz="1800" u="none" kumimoji="0" normalizeH="0">
+          <a:defRPr kumimoji="0" sz="1800" b="0" i="0" u="none" strike="noStrike" cap="none" spc="0" normalizeH="0" baseline="0">
             <a:ln>
               <a:noFill/>
             </a:ln>
@@ -5739,7 +5771,7 @@
           <a:buFontTx/>
           <a:buNone/>
           <a:tabLst/>
-          <a:defRPr b="0" baseline="0" cap="none" i="0" spc="0" strike="noStrike" sz="1800" u="none" kumimoji="0" normalizeH="0">
+          <a:defRPr kumimoji="0" sz="1800" b="0" i="0" u="none" strike="noStrike" cap="none" spc="0" normalizeH="0" baseline="0">
             <a:ln>
               <a:noFill/>
             </a:ln>
@@ -5765,7 +5797,7 @@
           <a:buFontTx/>
           <a:buNone/>
           <a:tabLst/>
-          <a:defRPr b="0" baseline="0" cap="none" i="0" spc="0" strike="noStrike" sz="1800" u="none" kumimoji="0" normalizeH="0">
+          <a:defRPr kumimoji="0" sz="1800" b="0" i="0" u="none" strike="noStrike" cap="none" spc="0" normalizeH="0" baseline="0">
             <a:ln>
               <a:noFill/>
             </a:ln>
@@ -5791,7 +5823,7 @@
           <a:buFontTx/>
           <a:buNone/>
           <a:tabLst/>
-          <a:defRPr b="0" baseline="0" cap="none" i="0" spc="0" strike="noStrike" sz="1800" u="none" kumimoji="0" normalizeH="0">
+          <a:defRPr kumimoji="0" sz="1800" b="0" i="0" u="none" strike="noStrike" cap="none" spc="0" normalizeH="0" baseline="0">
             <a:ln>
               <a:noFill/>
             </a:ln>
@@ -5817,7 +5849,7 @@
           <a:buFontTx/>
           <a:buNone/>
           <a:tabLst/>
-          <a:defRPr b="0" baseline="0" cap="none" i="0" spc="0" strike="noStrike" sz="1800" u="none" kumimoji="0" normalizeH="0">
+          <a:defRPr kumimoji="0" sz="1800" b="0" i="0" u="none" strike="noStrike" cap="none" spc="0" normalizeH="0" baseline="0">
             <a:ln>
               <a:noFill/>
             </a:ln>
@@ -5843,7 +5875,7 @@
           <a:buFontTx/>
           <a:buNone/>
           <a:tabLst/>
-          <a:defRPr b="0" baseline="0" cap="none" i="0" spc="0" strike="noStrike" sz="1800" u="none" kumimoji="0" normalizeH="0">
+          <a:defRPr kumimoji="0" sz="1800" b="0" i="0" u="none" strike="noStrike" cap="none" spc="0" normalizeH="0" baseline="0">
             <a:ln>
               <a:noFill/>
             </a:ln>
@@ -5856,9 +5888,15 @@
         </a:lvl9pPr>
       </a:lstStyle>
       <a:style>
-        <a:lnRef idx="0"/>
-        <a:fillRef idx="0"/>
-        <a:effectRef idx="0"/>
+        <a:lnRef idx="0">
+          <a:scrgbClr r="0" g="0" b="0"/>
+        </a:lnRef>
+        <a:fillRef idx="0">
+          <a:scrgbClr r="0" g="0" b="0"/>
+        </a:fillRef>
+        <a:effectRef idx="0">
+          <a:scrgbClr r="0" g="0" b="0"/>
+        </a:effectRef>
         <a:fontRef idx="none"/>
       </a:style>
     </a:spDef>
@@ -5873,14 +5911,14 @@
           <a:bevel/>
         </a:ln>
         <a:effectLst>
-          <a:outerShdw sx="100000" sy="100000" kx="0" ky="0" algn="b" rotWithShape="0" blurRad="38100" dist="25400" dir="5400000">
+          <a:outerShdw blurRad="38100" dist="25400" dir="5400000" rotWithShape="0">
             <a:srgbClr val="000000">
               <a:alpha val="50000"/>
             </a:srgbClr>
           </a:outerShdw>
         </a:effectLst>
       </a:spPr>
-      <a:bodyPr rot="0" spcFirstLastPara="1" vertOverflow="overflow" horzOverflow="overflow" vert="horz" wrap="square" lIns="91439" tIns="45719" rIns="91439" bIns="45719" numCol="1" spcCol="38100" rtlCol="0" anchor="t" upright="0">
+      <a:bodyPr rot="0" spcFirstLastPara="1" vertOverflow="overflow" horzOverflow="overflow" vert="horz" wrap="square" lIns="91439" tIns="45719" rIns="91439" bIns="45719" numCol="1" spcCol="38100" rtlCol="0" anchor="t">
         <a:noAutofit/>
       </a:bodyPr>
       <a:lstStyle>
@@ -5899,7 +5937,7 @@
           <a:buFontTx/>
           <a:buNone/>
           <a:tabLst/>
-          <a:defRPr b="0" baseline="0" cap="none" i="0" spc="0" strike="noStrike" sz="1800" u="none" kumimoji="0" normalizeH="0">
+          <a:defRPr kumimoji="0" sz="1800" b="0" i="0" u="none" strike="noStrike" cap="none" spc="0" normalizeH="0" baseline="0">
             <a:ln>
               <a:noFill/>
             </a:ln>
@@ -5925,7 +5963,7 @@
           <a:buFontTx/>
           <a:buNone/>
           <a:tabLst/>
-          <a:defRPr b="0" baseline="0" cap="none" i="0" spc="0" strike="noStrike" sz="1800" u="none" kumimoji="0" normalizeH="0">
+          <a:defRPr kumimoji="0" sz="1800" b="0" i="0" u="none" strike="noStrike" cap="none" spc="0" normalizeH="0" baseline="0">
             <a:ln>
               <a:noFill/>
             </a:ln>
@@ -5951,7 +5989,7 @@
           <a:buFontTx/>
           <a:buNone/>
           <a:tabLst/>
-          <a:defRPr b="0" baseline="0" cap="none" i="0" spc="0" strike="noStrike" sz="1800" u="none" kumimoji="0" normalizeH="0">
+          <a:defRPr kumimoji="0" sz="1800" b="0" i="0" u="none" strike="noStrike" cap="none" spc="0" normalizeH="0" baseline="0">
             <a:ln>
               <a:noFill/>
             </a:ln>
@@ -5977,7 +6015,7 @@
           <a:buFontTx/>
           <a:buNone/>
           <a:tabLst/>
-          <a:defRPr b="0" baseline="0" cap="none" i="0" spc="0" strike="noStrike" sz="1800" u="none" kumimoji="0" normalizeH="0">
+          <a:defRPr kumimoji="0" sz="1800" b="0" i="0" u="none" strike="noStrike" cap="none" spc="0" normalizeH="0" baseline="0">
             <a:ln>
               <a:noFill/>
             </a:ln>
@@ -6003,7 +6041,7 @@
           <a:buFontTx/>
           <a:buNone/>
           <a:tabLst/>
-          <a:defRPr b="0" baseline="0" cap="none" i="0" spc="0" strike="noStrike" sz="1800" u="none" kumimoji="0" normalizeH="0">
+          <a:defRPr kumimoji="0" sz="1800" b="0" i="0" u="none" strike="noStrike" cap="none" spc="0" normalizeH="0" baseline="0">
             <a:ln>
               <a:noFill/>
             </a:ln>
@@ -6029,7 +6067,7 @@
           <a:buFontTx/>
           <a:buNone/>
           <a:tabLst/>
-          <a:defRPr b="0" baseline="0" cap="none" i="0" spc="0" strike="noStrike" sz="1800" u="none" kumimoji="0" normalizeH="0">
+          <a:defRPr kumimoji="0" sz="1800" b="0" i="0" u="none" strike="noStrike" cap="none" spc="0" normalizeH="0" baseline="0">
             <a:ln>
               <a:noFill/>
             </a:ln>
@@ -6055,7 +6093,7 @@
           <a:buFontTx/>
           <a:buNone/>
           <a:tabLst/>
-          <a:defRPr b="0" baseline="0" cap="none" i="0" spc="0" strike="noStrike" sz="1800" u="none" kumimoji="0" normalizeH="0">
+          <a:defRPr kumimoji="0" sz="1800" b="0" i="0" u="none" strike="noStrike" cap="none" spc="0" normalizeH="0" baseline="0">
             <a:ln>
               <a:noFill/>
             </a:ln>
@@ -6081,7 +6119,7 @@
           <a:buFontTx/>
           <a:buNone/>
           <a:tabLst/>
-          <a:defRPr b="0" baseline="0" cap="none" i="0" spc="0" strike="noStrike" sz="1800" u="none" kumimoji="0" normalizeH="0">
+          <a:defRPr kumimoji="0" sz="1800" b="0" i="0" u="none" strike="noStrike" cap="none" spc="0" normalizeH="0" baseline="0">
             <a:ln>
               <a:noFill/>
             </a:ln>
@@ -6107,7 +6145,7 @@
           <a:buFontTx/>
           <a:buNone/>
           <a:tabLst/>
-          <a:defRPr b="0" baseline="0" cap="none" i="0" spc="0" strike="noStrike" sz="1800" u="none" kumimoji="0" normalizeH="0">
+          <a:defRPr kumimoji="0" sz="1800" b="0" i="0" u="none" strike="noStrike" cap="none" spc="0" normalizeH="0" baseline="0">
             <a:ln>
               <a:noFill/>
             </a:ln>
@@ -6133,7 +6171,7 @@
           <a:buFontTx/>
           <a:buNone/>
           <a:tabLst/>
-          <a:defRPr b="0" baseline="0" cap="none" i="0" spc="0" strike="noStrike" sz="1800" u="none" kumimoji="0" normalizeH="0">
+          <a:defRPr kumimoji="0" sz="1800" b="0" i="0" u="none" strike="noStrike" cap="none" spc="0" normalizeH="0" baseline="0">
             <a:ln>
               <a:noFill/>
             </a:ln>
@@ -6146,9 +6184,15 @@
         </a:lvl9pPr>
       </a:lstStyle>
       <a:style>
-        <a:lnRef idx="0"/>
-        <a:fillRef idx="0"/>
-        <a:effectRef idx="0"/>
+        <a:lnRef idx="0">
+          <a:scrgbClr r="0" g="0" b="0"/>
+        </a:lnRef>
+        <a:fillRef idx="0">
+          <a:scrgbClr r="0" g="0" b="0"/>
+        </a:fillRef>
+        <a:effectRef idx="0">
+          <a:scrgbClr r="0" g="0" b="0"/>
+        </a:effectRef>
         <a:fontRef idx="none"/>
       </a:style>
     </a:lnDef>
@@ -6161,7 +6205,7 @@
         </a:ln>
         <a:effectLst/>
       </a:spPr>
-      <a:bodyPr rot="0" spcFirstLastPara="1" vertOverflow="overflow" horzOverflow="overflow" vert="horz" wrap="square" lIns="50800" tIns="50800" rIns="50800" bIns="50800" numCol="1" spcCol="38100" rtlCol="0" anchor="ctr" upright="0">
+      <a:bodyPr rot="0" spcFirstLastPara="1" vertOverflow="overflow" horzOverflow="overflow" vert="horz" wrap="square" lIns="50800" tIns="50800" rIns="50800" bIns="50800" numCol="1" spcCol="38100" rtlCol="0" anchor="ctr">
         <a:spAutoFit/>
       </a:bodyPr>
       <a:lstStyle>
@@ -6180,7 +6224,7 @@
           <a:buFontTx/>
           <a:buNone/>
           <a:tabLst/>
-          <a:defRPr b="0" baseline="0" cap="none" i="0" spc="0" strike="noStrike" sz="3600" u="none" kumimoji="0" normalizeH="0">
+          <a:defRPr kumimoji="0" sz="3600" b="0" i="0" u="none" strike="noStrike" cap="none" spc="0" normalizeH="0" baseline="0">
             <a:ln>
               <a:noFill/>
             </a:ln>
@@ -6210,7 +6254,7 @@
           <a:buFontTx/>
           <a:buNone/>
           <a:tabLst/>
-          <a:defRPr b="0" baseline="0" cap="none" i="0" spc="0" strike="noStrike" sz="1800" u="none" kumimoji="0" normalizeH="0">
+          <a:defRPr kumimoji="0" sz="1800" b="0" i="0" u="none" strike="noStrike" cap="none" spc="0" normalizeH="0" baseline="0">
             <a:ln>
               <a:noFill/>
             </a:ln>
@@ -6236,7 +6280,7 @@
           <a:buFontTx/>
           <a:buNone/>
           <a:tabLst/>
-          <a:defRPr b="0" baseline="0" cap="none" i="0" spc="0" strike="noStrike" sz="1800" u="none" kumimoji="0" normalizeH="0">
+          <a:defRPr kumimoji="0" sz="1800" b="0" i="0" u="none" strike="noStrike" cap="none" spc="0" normalizeH="0" baseline="0">
             <a:ln>
               <a:noFill/>
             </a:ln>
@@ -6262,7 +6306,7 @@
           <a:buFontTx/>
           <a:buNone/>
           <a:tabLst/>
-          <a:defRPr b="0" baseline="0" cap="none" i="0" spc="0" strike="noStrike" sz="1800" u="none" kumimoji="0" normalizeH="0">
+          <a:defRPr kumimoji="0" sz="1800" b="0" i="0" u="none" strike="noStrike" cap="none" spc="0" normalizeH="0" baseline="0">
             <a:ln>
               <a:noFill/>
             </a:ln>
@@ -6288,7 +6332,7 @@
           <a:buFontTx/>
           <a:buNone/>
           <a:tabLst/>
-          <a:defRPr b="0" baseline="0" cap="none" i="0" spc="0" strike="noStrike" sz="1800" u="none" kumimoji="0" normalizeH="0">
+          <a:defRPr kumimoji="0" sz="1800" b="0" i="0" u="none" strike="noStrike" cap="none" spc="0" normalizeH="0" baseline="0">
             <a:ln>
               <a:noFill/>
             </a:ln>
@@ -6314,7 +6358,7 @@
           <a:buFontTx/>
           <a:buNone/>
           <a:tabLst/>
-          <a:defRPr b="0" baseline="0" cap="none" i="0" spc="0" strike="noStrike" sz="1800" u="none" kumimoji="0" normalizeH="0">
+          <a:defRPr kumimoji="0" sz="1800" b="0" i="0" u="none" strike="noStrike" cap="none" spc="0" normalizeH="0" baseline="0">
             <a:ln>
               <a:noFill/>
             </a:ln>
@@ -6340,7 +6384,7 @@
           <a:buFontTx/>
           <a:buNone/>
           <a:tabLst/>
-          <a:defRPr b="0" baseline="0" cap="none" i="0" spc="0" strike="noStrike" sz="1800" u="none" kumimoji="0" normalizeH="0">
+          <a:defRPr kumimoji="0" sz="1800" b="0" i="0" u="none" strike="noStrike" cap="none" spc="0" normalizeH="0" baseline="0">
             <a:ln>
               <a:noFill/>
             </a:ln>
@@ -6366,7 +6410,7 @@
           <a:buFontTx/>
           <a:buNone/>
           <a:tabLst/>
-          <a:defRPr b="0" baseline="0" cap="none" i="0" spc="0" strike="noStrike" sz="1800" u="none" kumimoji="0" normalizeH="0">
+          <a:defRPr kumimoji="0" sz="1800" b="0" i="0" u="none" strike="noStrike" cap="none" spc="0" normalizeH="0" baseline="0">
             <a:ln>
               <a:noFill/>
             </a:ln>
@@ -6392,7 +6436,7 @@
           <a:buFontTx/>
           <a:buNone/>
           <a:tabLst/>
-          <a:defRPr b="0" baseline="0" cap="none" i="0" spc="0" strike="noStrike" sz="1800" u="none" kumimoji="0" normalizeH="0">
+          <a:defRPr kumimoji="0" sz="1800" b="0" i="0" u="none" strike="noStrike" cap="none" spc="0" normalizeH="0" baseline="0">
             <a:ln>
               <a:noFill/>
             </a:ln>
@@ -6418,7 +6462,7 @@
           <a:buFontTx/>
           <a:buNone/>
           <a:tabLst/>
-          <a:defRPr b="0" baseline="0" cap="none" i="0" spc="0" strike="noStrike" sz="1800" u="none" kumimoji="0" normalizeH="0">
+          <a:defRPr kumimoji="0" sz="1800" b="0" i="0" u="none" strike="noStrike" cap="none" spc="0" normalizeH="0" baseline="0">
             <a:ln>
               <a:noFill/>
             </a:ln>
@@ -6431,12 +6475,19 @@
         </a:lvl9pPr>
       </a:lstStyle>
       <a:style>
-        <a:lnRef idx="0"/>
-        <a:fillRef idx="0"/>
-        <a:effectRef idx="0"/>
+        <a:lnRef idx="0">
+          <a:scrgbClr r="0" g="0" b="0"/>
+        </a:lnRef>
+        <a:fillRef idx="0">
+          <a:scrgbClr r="0" g="0" b="0"/>
+        </a:fillRef>
+        <a:effectRef idx="0">
+          <a:scrgbClr r="0" g="0" b="0"/>
+        </a:effectRef>
         <a:fontRef idx="none"/>
       </a:style>
     </a:txDef>
   </a:objectDefaults>
+  <a:extraClrSchemeLst/>
 </a:theme>
 </file>
</xml_diff>